<commit_message>
Deployed d715930 with MkDocs version: 1.2.3
</commit_message>
<xml_diff>
--- a/week-2/ce100-week-2-recurrence.md_word.pptx
+++ b/week-2/ce100-week-2-recurrence.md_word.pptx
@@ -86,6 +86,8 @@
     <p:sldId id="334" r:id="rId80"/>
     <p:sldId id="335" r:id="rId81"/>
     <p:sldId id="336" r:id="rId82"/>
+    <p:sldId id="337" r:id="rId83"/>
+    <p:sldId id="338" r:id="rId84"/>
   </p:sldIdLst>
   <p:sldSz cx="9144000" cy="6858000" type="screen4x3"/>
   <p:notesSz cx="6858000" cy="9144000"/>
@@ -28816,6 +28818,723 @@
             </a:pPr>
             <a:r>
               <a:rPr/>
+              <a:t>Correctness Proofs for Divide and Conquer Algorithms</a:t>
+            </a:r>
+          </a:p>
+        </p:txBody>
+      </p:sp>
+      <mc:AlternateContent xmlns:mc="http://schemas.openxmlformats.org/markup-compatibility/2006">
+        <mc:Choice xmlns:a14="http://schemas.microsoft.com/office/drawing/2010/main" Requires="a14">
+          <p:sp>
+            <p:nvSpPr>
+              <p:cNvPr id="3" name="Content Placeholder 2"/>
+              <p:cNvSpPr>
+                <a:spLocks noGrp="1"/>
+              </p:cNvSpPr>
+              <p:nvPr>
+                <p:ph idx="1"/>
+              </p:nvPr>
+            </p:nvSpPr>
+            <p:spPr/>
+            <p:txBody>
+              <a:bodyPr/>
+              <a:lstStyle/>
+              <a:p>
+                <a:pPr lvl="0"/>
+                <a:r>
+                  <a:rPr b="1"/>
+                  <a:t>Proof by induction</a:t>
+                </a:r>
+                <a:r>
+                  <a:rPr/>
+                  <a:t> commonly used for Divide and Conquer Algorithms</a:t>
+                </a:r>
+              </a:p>
+              <a:p>
+                <a:pPr lvl="0"/>
+                <a:r>
+                  <a:rPr b="1"/>
+                  <a:t>Base case:</a:t>
+                </a:r>
+                <a:r>
+                  <a:rPr/>
+                  <a:t> Show that the algorithm is correct when the recursion bottoms out (i.e., for sufficiently small n)</a:t>
+                </a:r>
+              </a:p>
+              <a:p>
+                <a:pPr lvl="0"/>
+                <a:r>
+                  <a:rPr b="1"/>
+                  <a:t>Inductive hypothesis:</a:t>
+                </a:r>
+                <a:r>
+                  <a:rPr/>
+                  <a:t> Assume the alg. is correct for any recursive call on any smaller subproblem of size </a:t>
+                </a:r>
+                <a14:m>
+                  <m:oMath xmlns:m="http://schemas.openxmlformats.org/officeDocument/2006/math">
+                    <m:r>
+                      <m:t>k</m:t>
+                    </m:r>
+                  </m:oMath>
+                </a14:m>
+                <a:r>
+                  <a:rPr/>
+                  <a:t>, </a:t>
+                </a:r>
+                <a14:m>
+                  <m:oMath xmlns:m="http://schemas.openxmlformats.org/officeDocument/2006/math">
+                    <m:d>
+                      <m:dPr>
+                        <m:begChr m:val="("/>
+                        <m:endChr m:val=")"/>
+                        <m:sepChr m:val=""/>
+                        <m:grow/>
+                      </m:dPr>
+                      <m:e>
+                        <m:r>
+                          <m:t>k</m:t>
+                        </m:r>
+                        <m:r>
+                          <m:rPr>
+                            <m:sty m:val="p"/>
+                          </m:rPr>
+                          <m:t>&lt;</m:t>
+                        </m:r>
+                        <m:r>
+                          <m:t>n</m:t>
+                        </m:r>
+                      </m:e>
+                    </m:d>
+                  </m:oMath>
+                </a14:m>
+              </a:p>
+              <a:p>
+                <a:pPr lvl="0"/>
+                <a:r>
+                  <a:rPr b="1"/>
+                  <a:t>General case:</a:t>
+                </a:r>
+                <a:r>
+                  <a:rPr/>
+                  <a:t> Based on the inductive hypothesis, prove that the alg. is correct for any input of size n</a:t>
+                </a:r>
+              </a:p>
+            </p:txBody>
+          </p:sp>
+        </mc:Choice>
+      </mc:AlternateContent>
+    </p:spTree>
+  </p:cSld>
+</p:sld>
+</file>
+
+<file path=ppt/slides/slide81.xml><?xml version="1.0" encoding="utf-8"?>
+<p:sld xmlns:a="http://schemas.openxmlformats.org/drawingml/2006/main" xmlns:r="http://schemas.openxmlformats.org/officeDocument/2006/relationships" xmlns:p="http://schemas.openxmlformats.org/presentationml/2006/main">
+  <p:cSld>
+    <p:spTree>
+      <p:nvGrpSpPr>
+        <p:cNvPr id="1" name=""/>
+        <p:cNvGrpSpPr/>
+        <p:nvPr/>
+      </p:nvGrpSpPr>
+      <p:grpSpPr>
+        <a:xfrm>
+          <a:off x="0" y="0"/>
+          <a:ext cx="0" cy="0"/>
+          <a:chOff x="0" y="0"/>
+          <a:chExt cx="0" cy="0"/>
+        </a:xfrm>
+      </p:grpSpPr>
+      <p:sp>
+        <p:nvSpPr>
+          <p:cNvPr id="2" name="Title 1"/>
+          <p:cNvSpPr>
+            <a:spLocks noGrp="1"/>
+          </p:cNvSpPr>
+          <p:nvPr>
+            <p:ph type="title"/>
+          </p:nvPr>
+        </p:nvSpPr>
+        <p:spPr/>
+        <p:txBody>
+          <a:bodyPr/>
+          <a:lstStyle/>
+          <a:p>
+            <a:pPr lvl="0" indent="0" marL="0">
+              <a:buNone/>
+            </a:pPr>
+            <a:r>
+              <a:rPr/>
+              <a:t>Example Correctness Proof: Powering a Number</a:t>
+            </a:r>
+          </a:p>
+        </p:txBody>
+      </p:sp>
+      <mc:AlternateContent xmlns:mc="http://schemas.openxmlformats.org/markup-compatibility/2006">
+        <mc:Choice xmlns:a14="http://schemas.microsoft.com/office/drawing/2010/main" Requires="a14">
+          <p:sp>
+            <p:nvSpPr>
+              <p:cNvPr id="3" name="Content Placeholder 2"/>
+              <p:cNvSpPr>
+                <a:spLocks noGrp="1"/>
+              </p:cNvSpPr>
+              <p:nvPr>
+                <p:ph idx="1"/>
+              </p:nvPr>
+            </p:nvSpPr>
+            <p:spPr/>
+            <p:txBody>
+              <a:bodyPr/>
+              <a:lstStyle/>
+              <a:p>
+                <a:pPr lvl="0"/>
+                <a:r>
+                  <a:rPr b="1"/>
+                  <a:t>Base Case:</a:t>
+                </a:r>
+                <a:r>
+                  <a:rPr/>
+                  <a:t> </a:t>
+                </a:r>
+                <a14:m>
+                  <m:oMath xmlns:m="http://schemas.openxmlformats.org/officeDocument/2006/math">
+                    <m:r>
+                      <m:t>P</m:t>
+                    </m:r>
+                    <m:r>
+                      <m:t>O</m:t>
+                    </m:r>
+                    <m:r>
+                      <m:t>W</m:t>
+                    </m:r>
+                    <m:r>
+                      <m:t>E</m:t>
+                    </m:r>
+                    <m:r>
+                      <m:t>R</m:t>
+                    </m:r>
+                    <m:d>
+                      <m:dPr>
+                        <m:begChr m:val="("/>
+                        <m:endChr m:val=")"/>
+                        <m:sepChr m:val=""/>
+                        <m:grow/>
+                      </m:dPr>
+                      <m:e>
+                        <m:r>
+                          <m:t>a</m:t>
+                        </m:r>
+                        <m:r>
+                          <m:rPr>
+                            <m:sty m:val="p"/>
+                          </m:rPr>
+                          <m:t>,</m:t>
+                        </m:r>
+                        <m:r>
+                          <m:t>0</m:t>
+                        </m:r>
+                      </m:e>
+                    </m:d>
+                  </m:oMath>
+                </a14:m>
+                <a:r>
+                  <a:rPr/>
+                  <a:t> is correct, because it returns </a:t>
+                </a:r>
+                <a14:m>
+                  <m:oMath xmlns:m="http://schemas.openxmlformats.org/officeDocument/2006/math">
+                    <m:r>
+                      <m:t>1</m:t>
+                    </m:r>
+                  </m:oMath>
+                </a14:m>
+              </a:p>
+              <a:p>
+                <a:pPr lvl="0"/>
+                <a:r>
+                  <a:rPr b="1"/>
+                  <a:t>Ind. Hyp:</a:t>
+                </a:r>
+                <a:r>
+                  <a:rPr/>
+                  <a:t> Assume </a:t>
+                </a:r>
+                <a14:m>
+                  <m:oMath xmlns:m="http://schemas.openxmlformats.org/officeDocument/2006/math">
+                    <m:r>
+                      <m:t>P</m:t>
+                    </m:r>
+                    <m:r>
+                      <m:t>O</m:t>
+                    </m:r>
+                    <m:r>
+                      <m:t>W</m:t>
+                    </m:r>
+                    <m:r>
+                      <m:t>E</m:t>
+                    </m:r>
+                    <m:r>
+                      <m:t>R</m:t>
+                    </m:r>
+                    <m:d>
+                      <m:dPr>
+                        <m:begChr m:val="("/>
+                        <m:endChr m:val=")"/>
+                        <m:sepChr m:val=""/>
+                        <m:grow/>
+                      </m:dPr>
+                      <m:e>
+                        <m:r>
+                          <m:t>a</m:t>
+                        </m:r>
+                        <m:r>
+                          <m:rPr>
+                            <m:sty m:val="p"/>
+                          </m:rPr>
+                          <m:t>,</m:t>
+                        </m:r>
+                        <m:r>
+                          <m:t>k</m:t>
+                        </m:r>
+                      </m:e>
+                    </m:d>
+                  </m:oMath>
+                </a14:m>
+                <a:r>
+                  <a:rPr/>
+                  <a:t> is correct for any </a:t>
+                </a:r>
+                <a14:m>
+                  <m:oMath xmlns:m="http://schemas.openxmlformats.org/officeDocument/2006/math">
+                    <m:r>
+                      <m:t>k</m:t>
+                    </m:r>
+                    <m:r>
+                      <m:rPr>
+                        <m:sty m:val="p"/>
+                      </m:rPr>
+                      <m:t>&lt;</m:t>
+                    </m:r>
+                    <m:r>
+                      <m:t>n</m:t>
+                    </m:r>
+                  </m:oMath>
+                </a14:m>
+              </a:p>
+              <a:p>
+                <a:pPr lvl="0"/>
+                <a:r>
+                  <a:rPr b="1"/>
+                  <a:t>General Case:</a:t>
+                </a:r>
+              </a:p>
+              <a:p>
+                <a:pPr lvl="1"/>
+                <a:r>
+                  <a:rPr/>
+                  <a:t>In </a:t>
+                </a:r>
+                <a14:m>
+                  <m:oMath xmlns:m="http://schemas.openxmlformats.org/officeDocument/2006/math">
+                    <m:r>
+                      <m:t>P</m:t>
+                    </m:r>
+                    <m:r>
+                      <m:t>O</m:t>
+                    </m:r>
+                    <m:r>
+                      <m:t>W</m:t>
+                    </m:r>
+                    <m:r>
+                      <m:t>E</m:t>
+                    </m:r>
+                    <m:r>
+                      <m:t>R</m:t>
+                    </m:r>
+                    <m:d>
+                      <m:dPr>
+                        <m:begChr m:val="("/>
+                        <m:endChr m:val=")"/>
+                        <m:sepChr m:val=""/>
+                        <m:grow/>
+                      </m:dPr>
+                      <m:e>
+                        <m:r>
+                          <m:t>a</m:t>
+                        </m:r>
+                        <m:r>
+                          <m:rPr>
+                            <m:sty m:val="p"/>
+                          </m:rPr>
+                          <m:t>,</m:t>
+                        </m:r>
+                        <m:r>
+                          <m:t>n</m:t>
+                        </m:r>
+                      </m:e>
+                    </m:d>
+                  </m:oMath>
+                </a14:m>
+                <a:r>
+                  <a:rPr/>
+                  <a:t> function:</a:t>
+                </a:r>
+              </a:p>
+              <a:p>
+                <a:pPr lvl="2"/>
+                <a:r>
+                  <a:rPr/>
+                  <a:t>If </a:t>
+                </a:r>
+                <a14:m>
+                  <m:oMath xmlns:m="http://schemas.openxmlformats.org/officeDocument/2006/math">
+                    <m:r>
+                      <m:t>n</m:t>
+                    </m:r>
+                  </m:oMath>
+                </a14:m>
+                <a:r>
+                  <a:rPr/>
+                  <a:t> is </a:t>
+                </a:r>
+                <a14:m>
+                  <m:oMath xmlns:m="http://schemas.openxmlformats.org/officeDocument/2006/math">
+                    <m:r>
+                      <m:t>e</m:t>
+                    </m:r>
+                    <m:r>
+                      <m:t>v</m:t>
+                    </m:r>
+                    <m:r>
+                      <m:t>e</m:t>
+                    </m:r>
+                    <m:r>
+                      <m:t>n</m:t>
+                    </m:r>
+                  </m:oMath>
+                </a14:m>
+                <a:r>
+                  <a:rPr/>
+                  <a:t>:</a:t>
+                </a:r>
+              </a:p>
+              <a:p>
+                <a:pPr lvl="3"/>
+                <a14:m>
+                  <m:oMath xmlns:m="http://schemas.openxmlformats.org/officeDocument/2006/math">
+                    <m:r>
+                      <m:t>v</m:t>
+                    </m:r>
+                    <m:r>
+                      <m:t>a</m:t>
+                    </m:r>
+                    <m:r>
+                      <m:t>l</m:t>
+                    </m:r>
+                    <m:r>
+                      <m:rPr>
+                        <m:sty m:val="p"/>
+                      </m:rPr>
+                      <m:t>=</m:t>
+                    </m:r>
+                    <m:sSup>
+                      <m:e>
+                        <m:r>
+                          <m:t>a</m:t>
+                        </m:r>
+                      </m:e>
+                      <m:sup>
+                        <m:r>
+                          <m:t>n</m:t>
+                        </m:r>
+                        <m:r>
+                          <m:rPr>
+                            <m:sty m:val="p"/>
+                          </m:rPr>
+                          <m:t>/</m:t>
+                        </m:r>
+                        <m:r>
+                          <m:t>2</m:t>
+                        </m:r>
+                      </m:sup>
+                    </m:sSup>
+                  </m:oMath>
+                </a14:m>
+                <a:r>
+                  <a:rPr/>
+                  <a:t> (due to ind. hyp.)</a:t>
+                </a:r>
+              </a:p>
+              <a:p>
+                <a:pPr lvl="3"/>
+                <a:r>
+                  <a:rPr/>
+                  <a:t>it returns </a:t>
+                </a:r>
+                <a14:m>
+                  <m:oMath xmlns:m="http://schemas.openxmlformats.org/officeDocument/2006/math">
+                    <m:r>
+                      <m:t>v</m:t>
+                    </m:r>
+                    <m:r>
+                      <m:t>a</m:t>
+                    </m:r>
+                    <m:r>
+                      <m:t>l</m:t>
+                    </m:r>
+                    <m:r>
+                      <m:rPr>
+                        <m:sty m:val="p"/>
+                      </m:rPr>
+                      <m:t>*</m:t>
+                    </m:r>
+                    <m:r>
+                      <m:t>v</m:t>
+                    </m:r>
+                    <m:r>
+                      <m:t>a</m:t>
+                    </m:r>
+                    <m:r>
+                      <m:t>l</m:t>
+                    </m:r>
+                    <m:r>
+                      <m:rPr>
+                        <m:sty m:val="p"/>
+                      </m:rPr>
+                      <m:t>=</m:t>
+                    </m:r>
+                    <m:sSup>
+                      <m:e>
+                        <m:r>
+                          <m:t>a</m:t>
+                        </m:r>
+                      </m:e>
+                      <m:sup>
+                        <m:r>
+                          <m:t>n</m:t>
+                        </m:r>
+                      </m:sup>
+                    </m:sSup>
+                  </m:oMath>
+                </a14:m>
+              </a:p>
+              <a:p>
+                <a:pPr lvl="2"/>
+                <a:r>
+                  <a:rPr/>
+                  <a:t>If </a:t>
+                </a:r>
+                <a14:m>
+                  <m:oMath xmlns:m="http://schemas.openxmlformats.org/officeDocument/2006/math">
+                    <m:r>
+                      <m:t>n</m:t>
+                    </m:r>
+                  </m:oMath>
+                </a14:m>
+                <a:r>
+                  <a:rPr/>
+                  <a:t> is </a:t>
+                </a:r>
+                <a14:m>
+                  <m:oMath xmlns:m="http://schemas.openxmlformats.org/officeDocument/2006/math">
+                    <m:r>
+                      <m:t>o</m:t>
+                    </m:r>
+                    <m:r>
+                      <m:t>d</m:t>
+                    </m:r>
+                    <m:r>
+                      <m:t>d</m:t>
+                    </m:r>
+                  </m:oMath>
+                </a14:m>
+                <a:r>
+                  <a:rPr/>
+                  <a:t>:</a:t>
+                </a:r>
+              </a:p>
+              <a:p>
+                <a:pPr lvl="3"/>
+                <a14:m>
+                  <m:oMath xmlns:m="http://schemas.openxmlformats.org/officeDocument/2006/math">
+                    <m:r>
+                      <m:t>v</m:t>
+                    </m:r>
+                    <m:r>
+                      <m:t>a</m:t>
+                    </m:r>
+                    <m:r>
+                      <m:t>l</m:t>
+                    </m:r>
+                    <m:r>
+                      <m:rPr>
+                        <m:sty m:val="p"/>
+                      </m:rPr>
+                      <m:t>=</m:t>
+                    </m:r>
+                    <m:sSup>
+                      <m:e>
+                        <m:r>
+                          <m:t>a</m:t>
+                        </m:r>
+                      </m:e>
+                      <m:sup>
+                        <m:d>
+                          <m:dPr>
+                            <m:begChr m:val="("/>
+                            <m:endChr m:val=")"/>
+                            <m:sepChr m:val=""/>
+                            <m:grow/>
+                          </m:dPr>
+                          <m:e>
+                            <m:r>
+                              <m:t>n</m:t>
+                            </m:r>
+                            <m:r>
+                              <m:rPr>
+                                <m:sty m:val="p"/>
+                              </m:rPr>
+                              <m:t>−</m:t>
+                            </m:r>
+                            <m:r>
+                              <m:t>1</m:t>
+                            </m:r>
+                          </m:e>
+                        </m:d>
+                        <m:r>
+                          <m:rPr>
+                            <m:sty m:val="p"/>
+                          </m:rPr>
+                          <m:t>/</m:t>
+                        </m:r>
+                        <m:r>
+                          <m:t>2</m:t>
+                        </m:r>
+                      </m:sup>
+                    </m:sSup>
+                  </m:oMath>
+                </a14:m>
+                <a:r>
+                  <a:rPr/>
+                  <a:t> (due to ind. hyp.)</a:t>
+                </a:r>
+              </a:p>
+              <a:p>
+                <a:pPr lvl="3"/>
+                <a:r>
+                  <a:rPr/>
+                  <a:t>it returns </a:t>
+                </a:r>
+                <a14:m>
+                  <m:oMath xmlns:m="http://schemas.openxmlformats.org/officeDocument/2006/math">
+                    <m:r>
+                      <m:t>v</m:t>
+                    </m:r>
+                    <m:r>
+                      <m:t>a</m:t>
+                    </m:r>
+                    <m:r>
+                      <m:t>l</m:t>
+                    </m:r>
+                    <m:r>
+                      <m:rPr>
+                        <m:sty m:val="p"/>
+                      </m:rPr>
+                      <m:t>*</m:t>
+                    </m:r>
+                    <m:r>
+                      <m:t>v</m:t>
+                    </m:r>
+                    <m:r>
+                      <m:t>a</m:t>
+                    </m:r>
+                    <m:r>
+                      <m:t>l</m:t>
+                    </m:r>
+                    <m:r>
+                      <m:rPr>
+                        <m:sty m:val="p"/>
+                      </m:rPr>
+                      <m:t>*</m:t>
+                    </m:r>
+                    <m:r>
+                      <m:t>a</m:t>
+                    </m:r>
+                    <m:r>
+                      <m:rPr>
+                        <m:sty m:val="p"/>
+                      </m:rPr>
+                      <m:t>=</m:t>
+                    </m:r>
+                    <m:sSup>
+                      <m:e>
+                        <m:r>
+                          <m:t>a</m:t>
+                        </m:r>
+                      </m:e>
+                      <m:sup>
+                        <m:r>
+                          <m:t>n</m:t>
+                        </m:r>
+                      </m:sup>
+                    </m:sSup>
+                  </m:oMath>
+                </a14:m>
+              </a:p>
+              <a:p>
+                <a:pPr lvl="0"/>
+                <a:r>
+                  <a:rPr/>
+                  <a:t>The correctness proof is complete</a:t>
+                </a:r>
+              </a:p>
+            </p:txBody>
+          </p:sp>
+        </mc:Choice>
+      </mc:AlternateContent>
+    </p:spTree>
+  </p:cSld>
+</p:sld>
+</file>
+
+<file path=ppt/slides/slide82.xml><?xml version="1.0" encoding="utf-8"?>
+<p:sld xmlns:a="http://schemas.openxmlformats.org/drawingml/2006/main" xmlns:r="http://schemas.openxmlformats.org/officeDocument/2006/relationships" xmlns:p="http://schemas.openxmlformats.org/presentationml/2006/main">
+  <p:cSld>
+    <p:spTree>
+      <p:nvGrpSpPr>
+        <p:cNvPr id="1" name=""/>
+        <p:cNvGrpSpPr/>
+        <p:nvPr/>
+      </p:nvGrpSpPr>
+      <p:grpSpPr>
+        <a:xfrm>
+          <a:off x="0" y="0"/>
+          <a:ext cx="0" cy="0"/>
+          <a:chOff x="0" y="0"/>
+          <a:chExt cx="0" cy="0"/>
+        </a:xfrm>
+      </p:grpSpPr>
+      <p:sp>
+        <p:nvSpPr>
+          <p:cNvPr id="2" name="Title 1"/>
+          <p:cNvSpPr>
+            <a:spLocks noGrp="1"/>
+          </p:cNvSpPr>
+          <p:nvPr>
+            <p:ph type="title"/>
+          </p:nvPr>
+        </p:nvSpPr>
+        <p:spPr/>
+        <p:txBody>
+          <a:bodyPr/>
+          <a:lstStyle/>
+          <a:p>
+            <a:pPr lvl="0" indent="0" marL="0">
+              <a:buNone/>
+            </a:pPr>
+            <a:r>
+              <a:rPr/>
               <a:t>References</a:t>
             </a:r>
           </a:p>
@@ -28826,7 +29545,7 @@
 </p:sld>
 </file>
 
-<file path=ppt/slides/slide81.xml><?xml version="1.0" encoding="utf-8"?>
+<file path=ppt/slides/slide83.xml><?xml version="1.0" encoding="utf-8"?>
 <p:sld xmlns:a="http://schemas.openxmlformats.org/drawingml/2006/main" xmlns:r="http://schemas.openxmlformats.org/officeDocument/2006/relationships" xmlns:p="http://schemas.openxmlformats.org/presentationml/2006/main">
   <p:cSld>
     <p:spTree>

</xml_diff>

<commit_message>
Deployed 0c6b717 with MkDocs version: 1.2.3
</commit_message>
<xml_diff>
--- a/week-2/ce100-week-2-recurrence.md_word.pptx
+++ b/week-2/ce100-week-2-recurrence.md_word.pptx
@@ -87,7 +87,6 @@
     <p:sldId id="335" r:id="rId81"/>
     <p:sldId id="336" r:id="rId82"/>
     <p:sldId id="337" r:id="rId83"/>
-    <p:sldId id="338" r:id="rId84"/>
   </p:sldIdLst>
   <p:sldSz cx="9144000" cy="6858000" type="screen4x3"/>
   <p:notesSz cx="6858000" cy="9144000"/>
@@ -7479,7 +7478,7 @@
                   <a:rPr/>
                   <a:t>$$
 T(n) = 4T(n/2) + n  \\
-≤ 4c(n/2)^2 + n \\
+\leq 4c(n/2)^2 + n \\
 = cn^2 + n \\
 = O(n2)  \Longleftarrow  \text{ Wrong! We must prove exactly}
 $$</a:t>
@@ -29540,42 +29539,40 @@
           </a:p>
         </p:txBody>
       </p:sp>
-    </p:spTree>
-  </p:cSld>
-</p:sld>
-</file>
-
-<file path=ppt/slides/slide83.xml><?xml version="1.0" encoding="utf-8"?>
-<p:sld xmlns:a="http://schemas.openxmlformats.org/drawingml/2006/main" xmlns:r="http://schemas.openxmlformats.org/officeDocument/2006/relationships" xmlns:p="http://schemas.openxmlformats.org/presentationml/2006/main">
-  <p:cSld>
-    <p:spTree>
-      <p:nvGrpSpPr>
-        <p:cNvPr id="1" name=""/>
-        <p:cNvGrpSpPr/>
-        <p:nvPr/>
-      </p:nvGrpSpPr>
-      <p:grpSpPr>
-        <a:xfrm>
-          <a:off x="0" y="0"/>
-          <a:ext cx="0" cy="0"/>
-          <a:chOff x="0" y="0"/>
-          <a:chExt cx="0" cy="0"/>
-        </a:xfrm>
-      </p:grpSpPr>
       <p:sp>
         <p:nvSpPr>
-          <p:cNvPr id="2" name="Title 1"/>
+          <p:cNvPr id="3" name="Content Placeholder 2"/>
           <p:cNvSpPr>
             <a:spLocks noGrp="1"/>
           </p:cNvSpPr>
           <p:nvPr>
-            <p:ph type="title"/>
+            <p:ph idx="1"/>
           </p:nvPr>
         </p:nvSpPr>
         <p:spPr/>
         <p:txBody>
           <a:bodyPr/>
           <a:lstStyle/>
+          <a:p>
+            <a:pPr lvl="0" indent="0" marL="0">
+              <a:buNone/>
+            </a:pPr>
+            <a:r>
+              <a:rPr>
+                <a:hlinkClick r:id="rId2"/>
+              </a:rPr>
+              <a:t>Introduction to Algorithms, Third Edition | The MIT Press</a:t>
+            </a:r>
+          </a:p>
+          <a:p>
+            <a:pPr lvl="0" indent="0" marL="0">
+              <a:buNone/>
+            </a:pPr>
+            <a:r>
+              <a:rPr/>
+              <a:t>http://nabil.abubaker.bilkent.edu.tr/473/</a:t>
+            </a:r>
+          </a:p>
           <a:p>
             <a:pPr lvl="0" indent="0" marL="0">
               <a:buNone/>

</xml_diff>

<commit_message>
Deployed 7fb62ce with MkDocs version: 1.2.3
</commit_message>
<xml_diff>
--- a/week-2/ce100-week-2-recurrence.md_word.pptx
+++ b/week-2/ce100-week-2-recurrence.md_word.pptx
@@ -29554,9 +29554,7 @@
           <a:bodyPr/>
           <a:lstStyle/>
           <a:p>
-            <a:pPr lvl="0" indent="0" marL="0">
-              <a:buNone/>
-            </a:pPr>
+            <a:pPr lvl="0"/>
             <a:r>
               <a:rPr>
                 <a:hlinkClick r:id="rId2"/>
@@ -29565,21 +29563,66 @@
             </a:r>
           </a:p>
           <a:p>
-            <a:pPr lvl="0" indent="0" marL="0">
-              <a:buNone/>
-            </a:pPr>
-            <a:r>
-              <a:rPr/>
-              <a:t>http://nabil.abubaker.bilkent.edu.tr/473/</a:t>
+            <a:pPr lvl="0"/>
+            <a:r>
+              <a:rPr>
+                <a:hlinkClick r:id="rId3"/>
+              </a:rPr>
+              <a:t>Bilkent CS473 Course Notes (new)</a:t>
             </a:r>
           </a:p>
           <a:p>
-            <a:pPr lvl="0" indent="0" marL="0">
-              <a:buNone/>
-            </a:pPr>
-            <a:r>
-              <a:rPr/>
-              <a:t>TODO</a:t>
+            <a:pPr lvl="0"/>
+            <a:r>
+              <a:rPr>
+                <a:hlinkClick r:id="rId4"/>
+              </a:rPr>
+              <a:t>Bilkent CS473 Course Notes (old)</a:t>
+            </a:r>
+          </a:p>
+          <a:p>
+            <a:pPr lvl="0"/>
+            <a:r>
+              <a:rPr>
+                <a:hlinkClick r:id="rId5"/>
+              </a:rPr>
+              <a:t>Insertion Sort - GeeksforGeeks</a:t>
+            </a:r>
+          </a:p>
+          <a:p>
+            <a:pPr lvl="0"/>
+            <a:r>
+              <a:rPr>
+                <a:hlinkClick r:id="rId6"/>
+              </a:rPr>
+              <a:t>NIST Dictionary of Algorithms and Data Structures</a:t>
+            </a:r>
+          </a:p>
+          <a:p>
+            <a:pPr lvl="0"/>
+            <a:r>
+              <a:rPr>
+                <a:hlinkClick r:id="rId7"/>
+              </a:rPr>
+              <a:t>NIST - Dictionary of Algorithms and Data Structures</a:t>
+            </a:r>
+          </a:p>
+          <a:p>
+            <a:pPr lvl="0"/>
+            <a:r>
+              <a:rPr>
+                <a:hlinkClick r:id="rId8"/>
+              </a:rPr>
+              <a:t>NIST - big-O notation</a:t>
+            </a:r>
+          </a:p>
+          <a:p>
+            <a:pPr lvl="0"/>
+            <a:r>
+              <a:rPr>
+                <a:hlinkClick r:id="rId9"/>
+              </a:rPr>
+              <a:t>NIST - big-Omega notation</a:t>
             </a:r>
           </a:p>
         </p:txBody>

</xml_diff>

<commit_message>
Deployed 134cbe4 with MkDocs version: 1.2.3
</commit_message>
<xml_diff>
--- a/week-2/ce100-week-2-recurrence.md_word.pptx
+++ b/week-2/ce100-week-2-recurrence.md_word.pptx
@@ -3408,9 +3408,6 @@
                             <m:mr>
                               <m:e>
                                 <m:r>
-                                  <m:t> </m:t>
-                                </m:r>
-                                <m:r>
                                   <m:t>1</m:t>
                                 </m:r>
                               </m:e>
@@ -3644,9 +3641,6 @@
                             <m:mr>
                               <m:e>
                                 <m:r>
-                                  <m:t> </m:t>
-                                </m:r>
-                                <m:r>
                                   <m:t>1</m:t>
                                 </m:r>
                               </m:e>
@@ -3908,9 +3902,6 @@
                             <m:mr>
                               <m:e>
                                 <m:r>
-                                  <m:t> </m:t>
-                                </m:r>
-                                <m:r>
                                   <m:t>Θ</m:t>
                                 </m:r>
                                 <m:d>
@@ -4772,16 +4763,286 @@
                 <a:pPr lvl="0" indent="0" marL="0">
                   <a:buNone/>
                 </a:pPr>
-                <a:r>
-                  <a:rPr/>
-                  <a:t>$$
-\begin{rcases}
-  T(1)= 2 &amp;\Rightarrow &amp; T(n)= \Theta(2^n) \\
-  T(1)= 3 &amp;\Rightarrow &amp; T(n)= \Theta(3^n)
-\end{rcases}
-\text{ However } \Theta(2^n) \neq \Theta(3^n)
-$$</a:t>
-                </a:r>
+                <a14:m>
+                  <m:oMathPara xmlns:m="http://schemas.openxmlformats.org/officeDocument/2006/math">
+                    <m:oMathParaPr>
+                      <m:jc m:val="center"/>
+                    </m:oMathParaPr>
+                    <m:oMath>
+                      <m:r>
+                        <m:rPr>
+                          <m:nor/>
+                          <m:sty m:val="p"/>
+                        </m:rPr>
+                        <m:t> However </m:t>
+                      </m:r>
+                      <m:r>
+                        <m:t>Θ</m:t>
+                      </m:r>
+                      <m:d>
+                        <m:dPr>
+                          <m:begChr m:val="("/>
+                          <m:endChr m:val=")"/>
+                          <m:sepChr m:val=""/>
+                          <m:grow/>
+                        </m:dPr>
+                        <m:e>
+                          <m:sSup>
+                            <m:e>
+                              <m:r>
+                                <m:t>2</m:t>
+                              </m:r>
+                            </m:e>
+                            <m:sup>
+                              <m:r>
+                                <m:t>n</m:t>
+                              </m:r>
+                            </m:sup>
+                          </m:sSup>
+                        </m:e>
+                      </m:d>
+                      <m:r>
+                        <m:rPr>
+                          <m:sty m:val="p"/>
+                        </m:rPr>
+                        <m:t>≠</m:t>
+                      </m:r>
+                      <m:r>
+                        <m:t>Θ</m:t>
+                      </m:r>
+                      <m:d>
+                        <m:dPr>
+                          <m:begChr m:val="("/>
+                          <m:endChr m:val=")"/>
+                          <m:sepChr m:val=""/>
+                          <m:grow/>
+                        </m:dPr>
+                        <m:e>
+                          <m:sSup>
+                            <m:e>
+                              <m:r>
+                                <m:t>3</m:t>
+                              </m:r>
+                            </m:e>
+                            <m:sup>
+                              <m:r>
+                                <m:t>n</m:t>
+                              </m:r>
+                            </m:sup>
+                          </m:sSup>
+                        </m:e>
+                      </m:d>
+                      <m:d>
+                        <m:dPr>
+                          <m:begChr m:val="{"/>
+                          <m:endChr m:val=""/>
+                          <m:sepChr m:val=""/>
+                          <m:grow/>
+                        </m:dPr>
+                        <m:e>
+                          <m:m>
+                            <m:mPr>
+                              <m:baseJc m:val="center"/>
+                              <m:plcHide m:val="1"/>
+                              <m:mcs>
+                                <m:mc>
+                                  <m:mcPr>
+                                    <m:mcJc m:val="left"/>
+                                    <m:count m:val="1"/>
+                                  </m:mcPr>
+                                </m:mc>
+                                <m:mc>
+                                  <m:mcPr>
+                                    <m:mcJc m:val="left"/>
+                                    <m:count m:val="1"/>
+                                  </m:mcPr>
+                                </m:mc>
+                                <m:mc>
+                                  <m:mcPr>
+                                    <m:mcJc m:val="left"/>
+                                    <m:count m:val="1"/>
+                                  </m:mcPr>
+                                </m:mc>
+                              </m:mcs>
+                            </m:mPr>
+                            <m:mr>
+                              <m:e>
+                                <m:r>
+                                  <m:t>T</m:t>
+                                </m:r>
+                                <m:d>
+                                  <m:dPr>
+                                    <m:begChr m:val="("/>
+                                    <m:endChr m:val=")"/>
+                                    <m:sepChr m:val=""/>
+                                    <m:grow/>
+                                  </m:dPr>
+                                  <m:e>
+                                    <m:r>
+                                      <m:t>1</m:t>
+                                    </m:r>
+                                  </m:e>
+                                </m:d>
+                                <m:r>
+                                  <m:rPr>
+                                    <m:sty m:val="p"/>
+                                  </m:rPr>
+                                  <m:t>=</m:t>
+                                </m:r>
+                                <m:r>
+                                  <m:t>2</m:t>
+                                </m:r>
+                              </m:e>
+                              <m:e>
+                                <m:r>
+                                  <m:rPr>
+                                    <m:sty m:val="p"/>
+                                  </m:rPr>
+                                  <m:t>⇒</m:t>
+                                </m:r>
+                              </m:e>
+                              <m:e>
+                                <m:r>
+                                  <m:t>T</m:t>
+                                </m:r>
+                                <m:d>
+                                  <m:dPr>
+                                    <m:begChr m:val="("/>
+                                    <m:endChr m:val=")"/>
+                                    <m:sepChr m:val=""/>
+                                    <m:grow/>
+                                  </m:dPr>
+                                  <m:e>
+                                    <m:r>
+                                      <m:t>n</m:t>
+                                    </m:r>
+                                  </m:e>
+                                </m:d>
+                                <m:r>
+                                  <m:rPr>
+                                    <m:sty m:val="p"/>
+                                  </m:rPr>
+                                  <m:t>=</m:t>
+                                </m:r>
+                                <m:r>
+                                  <m:t>Θ</m:t>
+                                </m:r>
+                                <m:d>
+                                  <m:dPr>
+                                    <m:begChr m:val="("/>
+                                    <m:endChr m:val=")"/>
+                                    <m:sepChr m:val=""/>
+                                    <m:grow/>
+                                  </m:dPr>
+                                  <m:e>
+                                    <m:sSup>
+                                      <m:e>
+                                        <m:r>
+                                          <m:t>2</m:t>
+                                        </m:r>
+                                      </m:e>
+                                      <m:sup>
+                                        <m:r>
+                                          <m:t>n</m:t>
+                                        </m:r>
+                                      </m:sup>
+                                    </m:sSup>
+                                  </m:e>
+                                </m:d>
+                              </m:e>
+                            </m:mr>
+                            <m:mr>
+                              <m:e>
+                                <m:r>
+                                  <m:t>T</m:t>
+                                </m:r>
+                                <m:d>
+                                  <m:dPr>
+                                    <m:begChr m:val="("/>
+                                    <m:endChr m:val=")"/>
+                                    <m:sepChr m:val=""/>
+                                    <m:grow/>
+                                  </m:dPr>
+                                  <m:e>
+                                    <m:r>
+                                      <m:t>1</m:t>
+                                    </m:r>
+                                  </m:e>
+                                </m:d>
+                                <m:r>
+                                  <m:rPr>
+                                    <m:sty m:val="p"/>
+                                  </m:rPr>
+                                  <m:t>=</m:t>
+                                </m:r>
+                                <m:r>
+                                  <m:t>3</m:t>
+                                </m:r>
+                              </m:e>
+                              <m:e>
+                                <m:r>
+                                  <m:rPr>
+                                    <m:sty m:val="p"/>
+                                  </m:rPr>
+                                  <m:t>⇒</m:t>
+                                </m:r>
+                              </m:e>
+                              <m:e>
+                                <m:r>
+                                  <m:t>T</m:t>
+                                </m:r>
+                                <m:d>
+                                  <m:dPr>
+                                    <m:begChr m:val="("/>
+                                    <m:endChr m:val=")"/>
+                                    <m:sepChr m:val=""/>
+                                    <m:grow/>
+                                  </m:dPr>
+                                  <m:e>
+                                    <m:r>
+                                      <m:t>n</m:t>
+                                    </m:r>
+                                  </m:e>
+                                </m:d>
+                                <m:r>
+                                  <m:rPr>
+                                    <m:sty m:val="p"/>
+                                  </m:rPr>
+                                  <m:t>=</m:t>
+                                </m:r>
+                                <m:r>
+                                  <m:t>Θ</m:t>
+                                </m:r>
+                                <m:d>
+                                  <m:dPr>
+                                    <m:begChr m:val="("/>
+                                    <m:endChr m:val=")"/>
+                                    <m:sepChr m:val=""/>
+                                    <m:grow/>
+                                  </m:dPr>
+                                  <m:e>
+                                    <m:sSup>
+                                      <m:e>
+                                        <m:r>
+                                          <m:t>3</m:t>
+                                        </m:r>
+                                      </m:e>
+                                      <m:sup>
+                                        <m:r>
+                                          <m:t>n</m:t>
+                                        </m:r>
+                                      </m:sup>
+                                    </m:sSup>
+                                  </m:e>
+                                </m:d>
+                              </m:e>
+                            </m:mr>
+                          </m:m>
+                        </m:e>
+                      </m:d>
+                    </m:oMath>
+                  </m:oMathPara>
+                </a14:m>
               </a:p>
               <a:p>
                 <a:pPr lvl="0" indent="0" marL="0">
@@ -4952,7 +5213,7 @@
             </a:pPr>
             <a:r>
               <a:rPr/>
-              <a:t>Solving Recurrences</a:t>
+              <a:t>Solving Recurrences Methods</a:t>
             </a:r>
           </a:p>
         </p:txBody>
@@ -5138,7 +5399,7 @@
             </a:pPr>
             <a:r>
               <a:rPr/>
-              <a:t>Substitution Method: Example</a:t>
+              <a:t>Substitution Method: Example (1)</a:t>
             </a:r>
           </a:p>
         </p:txBody>
@@ -5623,7 +5884,7 @@
             </a:pPr>
             <a:r>
               <a:rPr/>
-              <a:t>Substitution Method: Example – cont’d</a:t>
+              <a:t>Substitution Method: Example (2)</a:t>
             </a:r>
           </a:p>
         </p:txBody>
@@ -6183,7 +6444,7 @@
             </a:pPr>
             <a:r>
               <a:rPr/>
-              <a:t>Substitution Method: Example – cont’d</a:t>
+              <a:t>Substitution Method: Example (3)</a:t>
             </a:r>
           </a:p>
         </p:txBody>
@@ -6489,7 +6750,7 @@
             </a:pPr>
             <a:r>
               <a:rPr/>
-              <a:t>Substitution Method: Example – cont’d</a:t>
+              <a:t>Substitution Method: Example (4)</a:t>
             </a:r>
           </a:p>
         </p:txBody>
@@ -6867,7 +7128,7 @@
             </a:pPr>
             <a:r>
               <a:rPr/>
-              <a:t>Example: A tighter upper bound?</a:t>
+              <a:t>Example: A tighter upper bound? (1)</a:t>
             </a:r>
           </a:p>
         </p:txBody>
@@ -7267,7 +7528,7 @@
             </a:pPr>
             <a:r>
               <a:rPr/>
-              <a:t>Example (cont’d)</a:t>
+              <a:t>Example: A tighter upper bound? (2)</a:t>
             </a:r>
           </a:p>
         </p:txBody>
@@ -7474,15 +7735,235 @@
                 <a:pPr lvl="0" indent="0" marL="0">
                   <a:buNone/>
                 </a:pPr>
-                <a:r>
-                  <a:rPr/>
-                  <a:t>$$
-T(n) = 4T(n/2) + n  \\
-\leq 4c(n/2)^2 + n \\
-= cn^2 + n \\
-= O(n2)  \Longleftarrow  \text{ Wrong! We must prove exactly}
-$$</a:t>
-                </a:r>
+                <a14:m>
+                  <m:oMathPara xmlns:m="http://schemas.openxmlformats.org/officeDocument/2006/math">
+                    <m:oMathParaPr>
+                      <m:jc m:val="center"/>
+                    </m:oMathParaPr>
+                    <m:oMath>
+                      <m:m>
+                        <m:mPr>
+                          <m:baseJc m:val="center"/>
+                          <m:plcHide m:val="1"/>
+                          <m:mcs>
+                            <m:mc>
+                              <m:mcPr>
+                                <m:mcJc m:val="right"/>
+                                <m:count m:val="1"/>
+                              </m:mcPr>
+                            </m:mc>
+                            <m:mc>
+                              <m:mcPr>
+                                <m:mcJc m:val="left"/>
+                                <m:count m:val="1"/>
+                              </m:mcPr>
+                            </m:mc>
+                          </m:mcs>
+                        </m:mPr>
+                        <m:mr>
+                          <m:e>
+                            <m:r>
+                              <m:t>T</m:t>
+                            </m:r>
+                            <m:d>
+                              <m:dPr>
+                                <m:begChr m:val="("/>
+                                <m:endChr m:val=")"/>
+                                <m:sepChr m:val=""/>
+                                <m:grow/>
+                              </m:dPr>
+                              <m:e>
+                                <m:r>
+                                  <m:t>n</m:t>
+                                </m:r>
+                              </m:e>
+                            </m:d>
+                          </m:e>
+                          <m:e>
+                            <m:r>
+                              <m:rPr>
+                                <m:sty m:val="p"/>
+                              </m:rPr>
+                              <m:t>=</m:t>
+                            </m:r>
+                            <m:r>
+                              <m:t>4</m:t>
+                            </m:r>
+                            <m:r>
+                              <m:t>T</m:t>
+                            </m:r>
+                            <m:d>
+                              <m:dPr>
+                                <m:begChr m:val="("/>
+                                <m:endChr m:val=")"/>
+                                <m:sepChr m:val=""/>
+                                <m:grow/>
+                              </m:dPr>
+                              <m:e>
+                                <m:r>
+                                  <m:t>n</m:t>
+                                </m:r>
+                                <m:r>
+                                  <m:rPr>
+                                    <m:sty m:val="p"/>
+                                  </m:rPr>
+                                  <m:t>/</m:t>
+                                </m:r>
+                                <m:r>
+                                  <m:t>2</m:t>
+                                </m:r>
+                              </m:e>
+                            </m:d>
+                            <m:r>
+                              <m:rPr>
+                                <m:sty m:val="p"/>
+                              </m:rPr>
+                              <m:t>+</m:t>
+                            </m:r>
+                            <m:r>
+                              <m:t>n</m:t>
+                            </m:r>
+                          </m:e>
+                        </m:mr>
+                        <m:mr>
+                          <m:e/>
+                          <m:e>
+                            <m:r>
+                              <m:rPr>
+                                <m:sty m:val="p"/>
+                              </m:rPr>
+                              <m:t>≤</m:t>
+                            </m:r>
+                            <m:r>
+                              <m:t>4</m:t>
+                            </m:r>
+                            <m:r>
+                              <m:t>c</m:t>
+                            </m:r>
+                            <m:sSup>
+                              <m:e>
+                                <m:d>
+                                  <m:dPr>
+                                    <m:begChr m:val="("/>
+                                    <m:endChr m:val=")"/>
+                                    <m:sepChr m:val=""/>
+                                    <m:grow/>
+                                  </m:dPr>
+                                  <m:e>
+                                    <m:r>
+                                      <m:t>n</m:t>
+                                    </m:r>
+                                    <m:r>
+                                      <m:rPr>
+                                        <m:sty m:val="p"/>
+                                      </m:rPr>
+                                      <m:t>/</m:t>
+                                    </m:r>
+                                    <m:r>
+                                      <m:t>2</m:t>
+                                    </m:r>
+                                  </m:e>
+                                </m:d>
+                              </m:e>
+                              <m:sup>
+                                <m:r>
+                                  <m:t>2</m:t>
+                                </m:r>
+                              </m:sup>
+                            </m:sSup>
+                            <m:r>
+                              <m:rPr>
+                                <m:sty m:val="p"/>
+                              </m:rPr>
+                              <m:t>+</m:t>
+                            </m:r>
+                            <m:r>
+                              <m:t>n</m:t>
+                            </m:r>
+                          </m:e>
+                        </m:mr>
+                        <m:mr>
+                          <m:e/>
+                          <m:e>
+                            <m:r>
+                              <m:rPr>
+                                <m:sty m:val="p"/>
+                              </m:rPr>
+                              <m:t>=</m:t>
+                            </m:r>
+                            <m:r>
+                              <m:t>c</m:t>
+                            </m:r>
+                            <m:sSup>
+                              <m:e>
+                                <m:r>
+                                  <m:t>n</m:t>
+                                </m:r>
+                              </m:e>
+                              <m:sup>
+                                <m:r>
+                                  <m:t>2</m:t>
+                                </m:r>
+                              </m:sup>
+                            </m:sSup>
+                            <m:r>
+                              <m:rPr>
+                                <m:sty m:val="p"/>
+                              </m:rPr>
+                              <m:t>+</m:t>
+                            </m:r>
+                            <m:r>
+                              <m:t>n</m:t>
+                            </m:r>
+                          </m:e>
+                        </m:mr>
+                        <m:mr>
+                          <m:e/>
+                          <m:e>
+                            <m:r>
+                              <m:rPr>
+                                <m:sty m:val="p"/>
+                              </m:rPr>
+                              <m:t>=</m:t>
+                            </m:r>
+                            <m:r>
+                              <m:t>O</m:t>
+                            </m:r>
+                            <m:d>
+                              <m:dPr>
+                                <m:begChr m:val="("/>
+                                <m:endChr m:val=")"/>
+                                <m:sepChr m:val=""/>
+                                <m:grow/>
+                              </m:dPr>
+                              <m:e>
+                                <m:r>
+                                  <m:t>n</m:t>
+                                </m:r>
+                                <m:r>
+                                  <m:t>2</m:t>
+                                </m:r>
+                              </m:e>
+                            </m:d>
+                            <m:r>
+                              <m:rPr>
+                                <m:sty m:val="p"/>
+                              </m:rPr>
+                              <m:t>⇐</m:t>
+                            </m:r>
+                            <m:r>
+                              <m:rPr>
+                                <m:nor/>
+                                <m:sty m:val="p"/>
+                              </m:rPr>
+                              <m:t> Wrong! We must prove exactly</m:t>
+                            </m:r>
+                          </m:e>
+                        </m:mr>
+                      </m:m>
+                    </m:oMath>
+                  </m:oMathPara>
+                </a14:m>
               </a:p>
             </p:txBody>
           </p:sp>
@@ -7530,7 +8011,7 @@
             </a:pPr>
             <a:r>
               <a:rPr/>
-              <a:t>Example (cont’d)</a:t>
+              <a:t>Example: A tighter upper bound? (3)</a:t>
             </a:r>
           </a:p>
         </p:txBody>
@@ -7911,7 +8392,7 @@
             </a:pPr>
             <a:r>
               <a:rPr/>
-              <a:t>Example (cont’d)</a:t>
+              <a:t>Example: A tighter upper bound? (4)</a:t>
             </a:r>
           </a:p>
         </p:txBody>
@@ -8194,7 +8675,7 @@
             </a:pPr>
             <a:r>
               <a:rPr/>
-              <a:t>Example (cont’d)</a:t>
+              <a:t>Example: A tighter upper bound? (5)</a:t>
             </a:r>
           </a:p>
         </p:txBody>
@@ -8474,110 +8955,41 @@
                     </m:r>
                   </m:oMath>
                 </a14:m>
-                <a:r>
-                  <a:rPr/>
-                  <a:t> </a:t>
-                </a:r>
+              </a:p>
+              <a:p>
+                <a:pPr lvl="0" indent="0" marL="0">
+                  <a:buNone/>
+                </a:pPr>
                 <a14:m>
-                  <m:oMath xmlns:m="http://schemas.openxmlformats.org/officeDocument/2006/math">
-                    <m:r>
-                      <m:t>T</m:t>
-                    </m:r>
-                    <m:d>
-                      <m:dPr>
-                        <m:begChr m:val="("/>
-                        <m:endChr m:val=")"/>
-                        <m:sepChr m:val=""/>
-                        <m:grow/>
-                      </m:dPr>
-                      <m:e>
-                        <m:r>
-                          <m:t>n</m:t>
-                        </m:r>
-                      </m:e>
-                    </m:d>
-                    <m:r>
-                      <m:rPr>
-                        <m:sty m:val="p"/>
-                      </m:rPr>
-                      <m:t>=</m:t>
-                    </m:r>
-                    <m:r>
-                      <m:t>4</m:t>
-                    </m:r>
-                    <m:r>
-                      <m:t>T</m:t>
-                    </m:r>
-                    <m:d>
-                      <m:dPr>
-                        <m:begChr m:val="("/>
-                        <m:endChr m:val=")"/>
-                        <m:sepChr m:val=""/>
-                        <m:grow/>
-                      </m:dPr>
-                      <m:e>
-                        <m:r>
-                          <m:t>n</m:t>
-                        </m:r>
-                        <m:r>
-                          <m:rPr>
-                            <m:sty m:val="p"/>
-                          </m:rPr>
-                          <m:t>/</m:t>
-                        </m:r>
-                        <m:r>
-                          <m:t>2</m:t>
-                        </m:r>
-                      </m:e>
-                    </m:d>
-                    <m:r>
-                      <m:rPr>
-                        <m:sty m:val="p"/>
-                      </m:rPr>
-                      <m:t>+</m:t>
-                    </m:r>
-                    <m:r>
-                      <m:t>n</m:t>
-                    </m:r>
-                  </m:oMath>
-                </a14:m>
-                <a:r>
-                  <a:rPr/>
-                  <a:t> </a:t>
-                </a:r>
-                <a14:m>
-                  <m:oMath xmlns:m="http://schemas.openxmlformats.org/officeDocument/2006/math">
-                    <m:r>
-                      <m:rPr>
-                        <m:sty m:val="p"/>
-                      </m:rPr>
-                      <m:t>≤</m:t>
-                    </m:r>
-                    <m:r>
-                      <m:t>4</m:t>
-                    </m:r>
-                    <m:d>
-                      <m:dPr>
-                        <m:begChr m:val="("/>
-                        <m:endChr m:val=")"/>
-                        <m:sepChr m:val=""/>
-                        <m:grow/>
-                      </m:dPr>
-                      <m:e>
-                        <m:sSub>
+                  <m:oMathPara xmlns:m="http://schemas.openxmlformats.org/officeDocument/2006/math">
+                    <m:oMathParaPr>
+                      <m:jc m:val="center"/>
+                    </m:oMathParaPr>
+                    <m:oMath>
+                      <m:m>
+                        <m:mPr>
+                          <m:baseJc m:val="center"/>
+                          <m:plcHide m:val="1"/>
+                          <m:mcs>
+                            <m:mc>
+                              <m:mcPr>
+                                <m:mcJc m:val="right"/>
+                                <m:count m:val="1"/>
+                              </m:mcPr>
+                            </m:mc>
+                            <m:mc>
+                              <m:mcPr>
+                                <m:mcJc m:val="left"/>
+                                <m:count m:val="1"/>
+                              </m:mcPr>
+                            </m:mc>
+                          </m:mcs>
+                        </m:mPr>
+                        <m:mr>
                           <m:e>
                             <m:r>
-                              <m:t>c</m:t>
-                            </m:r>
-                          </m:e>
-                          <m:sub>
-                            <m:r>
-                              <m:t>1</m:t>
-                            </m:r>
-                          </m:sub>
-                        </m:sSub>
-                        <m:sSup>
-                          <m:e>
+                              <m:t>T</m:t>
+                            </m:r>
                             <m:d>
                               <m:dPr>
                                 <m:begChr m:val="("/>
@@ -8589,6 +9001,33 @@
                                 <m:r>
                                   <m:t>n</m:t>
                                 </m:r>
+                              </m:e>
+                            </m:d>
+                          </m:e>
+                          <m:e>
+                            <m:r>
+                              <m:rPr>
+                                <m:sty m:val="p"/>
+                              </m:rPr>
+                              <m:t>=</m:t>
+                            </m:r>
+                            <m:r>
+                              <m:t>4</m:t>
+                            </m:r>
+                            <m:r>
+                              <m:t>T</m:t>
+                            </m:r>
+                            <m:d>
+                              <m:dPr>
+                                <m:begChr m:val="("/>
+                                <m:endChr m:val=")"/>
+                                <m:sepChr m:val=""/>
+                                <m:grow/>
+                              </m:dPr>
+                              <m:e>
+                                <m:r>
+                                  <m:t>n</m:t>
+                                </m:r>
                                 <m:r>
                                   <m:rPr>
                                     <m:sty m:val="p"/>
@@ -8600,368 +9039,433 @@
                                 </m:r>
                               </m:e>
                             </m:d>
-                          </m:e>
-                          <m:sup>
-                            <m:r>
-                              <m:t>2</m:t>
-                            </m:r>
-                          </m:sup>
-                        </m:sSup>
-                        <m:r>
-                          <m:rPr>
-                            <m:sty m:val="p"/>
-                          </m:rPr>
-                          <m:t>–</m:t>
-                        </m:r>
-                        <m:sSub>
-                          <m:e>
-                            <m:r>
-                              <m:t>c</m:t>
-                            </m:r>
-                          </m:e>
-                          <m:sub>
-                            <m:r>
-                              <m:t>2</m:t>
-                            </m:r>
-                          </m:sub>
-                        </m:sSub>
-                        <m:d>
-                          <m:dPr>
-                            <m:begChr m:val="("/>
-                            <m:endChr m:val=")"/>
-                            <m:sepChr m:val=""/>
-                            <m:grow/>
-                          </m:dPr>
-                          <m:e>
-                            <m:r>
-                              <m:t>n</m:t>
-                            </m:r>
                             <m:r>
                               <m:rPr>
                                 <m:sty m:val="p"/>
                               </m:rPr>
-                              <m:t>/</m:t>
+                              <m:t>+</m:t>
+                            </m:r>
+                            <m:r>
+                              <m:t>n</m:t>
+                            </m:r>
+                          </m:e>
+                        </m:mr>
+                        <m:mr>
+                          <m:e/>
+                          <m:e>
+                            <m:r>
+                              <m:rPr>
+                                <m:sty m:val="p"/>
+                              </m:rPr>
+                              <m:t>≤</m:t>
+                            </m:r>
+                            <m:r>
+                              <m:t>4</m:t>
+                            </m:r>
+                            <m:d>
+                              <m:dPr>
+                                <m:begChr m:val="("/>
+                                <m:endChr m:val=")"/>
+                                <m:sepChr m:val=""/>
+                                <m:grow/>
+                              </m:dPr>
+                              <m:e>
+                                <m:sSub>
+                                  <m:e>
+                                    <m:r>
+                                      <m:t>c</m:t>
+                                    </m:r>
+                                  </m:e>
+                                  <m:sub>
+                                    <m:r>
+                                      <m:t>1</m:t>
+                                    </m:r>
+                                  </m:sub>
+                                </m:sSub>
+                                <m:sSup>
+                                  <m:e>
+                                    <m:d>
+                                      <m:dPr>
+                                        <m:begChr m:val="("/>
+                                        <m:endChr m:val=")"/>
+                                        <m:sepChr m:val=""/>
+                                        <m:grow/>
+                                      </m:dPr>
+                                      <m:e>
+                                        <m:r>
+                                          <m:t>n</m:t>
+                                        </m:r>
+                                        <m:r>
+                                          <m:rPr>
+                                            <m:sty m:val="p"/>
+                                          </m:rPr>
+                                          <m:t>/</m:t>
+                                        </m:r>
+                                        <m:r>
+                                          <m:t>2</m:t>
+                                        </m:r>
+                                      </m:e>
+                                    </m:d>
+                                  </m:e>
+                                  <m:sup>
+                                    <m:r>
+                                      <m:t>2</m:t>
+                                    </m:r>
+                                  </m:sup>
+                                </m:sSup>
+                                <m:r>
+                                  <m:rPr>
+                                    <m:sty m:val="p"/>
+                                  </m:rPr>
+                                  <m:t>–</m:t>
+                                </m:r>
+                                <m:sSub>
+                                  <m:e>
+                                    <m:r>
+                                      <m:t>c</m:t>
+                                    </m:r>
+                                  </m:e>
+                                  <m:sub>
+                                    <m:r>
+                                      <m:t>2</m:t>
+                                    </m:r>
+                                  </m:sub>
+                                </m:sSub>
+                                <m:d>
+                                  <m:dPr>
+                                    <m:begChr m:val="("/>
+                                    <m:endChr m:val=")"/>
+                                    <m:sepChr m:val=""/>
+                                    <m:grow/>
+                                  </m:dPr>
+                                  <m:e>
+                                    <m:r>
+                                      <m:t>n</m:t>
+                                    </m:r>
+                                    <m:r>
+                                      <m:rPr>
+                                        <m:sty m:val="p"/>
+                                      </m:rPr>
+                                      <m:t>/</m:t>
+                                    </m:r>
+                                    <m:r>
+                                      <m:t>2</m:t>
+                                    </m:r>
+                                  </m:e>
+                                </m:d>
+                              </m:e>
+                            </m:d>
+                            <m:r>
+                              <m:rPr>
+                                <m:sty m:val="p"/>
+                              </m:rPr>
+                              <m:t>+</m:t>
+                            </m:r>
+                            <m:r>
+                              <m:t>n</m:t>
+                            </m:r>
+                          </m:e>
+                        </m:mr>
+                        <m:mr>
+                          <m:e/>
+                          <m:e>
+                            <m:r>
+                              <m:rPr>
+                                <m:sty m:val="p"/>
+                              </m:rPr>
+                              <m:t>=</m:t>
+                            </m:r>
+                            <m:sSub>
+                              <m:e>
+                                <m:r>
+                                  <m:t>c</m:t>
+                                </m:r>
+                              </m:e>
+                              <m:sub>
+                                <m:r>
+                                  <m:t>1</m:t>
+                                </m:r>
+                              </m:sub>
+                            </m:sSub>
+                            <m:sSup>
+                              <m:e>
+                                <m:r>
+                                  <m:t>n</m:t>
+                                </m:r>
+                              </m:e>
+                              <m:sup>
+                                <m:r>
+                                  <m:t>2</m:t>
+                                </m:r>
+                              </m:sup>
+                            </m:sSup>
+                            <m:r>
+                              <m:rPr>
+                                <m:sty m:val="p"/>
+                              </m:rPr>
+                              <m:t>–</m:t>
                             </m:r>
                             <m:r>
                               <m:t>2</m:t>
                             </m:r>
+                            <m:sSub>
+                              <m:e>
+                                <m:r>
+                                  <m:t>c</m:t>
+                                </m:r>
+                              </m:e>
+                              <m:sub>
+                                <m:r>
+                                  <m:t>2</m:t>
+                                </m:r>
+                              </m:sub>
+                            </m:sSub>
+                            <m:r>
+                              <m:t>n</m:t>
+                            </m:r>
+                            <m:r>
+                              <m:rPr>
+                                <m:sty m:val="p"/>
+                              </m:rPr>
+                              <m:t>+</m:t>
+                            </m:r>
+                            <m:r>
+                              <m:t>n</m:t>
+                            </m:r>
                           </m:e>
-                        </m:d>
-                      </m:e>
-                    </m:d>
-                    <m:r>
-                      <m:rPr>
-                        <m:sty m:val="p"/>
-                      </m:rPr>
-                      <m:t>+</m:t>
-                    </m:r>
-                    <m:r>
-                      <m:t>n</m:t>
-                    </m:r>
-                  </m:oMath>
-                </a14:m>
-                <a:r>
-                  <a:rPr/>
-                  <a:t> </a:t>
-                </a:r>
-                <a14:m>
-                  <m:oMath xmlns:m="http://schemas.openxmlformats.org/officeDocument/2006/math">
-                    <m:r>
-                      <m:rPr>
-                        <m:sty m:val="p"/>
-                      </m:rPr>
-                      <m:t>=</m:t>
-                    </m:r>
-                    <m:sSub>
-                      <m:e>
-                        <m:r>
-                          <m:t>c</m:t>
-                        </m:r>
-                      </m:e>
-                      <m:sub>
-                        <m:r>
-                          <m:t>1</m:t>
-                        </m:r>
-                      </m:sub>
-                    </m:sSub>
-                    <m:sSup>
-                      <m:e>
-                        <m:r>
-                          <m:t>n</m:t>
-                        </m:r>
-                      </m:e>
-                      <m:sup>
-                        <m:r>
-                          <m:t>2</m:t>
-                        </m:r>
-                      </m:sup>
-                    </m:sSup>
-                    <m:r>
-                      <m:rPr>
-                        <m:sty m:val="p"/>
-                      </m:rPr>
-                      <m:t>–</m:t>
-                    </m:r>
-                    <m:r>
-                      <m:t>2</m:t>
-                    </m:r>
-                    <m:sSub>
-                      <m:e>
-                        <m:r>
-                          <m:t>c</m:t>
-                        </m:r>
-                      </m:e>
-                      <m:sub>
-                        <m:r>
-                          <m:t>2</m:t>
-                        </m:r>
-                      </m:sub>
-                    </m:sSub>
-                    <m:r>
-                      <m:t>n</m:t>
-                    </m:r>
-                    <m:r>
-                      <m:rPr>
-                        <m:sty m:val="p"/>
-                      </m:rPr>
-                      <m:t>+</m:t>
-                    </m:r>
-                    <m:r>
-                      <m:t>n</m:t>
-                    </m:r>
-                  </m:oMath>
-                </a14:m>
-                <a:r>
-                  <a:rPr/>
-                  <a:t> </a:t>
-                </a:r>
-                <a14:m>
-                  <m:oMath xmlns:m="http://schemas.openxmlformats.org/officeDocument/2006/math">
-                    <m:r>
-                      <m:rPr>
-                        <m:sty m:val="p"/>
-                      </m:rPr>
-                      <m:t>=</m:t>
-                    </m:r>
-                    <m:sSub>
-                      <m:e>
-                        <m:r>
-                          <m:t>c</m:t>
-                        </m:r>
-                      </m:e>
-                      <m:sub>
-                        <m:r>
-                          <m:t>1</m:t>
-                        </m:r>
-                      </m:sub>
-                    </m:sSub>
-                    <m:sSup>
-                      <m:e>
-                        <m:r>
-                          <m:t>n</m:t>
-                        </m:r>
-                      </m:e>
-                      <m:sup>
-                        <m:r>
-                          <m:t>2</m:t>
-                        </m:r>
-                      </m:sup>
-                    </m:sSup>
-                    <m:r>
-                      <m:rPr>
-                        <m:sty m:val="p"/>
-                      </m:rPr>
-                      <m:t>–</m:t>
-                    </m:r>
-                    <m:sSub>
-                      <m:e>
-                        <m:r>
-                          <m:t>c</m:t>
-                        </m:r>
-                      </m:e>
-                      <m:sub>
-                        <m:r>
-                          <m:t>2</m:t>
-                        </m:r>
-                      </m:sub>
-                    </m:sSub>
-                    <m:r>
-                      <m:t>n</m:t>
-                    </m:r>
-                    <m:r>
-                      <m:rPr>
-                        <m:sty m:val="p"/>
-                      </m:rPr>
-                      <m:t>–</m:t>
-                    </m:r>
-                    <m:d>
-                      <m:dPr>
-                        <m:begChr m:val="("/>
-                        <m:endChr m:val=")"/>
-                        <m:sepChr m:val=""/>
-                        <m:grow/>
-                      </m:dPr>
-                      <m:e>
-                        <m:sSub>
+                        </m:mr>
+                        <m:mr>
+                          <m:e/>
                           <m:e>
                             <m:r>
+                              <m:rPr>
+                                <m:sty m:val="p"/>
+                              </m:rPr>
+                              <m:t>=</m:t>
+                            </m:r>
+                            <m:sSub>
+                              <m:e>
+                                <m:r>
+                                  <m:t>c</m:t>
+                                </m:r>
+                              </m:e>
+                              <m:sub>
+                                <m:r>
+                                  <m:t>1</m:t>
+                                </m:r>
+                              </m:sub>
+                            </m:sSub>
+                            <m:sSup>
+                              <m:e>
+                                <m:r>
+                                  <m:t>n</m:t>
+                                </m:r>
+                              </m:e>
+                              <m:sup>
+                                <m:r>
+                                  <m:t>2</m:t>
+                                </m:r>
+                              </m:sup>
+                            </m:sSup>
+                            <m:r>
+                              <m:rPr>
+                                <m:sty m:val="p"/>
+                              </m:rPr>
+                              <m:t>–</m:t>
+                            </m:r>
+                            <m:sSub>
+                              <m:e>
+                                <m:r>
+                                  <m:t>c</m:t>
+                                </m:r>
+                              </m:e>
+                              <m:sub>
+                                <m:r>
+                                  <m:t>2</m:t>
+                                </m:r>
+                              </m:sub>
+                            </m:sSub>
+                            <m:r>
+                              <m:t>n</m:t>
+                            </m:r>
+                            <m:r>
+                              <m:rPr>
+                                <m:sty m:val="p"/>
+                              </m:rPr>
+                              <m:t>–</m:t>
+                            </m:r>
+                            <m:d>
+                              <m:dPr>
+                                <m:begChr m:val="("/>
+                                <m:endChr m:val=")"/>
+                                <m:sepChr m:val=""/>
+                                <m:grow/>
+                              </m:dPr>
+                              <m:e>
+                                <m:sSub>
+                                  <m:e>
+                                    <m:r>
+                                      <m:t>c</m:t>
+                                    </m:r>
+                                  </m:e>
+                                  <m:sub>
+                                    <m:r>
+                                      <m:t>2</m:t>
+                                    </m:r>
+                                  </m:sub>
+                                </m:sSub>
+                                <m:r>
+                                  <m:t>n</m:t>
+                                </m:r>
+                                <m:r>
+                                  <m:rPr>
+                                    <m:sty m:val="p"/>
+                                  </m:rPr>
+                                  <m:t>–</m:t>
+                                </m:r>
+                                <m:r>
+                                  <m:t>n</m:t>
+                                </m:r>
+                              </m:e>
+                            </m:d>
+                          </m:e>
+                        </m:mr>
+                        <m:mr>
+                          <m:e/>
+                          <m:e>
+                            <m:r>
+                              <m:rPr>
+                                <m:sty m:val="p"/>
+                              </m:rPr>
+                              <m:t>≤</m:t>
+                            </m:r>
+                            <m:sSub>
+                              <m:e>
+                                <m:r>
+                                  <m:t>c</m:t>
+                                </m:r>
+                              </m:e>
+                              <m:sub>
+                                <m:r>
+                                  <m:t>1</m:t>
+                                </m:r>
+                              </m:sub>
+                            </m:sSub>
+                            <m:sSup>
+                              <m:e>
+                                <m:r>
+                                  <m:t>n</m:t>
+                                </m:r>
+                              </m:e>
+                              <m:sup>
+                                <m:r>
+                                  <m:t>2</m:t>
+                                </m:r>
+                              </m:sup>
+                            </m:sSup>
+                            <m:r>
+                              <m:rPr>
+                                <m:sty m:val="p"/>
+                              </m:rPr>
+                              <m:t>–</m:t>
+                            </m:r>
+                            <m:sSub>
+                              <m:e>
+                                <m:r>
+                                  <m:t>c</m:t>
+                                </m:r>
+                              </m:e>
+                              <m:sub>
+                                <m:r>
+                                  <m:t>2</m:t>
+                                </m:r>
+                              </m:sub>
+                            </m:sSub>
+                            <m:r>
+                              <m:t>n</m:t>
+                            </m:r>
+                            <m:r>
+                              <m:rPr>
+                                <m:nor/>
+                                <m:sty m:val="p"/>
+                              </m:rPr>
+                              <m:t> for </m:t>
+                            </m:r>
+                            <m:r>
+                              <m:t>n</m:t>
+                            </m:r>
+                            <m:d>
+                              <m:dPr>
+                                <m:begChr m:val="("/>
+                                <m:endChr m:val=")"/>
+                                <m:sepChr m:val=""/>
+                                <m:grow/>
+                              </m:dPr>
+                              <m:e>
+                                <m:sSub>
+                                  <m:e>
+                                    <m:r>
+                                      <m:t>c</m:t>
+                                    </m:r>
+                                  </m:e>
+                                  <m:sub>
+                                    <m:r>
+                                      <m:t>2</m:t>
+                                    </m:r>
+                                  </m:sub>
+                                </m:sSub>
+                                <m:r>
+                                  <m:rPr>
+                                    <m:sty m:val="p"/>
+                                  </m:rPr>
+                                  <m:t>–</m:t>
+                                </m:r>
+                                <m:r>
+                                  <m:t>1</m:t>
+                                </m:r>
+                              </m:e>
+                            </m:d>
+                            <m:r>
+                              <m:rPr>
+                                <m:sty m:val="p"/>
+                              </m:rPr>
+                              <m:t>≥</m:t>
+                            </m:r>
+                            <m:r>
+                              <m:t>0</m:t>
+                            </m:r>
+                          </m:e>
+                        </m:mr>
+                        <m:mr>
+                          <m:e/>
+                          <m:e>
+                            <m:r>
+                              <m:rPr>
+                                <m:nor/>
+                                <m:sty m:val="p"/>
+                              </m:rPr>
+                              <m:t>choose </m:t>
+                            </m:r>
+                            <m:r>
                               <m:t>c</m:t>
                             </m:r>
+                            <m:r>
+                              <m:t>2</m:t>
+                            </m:r>
+                            <m:r>
+                              <m:rPr>
+                                <m:sty m:val="p"/>
+                              </m:rPr>
+                              <m:t>≥</m:t>
+                            </m:r>
+                            <m:r>
+                              <m:t>1</m:t>
+                            </m:r>
                           </m:e>
-                          <m:sub>
-                            <m:r>
-                              <m:t>2</m:t>
-                            </m:r>
-                          </m:sub>
-                        </m:sSub>
-                        <m:r>
-                          <m:t>n</m:t>
-                        </m:r>
-                        <m:r>
-                          <m:rPr>
-                            <m:sty m:val="p"/>
-                          </m:rPr>
-                          <m:t>–</m:t>
-                        </m:r>
-                        <m:r>
-                          <m:t>n</m:t>
-                        </m:r>
-                      </m:e>
-                    </m:d>
-                  </m:oMath>
-                </a14:m>
-                <a:r>
-                  <a:rPr/>
-                  <a:t> </a:t>
-                </a:r>
-                <a14:m>
-                  <m:oMath xmlns:m="http://schemas.openxmlformats.org/officeDocument/2006/math">
-                    <m:r>
-                      <m:rPr>
-                        <m:sty m:val="p"/>
-                      </m:rPr>
-                      <m:t>≤</m:t>
-                    </m:r>
-                    <m:sSub>
-                      <m:e>
-                        <m:r>
-                          <m:t>c</m:t>
-                        </m:r>
-                      </m:e>
-                      <m:sub>
-                        <m:r>
-                          <m:t>1</m:t>
-                        </m:r>
-                      </m:sub>
-                    </m:sSub>
-                    <m:sSup>
-                      <m:e>
-                        <m:r>
-                          <m:t>n</m:t>
-                        </m:r>
-                      </m:e>
-                      <m:sup>
-                        <m:r>
-                          <m:t>2</m:t>
-                        </m:r>
-                      </m:sup>
-                    </m:sSup>
-                    <m:r>
-                      <m:rPr>
-                        <m:sty m:val="p"/>
-                      </m:rPr>
-                      <m:t>–</m:t>
-                    </m:r>
-                    <m:sSub>
-                      <m:e>
-                        <m:r>
-                          <m:t>c</m:t>
-                        </m:r>
-                      </m:e>
-                      <m:sub>
-                        <m:r>
-                          <m:t>2</m:t>
-                        </m:r>
-                      </m:sub>
-                    </m:sSub>
-                    <m:r>
-                      <m:t>n</m:t>
-                    </m:r>
-                  </m:oMath>
-                </a14:m>
-                <a:r>
-                  <a:rPr/>
-                  <a:t> for </a:t>
-                </a:r>
-                <a14:m>
-                  <m:oMath xmlns:m="http://schemas.openxmlformats.org/officeDocument/2006/math">
-                    <m:r>
-                      <m:t>n</m:t>
-                    </m:r>
-                    <m:d>
-                      <m:dPr>
-                        <m:begChr m:val="("/>
-                        <m:endChr m:val=")"/>
-                        <m:sepChr m:val=""/>
-                        <m:grow/>
-                      </m:dPr>
-                      <m:e>
-                        <m:sSub>
-                          <m:e>
-                            <m:r>
-                              <m:t>c</m:t>
-                            </m:r>
-                          </m:e>
-                          <m:sub>
-                            <m:r>
-                              <m:t>2</m:t>
-                            </m:r>
-                          </m:sub>
-                        </m:sSub>
-                        <m:r>
-                          <m:rPr>
-                            <m:sty m:val="p"/>
-                          </m:rPr>
-                          <m:t>–</m:t>
-                        </m:r>
-                        <m:r>
-                          <m:t>1</m:t>
-                        </m:r>
-                      </m:e>
-                    </m:d>
-                    <m:r>
-                      <m:rPr>
-                        <m:sty m:val="p"/>
-                      </m:rPr>
-                      <m:t>≥</m:t>
-                    </m:r>
-                    <m:r>
-                      <m:t>0</m:t>
-                    </m:r>
-                  </m:oMath>
-                </a14:m>
-                <a:r>
-                  <a:rPr/>
-                  <a:t> choose </a:t>
-                </a:r>
-                <a14:m>
-                  <m:oMath xmlns:m="http://schemas.openxmlformats.org/officeDocument/2006/math">
-                    <m:r>
-                      <m:t>c</m:t>
-                    </m:r>
-                    <m:r>
-                      <m:t>2</m:t>
-                    </m:r>
-                    <m:r>
-                      <m:rPr>
-                        <m:sty m:val="p"/>
-                      </m:rPr>
-                      <m:t>≥</m:t>
-                    </m:r>
-                    <m:r>
-                      <m:t>1</m:t>
-                    </m:r>
-                  </m:oMath>
+                        </m:mr>
+                      </m:m>
+                    </m:oMath>
+                  </m:oMathPara>
                 </a14:m>
               </a:p>
             </p:txBody>
@@ -9010,7 +9514,7 @@
             </a:pPr>
             <a:r>
               <a:rPr/>
-              <a:t>Example (cont’d)</a:t>
+              <a:t>Example: A tighter upper bound? (6)</a:t>
             </a:r>
           </a:p>
         </p:txBody>
@@ -9451,7 +9955,7 @@
             </a:pPr>
             <a:r>
               <a:rPr/>
-              <a:t>Substitution Method: Example 2</a:t>
+              <a:t>Substitution Method: Example 2 (1)</a:t>
             </a:r>
           </a:p>
         </p:txBody>
@@ -10085,7 +10589,7 @@
             </a:pPr>
             <a:r>
               <a:rPr/>
-              <a:t>Example 2 (cont’d)</a:t>
+              <a:t>Substitution Method: Example 2 (2)</a:t>
             </a:r>
           </a:p>
         </p:txBody>
@@ -10837,17 +11341,17 @@
 </p:sld>
 </file>
 
-<file path=ppt/slides/slide30.xml><?xml version="1.0" encoding="UTF-8"?><p:sld xmlns:a="http://schemas.openxmlformats.org/drawingml/2006/main" xmlns:r="http://schemas.openxmlformats.org/officeDocument/2006/relationships" xmlns:p="http://schemas.openxmlformats.org/presentationml/2006/main"><p:cSld><p:spTree><p:nvGrpSpPr><p:cNvPr id="1" name="" /><p:cNvGrpSpPr /><p:nvPr /></p:nvGrpSpPr><p:grpSpPr><a:xfrm><a:off x="0" y="0" /><a:ext cx="0" cy="0" /><a:chOff x="0" y="0" /><a:chExt cx="0" cy="0" /></a:xfrm></p:grpSpPr><p:sp><p:nvSpPr><p:cNvPr id="2" name="Title 1" /><p:cNvSpPr><a:spLocks noGrp="1" /></p:cNvSpPr><p:nvPr><p:ph type="title" /></p:nvPr></p:nvSpPr><p:spPr /><p:txBody><a:bodyPr /><a:lstStyle /><a:p><a:pPr lvl="0" indent="0" marL="0"><a:buNone /></a:pPr><a:r><a:rPr /><a:t>Solve Recurrence : </a:t></a:r><a14:m><m:oMath xmlns:m="http://schemas.openxmlformats.org/officeDocument/2006/math"><m:r><m:t>T</m:t></m:r><m:d><m:dPr><m:begChr m:val="(" /><m:endChr m:val=")" /><m:sepChr m:val="" /><m:grow /></m:dPr><m:e><m:r><m:t>n</m:t></m:r></m:e></m:d><m:r><m:rPr><m:sty m:val="p" /></m:rPr><m:t>=</m:t></m:r><m:r><m:t>2</m:t></m:r><m:r><m:t>T</m:t></m:r><m:d><m:dPr><m:begChr m:val="(" /><m:endChr m:val=")" /><m:sepChr m:val="" /><m:grow /></m:dPr><m:e><m:r><m:t>n</m:t></m:r><m:r><m:rPr><m:sty m:val="p" /></m:rPr><m:t>/</m:t></m:r><m:r><m:t>2</m:t></m:r></m:e></m:d><m:r><m:rPr><m:sty m:val="p" /></m:rPr><m:t>+</m:t></m:r><m:r><m:t>Θ</m:t></m:r><m:d><m:dPr><m:begChr m:val="(" /><m:endChr m:val=")" /><m:sepChr m:val="" /><m:grow /></m:dPr><m:e><m:r><m:t>n</m:t></m:r></m:e></m:d></m:oMath></a14:m></a:p></p:txBody></p:sp><p:pic><p:nvPicPr><p:cNvPr descr="fig:
+<file path=ppt/slides/slide30.xml><?xml version="1.0" encoding="UTF-8"?><p:sld xmlns:a="http://schemas.openxmlformats.org/drawingml/2006/main" xmlns:r="http://schemas.openxmlformats.org/officeDocument/2006/relationships" xmlns:p="http://schemas.openxmlformats.org/presentationml/2006/main"><p:cSld><p:spTree><p:nvGrpSpPr><p:cNvPr id="1" name="" /><p:cNvGrpSpPr /><p:nvPr /></p:nvGrpSpPr><p:grpSpPr><a:xfrm><a:off x="0" y="0" /><a:ext cx="0" cy="0" /><a:chOff x="0" y="0" /><a:chExt cx="0" cy="0" /></a:xfrm></p:grpSpPr><p:sp><p:nvSpPr><p:cNvPr id="2" name="Title 1" /><p:cNvSpPr><a:spLocks noGrp="1" /></p:cNvSpPr><p:nvPr><p:ph type="title" /></p:nvPr></p:nvSpPr><p:spPr /><p:txBody><a:bodyPr /><a:lstStyle /><a:p><a:pPr lvl="0" indent="0" marL="0"><a:buNone /></a:pPr><a:r><a:rPr /><a:t>Solve Recurrence (1) : </a:t></a:r><a14:m><m:oMath xmlns:m="http://schemas.openxmlformats.org/officeDocument/2006/math"><m:r><m:t>T</m:t></m:r><m:d><m:dPr><m:begChr m:val="(" /><m:endChr m:val=")" /><m:sepChr m:val="" /><m:grow /></m:dPr><m:e><m:r><m:t>n</m:t></m:r></m:e></m:d><m:r><m:rPr><m:sty m:val="p" /></m:rPr><m:t>=</m:t></m:r><m:r><m:t>2</m:t></m:r><m:r><m:t>T</m:t></m:r><m:d><m:dPr><m:begChr m:val="(" /><m:endChr m:val=")" /><m:sepChr m:val="" /><m:grow /></m:dPr><m:e><m:r><m:t>n</m:t></m:r><m:r><m:rPr><m:sty m:val="p" /></m:rPr><m:t>/</m:t></m:r><m:r><m:t>2</m:t></m:r></m:e></m:d><m:r><m:rPr><m:sty m:val="p" /></m:rPr><m:t>+</m:t></m:r><m:r><m:t>Θ</m:t></m:r><m:d><m:dPr><m:begChr m:val="(" /><m:endChr m:val=")" /><m:sepChr m:val="" /><m:grow /></m:dPr><m:e><m:r><m:t>n</m:t></m:r></m:e></m:d></m:oMath></a14:m></a:p></p:txBody></p:sp><p:pic><p:nvPicPr><p:cNvPr descr="fig:
 
 assets/ce100-week-2-recurrence-recursion_1.drawio.svg" id="0" name="Picture 1" /><p:cNvPicPr><a:picLocks noGrp="1" noChangeAspect="1" /></p:cNvPicPr><p:nvPr /></p:nvPicPr><p:blipFill><a:blip r:embed="rId2" /><a:stretch><a:fillRect /></a:stretch></p:blipFill><p:spPr bwMode="auto"><a:xfrm><a:off x="558800" y="1600200" /><a:ext cx="8026400" cy="4013200" /></a:xfrm><a:prstGeom prst="rect"><a:avLst /></a:prstGeom><a:noFill /><a:ln w="9525"><a:noFill /><a:headEnd /><a:tailEnd /></a:ln></p:spPr></p:pic><p:sp><p:nvSpPr><p:cNvPr id="1" name="TextBox 3" /><p:cNvSpPr txBox="1" /><p:nvPr /></p:nvSpPr><p:spPr><a:xfrm><a:off x="457200" y="5613400" /><a:ext cx="8229600" cy="508000" /></a:xfrm><a:prstGeom prst="rect"><a:avLst /></a:prstGeom><a:noFill /></p:spPr><p:txBody><a:bodyPr /><a:lstStyle /><a:p><a:pPr lvl="0" indent="0" marL="0" algn="ctr"><a:buNone /></a:pPr><a:r><a:rPr /><a:t>alt:“alt” height:250px center</a:t></a:r></a:p></p:txBody></p:sp></p:spTree></p:cSld></p:sld>
 </file>
 
-<file path=ppt/slides/slide31.xml><?xml version="1.0" encoding="UTF-8"?><p:sld xmlns:a="http://schemas.openxmlformats.org/drawingml/2006/main" xmlns:r="http://schemas.openxmlformats.org/officeDocument/2006/relationships" xmlns:p="http://schemas.openxmlformats.org/presentationml/2006/main"><p:cSld><p:spTree><p:nvGrpSpPr><p:cNvPr id="1" name="" /><p:cNvGrpSpPr /><p:nvPr /></p:nvGrpSpPr><p:grpSpPr><a:xfrm><a:off x="0" y="0" /><a:ext cx="0" cy="0" /><a:chOff x="0" y="0" /><a:chExt cx="0" cy="0" /></a:xfrm></p:grpSpPr><p:sp><p:nvSpPr><p:cNvPr id="2" name="Title 1" /><p:cNvSpPr><a:spLocks noGrp="1" /></p:cNvSpPr><p:nvPr><p:ph type="title" /></p:nvPr></p:nvSpPr><p:spPr /><p:txBody><a:bodyPr /><a:lstStyle /><a:p><a:pPr lvl="0" indent="0" marL="0"><a:buNone /></a:pPr><a:r><a:rPr /><a:t>Solve Recurrence : </a:t></a:r><a14:m><m:oMath xmlns:m="http://schemas.openxmlformats.org/officeDocument/2006/math"><m:r><m:t>T</m:t></m:r><m:d><m:dPr><m:begChr m:val="(" /><m:endChr m:val=")" /><m:sepChr m:val="" /><m:grow /></m:dPr><m:e><m:r><m:t>n</m:t></m:r></m:e></m:d><m:r><m:rPr><m:sty m:val="p" /></m:rPr><m:t>=</m:t></m:r><m:r><m:t>2</m:t></m:r><m:r><m:t>T</m:t></m:r><m:d><m:dPr><m:begChr m:val="(" /><m:endChr m:val=")" /><m:sepChr m:val="" /><m:grow /></m:dPr><m:e><m:r><m:t>n</m:t></m:r><m:r><m:rPr><m:sty m:val="p" /></m:rPr><m:t>/</m:t></m:r><m:r><m:t>2</m:t></m:r></m:e></m:d><m:r><m:rPr><m:sty m:val="p" /></m:rPr><m:t>+</m:t></m:r><m:r><m:t>Θ</m:t></m:r><m:d><m:dPr><m:begChr m:val="(" /><m:endChr m:val=")" /><m:sepChr m:val="" /><m:grow /></m:dPr><m:e><m:r><m:t>n</m:t></m:r></m:e></m:d></m:oMath></a14:m></a:p></p:txBody></p:sp><p:pic><p:nvPicPr><p:cNvPr descr="fig:
+<file path=ppt/slides/slide31.xml><?xml version="1.0" encoding="UTF-8"?><p:sld xmlns:a="http://schemas.openxmlformats.org/drawingml/2006/main" xmlns:r="http://schemas.openxmlformats.org/officeDocument/2006/relationships" xmlns:p="http://schemas.openxmlformats.org/presentationml/2006/main"><p:cSld><p:spTree><p:nvGrpSpPr><p:cNvPr id="1" name="" /><p:cNvGrpSpPr /><p:nvPr /></p:nvGrpSpPr><p:grpSpPr><a:xfrm><a:off x="0" y="0" /><a:ext cx="0" cy="0" /><a:chOff x="0" y="0" /><a:chExt cx="0" cy="0" /></a:xfrm></p:grpSpPr><p:sp><p:nvSpPr><p:cNvPr id="2" name="Title 1" /><p:cNvSpPr><a:spLocks noGrp="1" /></p:cNvSpPr><p:nvPr><p:ph type="title" /></p:nvPr></p:nvSpPr><p:spPr /><p:txBody><a:bodyPr /><a:lstStyle /><a:p><a:pPr lvl="0" indent="0" marL="0"><a:buNone /></a:pPr><a:r><a:rPr /><a:t>Solve Recurrence (2) : </a:t></a:r><a14:m><m:oMath xmlns:m="http://schemas.openxmlformats.org/officeDocument/2006/math"><m:r><m:t>T</m:t></m:r><m:d><m:dPr><m:begChr m:val="(" /><m:endChr m:val=")" /><m:sepChr m:val="" /><m:grow /></m:dPr><m:e><m:r><m:t>n</m:t></m:r></m:e></m:d><m:r><m:rPr><m:sty m:val="p" /></m:rPr><m:t>=</m:t></m:r><m:r><m:t>2</m:t></m:r><m:r><m:t>T</m:t></m:r><m:d><m:dPr><m:begChr m:val="(" /><m:endChr m:val=")" /><m:sepChr m:val="" /><m:grow /></m:dPr><m:e><m:r><m:t>n</m:t></m:r><m:r><m:rPr><m:sty m:val="p" /></m:rPr><m:t>/</m:t></m:r><m:r><m:t>2</m:t></m:r></m:e></m:d><m:r><m:rPr><m:sty m:val="p" /></m:rPr><m:t>+</m:t></m:r><m:r><m:t>Θ</m:t></m:r><m:d><m:dPr><m:begChr m:val="(" /><m:endChr m:val=")" /><m:sepChr m:val="" /><m:grow /></m:dPr><m:e><m:r><m:t>n</m:t></m:r></m:e></m:d></m:oMath></a14:m></a:p></p:txBody></p:sp><p:pic><p:nvPicPr><p:cNvPr descr="fig:
 
 assets/ce100-week-2-recurrence-recursion_2.drawio.svg" id="0" name="Picture 1" /><p:cNvPicPr><a:picLocks noGrp="1" noChangeAspect="1" /></p:cNvPicPr><p:nvPr /></p:nvPicPr><p:blipFill><a:blip r:embed="rId2" /><a:stretch><a:fillRect /></a:stretch></p:blipFill><p:spPr bwMode="auto"><a:xfrm><a:off x="457200" y="1638300" /><a:ext cx="8229600" cy="3937000" /></a:xfrm><a:prstGeom prst="rect"><a:avLst /></a:prstGeom><a:noFill /><a:ln w="9525"><a:noFill /><a:headEnd /><a:tailEnd /></a:ln></p:spPr></p:pic><p:sp><p:nvSpPr><p:cNvPr id="1" name="TextBox 3" /><p:cNvSpPr txBox="1" /><p:nvPr /></p:nvSpPr><p:spPr><a:xfrm><a:off x="457200" y="5613400" /><a:ext cx="8229600" cy="508000" /></a:xfrm><a:prstGeom prst="rect"><a:avLst /></a:prstGeom><a:noFill /></p:spPr><p:txBody><a:bodyPr /><a:lstStyle /><a:p><a:pPr lvl="0" indent="0" marL="0" algn="ctr"><a:buNone /></a:pPr><a:r><a:rPr /><a:t>alt:“alt” height:450px center</a:t></a:r></a:p></p:txBody></p:sp></p:spTree></p:cSld></p:sld>
 </file>
 
-<file path=ppt/slides/slide32.xml><?xml version="1.0" encoding="UTF-8"?><p:sld xmlns:a="http://schemas.openxmlformats.org/drawingml/2006/main" xmlns:r="http://schemas.openxmlformats.org/officeDocument/2006/relationships" xmlns:p="http://schemas.openxmlformats.org/presentationml/2006/main"><p:cSld><p:spTree><p:nvGrpSpPr><p:cNvPr id="1" name="" /><p:cNvGrpSpPr /><p:nvPr /></p:nvGrpSpPr><p:grpSpPr><a:xfrm><a:off x="0" y="0" /><a:ext cx="0" cy="0" /><a:chOff x="0" y="0" /><a:chExt cx="0" cy="0" /></a:xfrm></p:grpSpPr><p:sp><p:nvSpPr><p:cNvPr id="2" name="Title 1" /><p:cNvSpPr><a:spLocks noGrp="1" /></p:cNvSpPr><p:nvPr><p:ph type="title" /></p:nvPr></p:nvSpPr><p:spPr /><p:txBody><a:bodyPr /><a:lstStyle /><a:p><a:pPr lvl="0" indent="0" marL="0"><a:buNone /></a:pPr><a:r><a:rPr /><a:t>Solve Recurrence : </a:t></a:r><a14:m><m:oMath xmlns:m="http://schemas.openxmlformats.org/officeDocument/2006/math"><m:r><m:t>T</m:t></m:r><m:d><m:dPr><m:begChr m:val="(" /><m:endChr m:val=")" /><m:sepChr m:val="" /><m:grow /></m:dPr><m:e><m:r><m:t>n</m:t></m:r></m:e></m:d><m:r><m:rPr><m:sty m:val="p" /></m:rPr><m:t>=</m:t></m:r><m:r><m:t>2</m:t></m:r><m:r><m:t>T</m:t></m:r><m:d><m:dPr><m:begChr m:val="(" /><m:endChr m:val=")" /><m:sepChr m:val="" /><m:grow /></m:dPr><m:e><m:r><m:t>n</m:t></m:r><m:r><m:rPr><m:sty m:val="p" /></m:rPr><m:t>/</m:t></m:r><m:r><m:t>2</m:t></m:r></m:e></m:d><m:r><m:rPr><m:sty m:val="p" /></m:rPr><m:t>+</m:t></m:r><m:r><m:t>Θ</m:t></m:r><m:d><m:dPr><m:begChr m:val="(" /><m:endChr m:val=")" /><m:sepChr m:val="" /><m:grow /></m:dPr><m:e><m:r><m:t>n</m:t></m:r></m:e></m:d></m:oMath></a14:m></a:p></p:txBody></p:sp><p:pic><p:nvPicPr><p:cNvPr descr="fig:
+<file path=ppt/slides/slide32.xml><?xml version="1.0" encoding="UTF-8"?><p:sld xmlns:a="http://schemas.openxmlformats.org/drawingml/2006/main" xmlns:r="http://schemas.openxmlformats.org/officeDocument/2006/relationships" xmlns:p="http://schemas.openxmlformats.org/presentationml/2006/main"><p:cSld><p:spTree><p:nvGrpSpPr><p:cNvPr id="1" name="" /><p:cNvGrpSpPr /><p:nvPr /></p:nvGrpSpPr><p:grpSpPr><a:xfrm><a:off x="0" y="0" /><a:ext cx="0" cy="0" /><a:chOff x="0" y="0" /><a:chExt cx="0" cy="0" /></a:xfrm></p:grpSpPr><p:sp><p:nvSpPr><p:cNvPr id="2" name="Title 1" /><p:cNvSpPr><a:spLocks noGrp="1" /></p:cNvSpPr><p:nvPr><p:ph type="title" /></p:nvPr></p:nvSpPr><p:spPr /><p:txBody><a:bodyPr /><a:lstStyle /><a:p><a:pPr lvl="0" indent="0" marL="0"><a:buNone /></a:pPr><a:r><a:rPr /><a:t>Solve Recurrence (3) : </a:t></a:r><a14:m><m:oMath xmlns:m="http://schemas.openxmlformats.org/officeDocument/2006/math"><m:r><m:t>T</m:t></m:r><m:d><m:dPr><m:begChr m:val="(" /><m:endChr m:val=")" /><m:sepChr m:val="" /><m:grow /></m:dPr><m:e><m:r><m:t>n</m:t></m:r></m:e></m:d><m:r><m:rPr><m:sty m:val="p" /></m:rPr><m:t>=</m:t></m:r><m:r><m:t>2</m:t></m:r><m:r><m:t>T</m:t></m:r><m:d><m:dPr><m:begChr m:val="(" /><m:endChr m:val=")" /><m:sepChr m:val="" /><m:grow /></m:dPr><m:e><m:r><m:t>n</m:t></m:r><m:r><m:rPr><m:sty m:val="p" /></m:rPr><m:t>/</m:t></m:r><m:r><m:t>2</m:t></m:r></m:e></m:d><m:r><m:rPr><m:sty m:val="p" /></m:rPr><m:t>+</m:t></m:r><m:r><m:t>Θ</m:t></m:r><m:d><m:dPr><m:begChr m:val="(" /><m:endChr m:val=")" /><m:sepChr m:val="" /><m:grow /></m:dPr><m:e><m:r><m:t>n</m:t></m:r></m:e></m:d></m:oMath></a14:m></a:p></p:txBody></p:sp><p:pic><p:nvPicPr><p:cNvPr descr="fig:
 
 assets/ce100-week-2-recurrence-recursion_3.drawio.svg" id="0" name="Picture 1" /><p:cNvPicPr><a:picLocks noGrp="1" noChangeAspect="1" /></p:cNvPicPr><p:nvPr /></p:nvPicPr><p:blipFill><a:blip r:embed="rId2" /><a:stretch><a:fillRect /></a:stretch></p:blipFill><p:spPr bwMode="auto"><a:xfrm><a:off x="1574800" y="1600200" /><a:ext cx="5994400" cy="4013200" /></a:xfrm><a:prstGeom prst="rect"><a:avLst /></a:prstGeom><a:noFill /><a:ln w="9525"><a:noFill /><a:headEnd /><a:tailEnd /></a:ln></p:spPr></p:pic><p:sp><p:nvSpPr><p:cNvPr id="1" name="TextBox 3" /><p:cNvSpPr txBox="1" /><p:nvPr /></p:nvSpPr><p:spPr><a:xfrm><a:off x="457200" y="5613400" /><a:ext cx="8229600" cy="508000" /></a:xfrm><a:prstGeom prst="rect"><a:avLst /></a:prstGeom><a:noFill /></p:spPr><p:txBody><a:bodyPr /><a:lstStyle /><a:p><a:pPr lvl="0" indent="0" marL="0" algn="ctr"><a:buNone /></a:pPr><a:r><a:rPr /><a:t>alt:“alt” height:500px center</a:t></a:r></a:p></p:txBody></p:sp></p:spTree></p:cSld></p:sld>
 </file>
@@ -10894,7 +11398,7 @@
             </a:pPr>
             <a:r>
               <a:rPr/>
-              <a:t>Example of Recursion Tree</a:t>
+              <a:t>Example of Recursion Tree (1)</a:t>
             </a:r>
           </a:p>
         </p:txBody>
@@ -11130,7 +11634,7 @@
             </a:pPr>
             <a:r>
               <a:rPr/>
-              <a:t>Example of Recursion Tree</a:t>
+              <a:t>Example of Recursion Tree (2)</a:t>
             </a:r>
           </a:p>
         </p:txBody>
@@ -11310,7 +11814,7 @@
             </a:pPr>
             <a:r>
               <a:rPr/>
-              <a:t>Example of Recursion Tree</a:t>
+              <a:t>Example of Recursion Tree (3)</a:t>
             </a:r>
           </a:p>
         </p:txBody>
@@ -13452,19 +13956,19 @@
 </p:sld>
 </file>
 
-<file path=ppt/slides/slide41.xml><?xml version="1.0" encoding="UTF-8"?><p:sld xmlns:a="http://schemas.openxmlformats.org/drawingml/2006/main" xmlns:r="http://schemas.openxmlformats.org/officeDocument/2006/relationships" xmlns:p="http://schemas.openxmlformats.org/presentationml/2006/main"><p:cSld><p:spTree><p:nvGrpSpPr><p:cNvPr id="1" name="" /><p:cNvGrpSpPr /><p:nvPr /></p:nvGrpSpPr><p:grpSpPr><a:xfrm><a:off x="0" y="0" /><a:ext cx="0" cy="0" /><a:chOff x="0" y="0" /><a:chExt cx="0" cy="0" /></a:xfrm></p:grpSpPr><p:sp><p:nvSpPr><p:cNvPr id="2" name="Title 1" /><p:cNvSpPr><a:spLocks noGrp="1" /></p:cNvSpPr><p:nvPr><p:ph type="title" /></p:nvPr></p:nvSpPr><p:spPr /><p:txBody><a:bodyPr /><a:lstStyle /><a:p><a:pPr lvl="0" indent="0" marL="0"><a:buNone /></a:pPr><a:r><a:rPr /><a:t>Example : </a:t></a:r><a14:m><m:oMath xmlns:m="http://schemas.openxmlformats.org/officeDocument/2006/math"><m:r><m:t>T</m:t></m:r><m:d><m:dPr><m:begChr m:val="(" /><m:endChr m:val=")" /><m:sepChr m:val="" /><m:grow /></m:dPr><m:e><m:r><m:t>n</m:t></m:r></m:e></m:d><m:r><m:rPr><m:sty m:val="p" /></m:rPr><m:t>=</m:t></m:r><m:r><m:t>4</m:t></m:r><m:r><m:t>T</m:t></m:r><m:d><m:dPr><m:begChr m:val="(" /><m:endChr m:val=")" /><m:sepChr m:val="" /><m:grow /></m:dPr><m:e><m:r><m:t>n</m:t></m:r><m:r><m:rPr><m:sty m:val="p" /></m:rPr><m:t>/</m:t></m:r><m:r><m:t>2</m:t></m:r></m:e></m:d><m:r><m:rPr><m:sty m:val="p" /></m:rPr><m:t>+</m:t></m:r><m:r><m:t>n</m:t></m:r></m:oMath></a14:m></a:p></p:txBody></p:sp><mc:AlternateContent xmlns:mc="http://schemas.openxmlformats.org/markup-compatibility/2006"><mc:Choice xmlns:a14="http://schemas.microsoft.com/office/drawing/2010/main" Requires="a14"><p:sp><p:nvSpPr><p:cNvPr id="3" name="Content Placeholder 2" /><p:cNvSpPr><a:spLocks noGrp="1" /></p:cNvSpPr><p:nvPr><p:ph idx="1" /></p:nvPr></p:nvSpPr><p:spPr /><p:txBody><a:bodyPr /><a:lstStyle /><a:p><a:pPr lvl="0" /><a14:m><m:oMath xmlns:m="http://schemas.openxmlformats.org/officeDocument/2006/math"><m:r><m:t>a</m:t></m:r><m:r><m:rPr><m:sty m:val="p" /></m:rPr><m:t>=</m:t></m:r><m:r><m:t>4</m:t></m:r></m:oMath></a14:m></a:p><a:p><a:pPr lvl="0" /><a14:m><m:oMath xmlns:m="http://schemas.openxmlformats.org/officeDocument/2006/math"><m:r><m:t>b</m:t></m:r><m:r><m:rPr><m:sty m:val="p" /></m:rPr><m:t>=</m:t></m:r><m:r><m:t>2</m:t></m:r></m:oMath></a14:m></a:p><a:p><a:pPr lvl="0" /><a14:m><m:oMath xmlns:m="http://schemas.openxmlformats.org/officeDocument/2006/math"><m:r><m:t>f</m:t></m:r><m:d><m:dPr><m:begChr m:val="(" /><m:endChr m:val=")" /><m:sepChr m:val="" /><m:grow /></m:dPr><m:e><m:r><m:t>n</m:t></m:r></m:e></m:d><m:r><m:rPr><m:sty m:val="p" /></m:rPr><m:t>=</m:t></m:r><m:r><m:t>n</m:t></m:r></m:oMath></a14:m></a:p><a:p><a:pPr lvl="0" /><a14:m><m:oMath xmlns:m="http://schemas.openxmlformats.org/officeDocument/2006/math"><m:sSup><m:e><m:r><m:t>n</m:t></m:r></m:e><m:sup><m:r><m:t>l</m:t></m:r><m:r><m:t>o</m:t></m:r><m:sSubSup><m:e><m:r><m:t>g</m:t></m:r></m:e><m:sub><m:r><m:t>b</m:t></m:r></m:sub><m:sup><m:r><m:t>a</m:t></m:r></m:sup></m:sSubSup></m:sup></m:sSup><m:r><m:rPr><m:sty m:val="p" /></m:rPr><m:t>=</m:t></m:r><m:sSup><m:e><m:r><m:t>n</m:t></m:r></m:e><m:sup><m:r><m:t>l</m:t></m:r><m:r><m:t>o</m:t></m:r><m:sSubSup><m:e><m:r><m:t>g</m:t></m:r></m:e><m:sub><m:r><m:t>2</m:t></m:r></m:sub><m:sup><m:r><m:t>4</m:t></m:r></m:sup></m:sSubSup></m:sup></m:sSup><m:r><m:rPr><m:sty m:val="p" /></m:rPr><m:t>=</m:t></m:r><m:sSup><m:e><m:r><m:t>n</m:t></m:r></m:e><m:sup><m:r><m:t>l</m:t></m:r><m:r><m:t>o</m:t></m:r><m:sSubSup><m:e><m:r><m:t>g</m:t></m:r></m:e><m:sub><m:r><m:t>2</m:t></m:r></m:sub><m:sup><m:sSup><m:e><m:r><m:t>2</m:t></m:r></m:e><m:sup><m:r><m:t>2</m:t></m:r></m:sup></m:sSup></m:sup></m:sSubSup></m:sup></m:sSup><m:r><m:rPr><m:sty m:val="p" /></m:rPr><m:t>=</m:t></m:r><m:sSup><m:e><m:r><m:t>n</m:t></m:r></m:e><m:sup><m:r><m:t>2</m:t></m:r><m:r><m:t>l</m:t></m:r><m:r><m:t>o</m:t></m:r><m:sSubSup><m:e><m:r><m:t>g</m:t></m:r></m:e><m:sub><m:r><m:t>2</m:t></m:r></m:sub><m:sup><m:r><m:t>2</m:t></m:r></m:sup></m:sSubSup></m:sup></m:sSup><m:r><m:rPr><m:sty m:val="p" /></m:rPr><m:t>=</m:t></m:r><m:sSup><m:e><m:r><m:t>n</m:t></m:r></m:e><m:sup><m:r><m:t>2</m:t></m:r></m:sup></m:sSup></m:oMath></a14:m></a:p><a:p><a:pPr lvl="0" /><a14:m><m:oMath xmlns:m="http://schemas.openxmlformats.org/officeDocument/2006/math"><m:r><m:t>f</m:t></m:r><m:d><m:dPr><m:begChr m:val="(" /><m:endChr m:val=")" /><m:sepChr m:val="" /><m:grow /></m:dPr><m:e><m:r><m:t>n</m:t></m:r></m:e></m:d><m:r><m:rPr><m:sty m:val="p" /></m:rPr><m:t>=</m:t></m:r><m:r><m:t>n</m:t></m:r></m:oMath></a14:m><a:r><a:rPr /><a:t> grows polynomially slower than </a:t></a:r><a14:m><m:oMath xmlns:m="http://schemas.openxmlformats.org/officeDocument/2006/math"><m:sSup><m:e><m:r><m:t>n</m:t></m:r></m:e><m:sup><m:r><m:t>l</m:t></m:r><m:r><m:t>o</m:t></m:r><m:sSubSup><m:e><m:r><m:t>g</m:t></m:r></m:e><m:sub><m:r><m:t>b</m:t></m:r></m:sub><m:sup><m:r><m:t>a</m:t></m:r></m:sup></m:sSubSup></m:sup></m:sSup><m:r><m:rPr><m:sty m:val="p" /></m:rPr><m:t>=</m:t></m:r><m:sSup><m:e><m:r><m:t>n</m:t></m:r></m:e><m:sup><m:r><m:t>2</m:t></m:r></m:sup></m:sSup></m:oMath></a14:m></a:p><a:p><a:pPr lvl="1" /><a14:m><m:oMath xmlns:m="http://schemas.openxmlformats.org/officeDocument/2006/math"><m:f><m:fPr><m:type m:val="bar" /></m:fPr><m:num><m:sSup><m:e><m:r><m:t>n</m:t></m:r></m:e><m:sup><m:r><m:t>l</m:t></m:r><m:r><m:t>o</m:t></m:r><m:sSubSup><m:e><m:r><m:t>g</m:t></m:r></m:e><m:sub><m:r><m:t>b</m:t></m:r></m:sub><m:sup><m:r><m:t>a</m:t></m:r></m:sup></m:sSubSup></m:sup></m:sSup></m:num><m:den><m:r><m:t>f</m:t></m:r><m:d><m:dPr><m:begChr m:val="(" /><m:endChr m:val=")" /><m:sepChr m:val="" /><m:grow /></m:dPr><m:e><m:r><m:t>n</m:t></m:r></m:e></m:d></m:den></m:f><m:r><m:rPr><m:sty m:val="p" /></m:rPr><m:t>=</m:t></m:r><m:f><m:fPr><m:type m:val="bar" /></m:fPr><m:num><m:sSup><m:e><m:r><m:t>n</m:t></m:r></m:e><m:sup><m:r><m:t>2</m:t></m:r></m:sup></m:sSup></m:num><m:den><m:r><m:t>n</m:t></m:r></m:den></m:f><m:r><m:rPr><m:sty m:val="p" /></m:rPr><m:t>=</m:t></m:r><m:r><m:t>n</m:t></m:r><m:r><m:rPr><m:sty m:val="p" /></m:rPr><m:t>=</m:t></m:r><m:r><m:t>Ω</m:t></m:r><m:d><m:dPr><m:begChr m:val="(" /><m:endChr m:val=")" /><m:sepChr m:val="" /><m:grow /></m:dPr><m:e><m:sSup><m:e><m:r><m:t>n</m:t></m:r></m:e><m:sup><m:r><m:t>ε</m:t></m:r></m:sup></m:sSup></m:e></m:d></m:oMath></a14:m></a:p><a:p><a:pPr lvl="0" /><a:r><a:rPr /><a:t>CASE-1:</a:t></a:r></a:p><a:p><a:pPr lvl="1" /><a14:m><m:oMath xmlns:m="http://schemas.openxmlformats.org/officeDocument/2006/math"><m:r><m:t>T</m:t></m:r><m:d><m:dPr><m:begChr m:val="(" /><m:endChr m:val=")" /><m:sepChr m:val="" /><m:grow /></m:dPr><m:e><m:r><m:t>n</m:t></m:r></m:e></m:d><m:r><m:rPr><m:sty m:val="p" /></m:rPr><m:t>=</m:t></m:r><m:r><m:t>Θ</m:t></m:r><m:d><m:dPr><m:begChr m:val="(" /><m:endChr m:val=")" /><m:sepChr m:val="" /><m:grow /></m:dPr><m:e><m:sSup><m:e><m:r><m:t>n</m:t></m:r></m:e><m:sup><m:r><m:t>l</m:t></m:r><m:r><m:t>o</m:t></m:r><m:sSubSup><m:e><m:r><m:t>g</m:t></m:r></m:e><m:sub><m:r><m:t>b</m:t></m:r></m:sub><m:sup><m:r><m:t>a</m:t></m:r></m:sup></m:sSubSup></m:sup></m:sSup></m:e></m:d><m:r><m:rPr><m:sty m:val="p" /></m:rPr><m:t>=</m:t></m:r><m:r><m:t>Θ</m:t></m:r><m:d><m:dPr><m:begChr m:val="(" /><m:endChr m:val=")" /><m:sepChr m:val="" /><m:grow /></m:dPr><m:e><m:sSup><m:e><m:r><m:t>n</m:t></m:r></m:e><m:sup><m:r><m:t>l</m:t></m:r><m:r><m:t>o</m:t></m:r><m:sSubSup><m:e><m:r><m:t>g</m:t></m:r></m:e><m:sub><m:r><m:t>2</m:t></m:r></m:sub><m:sup><m:r><m:t>4</m:t></m:r></m:sup></m:sSubSup></m:sup></m:sSup></m:e></m:d><m:r><m:rPr><m:sty m:val="p" /></m:rPr><m:t>=</m:t></m:r><m:r><m:t>Θ</m:t></m:r><m:d><m:dPr><m:begChr m:val="(" /><m:endChr m:val=")" /><m:sepChr m:val="" /><m:grow /></m:dPr><m:e><m:sSup><m:e><m:r><m:t>n</m:t></m:r></m:e><m:sup><m:r><m:t>2</m:t></m:r></m:sup></m:sSup></m:e></m:d></m:oMath></a14:m></a:p></p:txBody></p:sp></mc:Choice></mc:AlternateContent></p:spTree></p:cSld></p:sld>
+<file path=ppt/slides/slide41.xml><?xml version="1.0" encoding="UTF-8"?><p:sld xmlns:a="http://schemas.openxmlformats.org/drawingml/2006/main" xmlns:r="http://schemas.openxmlformats.org/officeDocument/2006/relationships" xmlns:p="http://schemas.openxmlformats.org/presentationml/2006/main"><p:cSld><p:spTree><p:nvGrpSpPr><p:cNvPr id="1" name="" /><p:cNvGrpSpPr /><p:nvPr /></p:nvGrpSpPr><p:grpSpPr><a:xfrm><a:off x="0" y="0" /><a:ext cx="0" cy="0" /><a:chOff x="0" y="0" /><a:chExt cx="0" cy="0" /></a:xfrm></p:grpSpPr><p:sp><p:nvSpPr><p:cNvPr id="2" name="Title 1" /><p:cNvSpPr><a:spLocks noGrp="1" /></p:cNvSpPr><p:nvPr><p:ph type="title" /></p:nvPr></p:nvSpPr><p:spPr /><p:txBody><a:bodyPr /><a:lstStyle /><a:p><a:pPr lvl="0" indent="0" marL="0"><a:buNone /></a:pPr><a:r><a:rPr /><a:t>The Master Method Example (case-1) : </a:t></a:r><a14:m><m:oMath xmlns:m="http://schemas.openxmlformats.org/officeDocument/2006/math"><m:r><m:t>T</m:t></m:r><m:d><m:dPr><m:begChr m:val="(" /><m:endChr m:val=")" /><m:sepChr m:val="" /><m:grow /></m:dPr><m:e><m:r><m:t>n</m:t></m:r></m:e></m:d><m:r><m:rPr><m:sty m:val="p" /></m:rPr><m:t>=</m:t></m:r><m:r><m:t>4</m:t></m:r><m:r><m:t>T</m:t></m:r><m:d><m:dPr><m:begChr m:val="(" /><m:endChr m:val=")" /><m:sepChr m:val="" /><m:grow /></m:dPr><m:e><m:r><m:t>n</m:t></m:r><m:r><m:rPr><m:sty m:val="p" /></m:rPr><m:t>/</m:t></m:r><m:r><m:t>2</m:t></m:r></m:e></m:d><m:r><m:rPr><m:sty m:val="p" /></m:rPr><m:t>+</m:t></m:r><m:r><m:t>n</m:t></m:r></m:oMath></a14:m></a:p></p:txBody></p:sp><mc:AlternateContent xmlns:mc="http://schemas.openxmlformats.org/markup-compatibility/2006"><mc:Choice xmlns:a14="http://schemas.microsoft.com/office/drawing/2010/main" Requires="a14"><p:sp><p:nvSpPr><p:cNvPr id="3" name="Content Placeholder 2" /><p:cNvSpPr><a:spLocks noGrp="1" /></p:cNvSpPr><p:nvPr><p:ph idx="1" /></p:nvPr></p:nvSpPr><p:spPr /><p:txBody><a:bodyPr /><a:lstStyle /><a:p><a:pPr lvl="0" /><a14:m><m:oMath xmlns:m="http://schemas.openxmlformats.org/officeDocument/2006/math"><m:r><m:t>a</m:t></m:r><m:r><m:rPr><m:sty m:val="p" /></m:rPr><m:t>=</m:t></m:r><m:r><m:t>4</m:t></m:r></m:oMath></a14:m></a:p><a:p><a:pPr lvl="0" /><a14:m><m:oMath xmlns:m="http://schemas.openxmlformats.org/officeDocument/2006/math"><m:r><m:t>b</m:t></m:r><m:r><m:rPr><m:sty m:val="p" /></m:rPr><m:t>=</m:t></m:r><m:r><m:t>2</m:t></m:r></m:oMath></a14:m></a:p><a:p><a:pPr lvl="0" /><a14:m><m:oMath xmlns:m="http://schemas.openxmlformats.org/officeDocument/2006/math"><m:r><m:t>f</m:t></m:r><m:d><m:dPr><m:begChr m:val="(" /><m:endChr m:val=")" /><m:sepChr m:val="" /><m:grow /></m:dPr><m:e><m:r><m:t>n</m:t></m:r></m:e></m:d><m:r><m:rPr><m:sty m:val="p" /></m:rPr><m:t>=</m:t></m:r><m:r><m:t>n</m:t></m:r></m:oMath></a14:m></a:p><a:p><a:pPr lvl="0" /><a14:m><m:oMath xmlns:m="http://schemas.openxmlformats.org/officeDocument/2006/math"><m:sSup><m:e><m:r><m:t>n</m:t></m:r></m:e><m:sup><m:r><m:t>l</m:t></m:r><m:r><m:t>o</m:t></m:r><m:sSubSup><m:e><m:r><m:t>g</m:t></m:r></m:e><m:sub><m:r><m:t>b</m:t></m:r></m:sub><m:sup><m:r><m:t>a</m:t></m:r></m:sup></m:sSubSup></m:sup></m:sSup><m:r><m:rPr><m:sty m:val="p" /></m:rPr><m:t>=</m:t></m:r><m:sSup><m:e><m:r><m:t>n</m:t></m:r></m:e><m:sup><m:r><m:t>l</m:t></m:r><m:r><m:t>o</m:t></m:r><m:sSubSup><m:e><m:r><m:t>g</m:t></m:r></m:e><m:sub><m:r><m:t>2</m:t></m:r></m:sub><m:sup><m:r><m:t>4</m:t></m:r></m:sup></m:sSubSup></m:sup></m:sSup><m:r><m:rPr><m:sty m:val="p" /></m:rPr><m:t>=</m:t></m:r><m:sSup><m:e><m:r><m:t>n</m:t></m:r></m:e><m:sup><m:r><m:t>l</m:t></m:r><m:r><m:t>o</m:t></m:r><m:sSubSup><m:e><m:r><m:t>g</m:t></m:r></m:e><m:sub><m:r><m:t>2</m:t></m:r></m:sub><m:sup><m:sSup><m:e><m:r><m:t>2</m:t></m:r></m:e><m:sup><m:r><m:t>2</m:t></m:r></m:sup></m:sSup></m:sup></m:sSubSup></m:sup></m:sSup><m:r><m:rPr><m:sty m:val="p" /></m:rPr><m:t>=</m:t></m:r><m:sSup><m:e><m:r><m:t>n</m:t></m:r></m:e><m:sup><m:r><m:t>2</m:t></m:r><m:r><m:t>l</m:t></m:r><m:r><m:t>o</m:t></m:r><m:sSubSup><m:e><m:r><m:t>g</m:t></m:r></m:e><m:sub><m:r><m:t>2</m:t></m:r></m:sub><m:sup><m:r><m:t>2</m:t></m:r></m:sup></m:sSubSup></m:sup></m:sSup><m:r><m:rPr><m:sty m:val="p" /></m:rPr><m:t>=</m:t></m:r><m:sSup><m:e><m:r><m:t>n</m:t></m:r></m:e><m:sup><m:r><m:t>2</m:t></m:r></m:sup></m:sSup></m:oMath></a14:m></a:p><a:p><a:pPr lvl="0" /><a14:m><m:oMath xmlns:m="http://schemas.openxmlformats.org/officeDocument/2006/math"><m:r><m:t>f</m:t></m:r><m:d><m:dPr><m:begChr m:val="(" /><m:endChr m:val=")" /><m:sepChr m:val="" /><m:grow /></m:dPr><m:e><m:r><m:t>n</m:t></m:r></m:e></m:d><m:r><m:rPr><m:sty m:val="p" /></m:rPr><m:t>=</m:t></m:r><m:r><m:t>n</m:t></m:r></m:oMath></a14:m><a:r><a:rPr /><a:t> grows polynomially slower than </a:t></a:r><a14:m><m:oMath xmlns:m="http://schemas.openxmlformats.org/officeDocument/2006/math"><m:sSup><m:e><m:r><m:t>n</m:t></m:r></m:e><m:sup><m:r><m:t>l</m:t></m:r><m:r><m:t>o</m:t></m:r><m:sSubSup><m:e><m:r><m:t>g</m:t></m:r></m:e><m:sub><m:r><m:t>b</m:t></m:r></m:sub><m:sup><m:r><m:t>a</m:t></m:r></m:sup></m:sSubSup></m:sup></m:sSup><m:r><m:rPr><m:sty m:val="p" /></m:rPr><m:t>=</m:t></m:r><m:sSup><m:e><m:r><m:t>n</m:t></m:r></m:e><m:sup><m:r><m:t>2</m:t></m:r></m:sup></m:sSup></m:oMath></a14:m></a:p><a:p><a:pPr lvl="1" /><a14:m><m:oMath xmlns:m="http://schemas.openxmlformats.org/officeDocument/2006/math"><m:f><m:fPr><m:type m:val="bar" /></m:fPr><m:num><m:sSup><m:e><m:r><m:t>n</m:t></m:r></m:e><m:sup><m:r><m:t>l</m:t></m:r><m:r><m:t>o</m:t></m:r><m:sSubSup><m:e><m:r><m:t>g</m:t></m:r></m:e><m:sub><m:r><m:t>b</m:t></m:r></m:sub><m:sup><m:r><m:t>a</m:t></m:r></m:sup></m:sSubSup></m:sup></m:sSup></m:num><m:den><m:r><m:t>f</m:t></m:r><m:d><m:dPr><m:begChr m:val="(" /><m:endChr m:val=")" /><m:sepChr m:val="" /><m:grow /></m:dPr><m:e><m:r><m:t>n</m:t></m:r></m:e></m:d></m:den></m:f><m:r><m:rPr><m:sty m:val="p" /></m:rPr><m:t>=</m:t></m:r><m:f><m:fPr><m:type m:val="bar" /></m:fPr><m:num><m:sSup><m:e><m:r><m:t>n</m:t></m:r></m:e><m:sup><m:r><m:t>2</m:t></m:r></m:sup></m:sSup></m:num><m:den><m:r><m:t>n</m:t></m:r></m:den></m:f><m:r><m:rPr><m:sty m:val="p" /></m:rPr><m:t>=</m:t></m:r><m:r><m:t>n</m:t></m:r><m:r><m:rPr><m:sty m:val="p" /></m:rPr><m:t>=</m:t></m:r><m:r><m:t>Ω</m:t></m:r><m:d><m:dPr><m:begChr m:val="(" /><m:endChr m:val=")" /><m:sepChr m:val="" /><m:grow /></m:dPr><m:e><m:sSup><m:e><m:r><m:t>n</m:t></m:r></m:e><m:sup><m:r><m:t>ε</m:t></m:r></m:sup></m:sSup></m:e></m:d></m:oMath></a14:m></a:p><a:p><a:pPr lvl="0" /><a:r><a:rPr /><a:t>CASE-1:</a:t></a:r></a:p><a:p><a:pPr lvl="1" /><a14:m><m:oMath xmlns:m="http://schemas.openxmlformats.org/officeDocument/2006/math"><m:r><m:t>T</m:t></m:r><m:d><m:dPr><m:begChr m:val="(" /><m:endChr m:val=")" /><m:sepChr m:val="" /><m:grow /></m:dPr><m:e><m:r><m:t>n</m:t></m:r></m:e></m:d><m:r><m:rPr><m:sty m:val="p" /></m:rPr><m:t>=</m:t></m:r><m:r><m:t>Θ</m:t></m:r><m:d><m:dPr><m:begChr m:val="(" /><m:endChr m:val=")" /><m:sepChr m:val="" /><m:grow /></m:dPr><m:e><m:sSup><m:e><m:r><m:t>n</m:t></m:r></m:e><m:sup><m:r><m:t>l</m:t></m:r><m:r><m:t>o</m:t></m:r><m:sSubSup><m:e><m:r><m:t>g</m:t></m:r></m:e><m:sub><m:r><m:t>b</m:t></m:r></m:sub><m:sup><m:r><m:t>a</m:t></m:r></m:sup></m:sSubSup></m:sup></m:sSup></m:e></m:d><m:r><m:rPr><m:sty m:val="p" /></m:rPr><m:t>=</m:t></m:r><m:r><m:t>Θ</m:t></m:r><m:d><m:dPr><m:begChr m:val="(" /><m:endChr m:val=")" /><m:sepChr m:val="" /><m:grow /></m:dPr><m:e><m:sSup><m:e><m:r><m:t>n</m:t></m:r></m:e><m:sup><m:r><m:t>l</m:t></m:r><m:r><m:t>o</m:t></m:r><m:sSubSup><m:e><m:r><m:t>g</m:t></m:r></m:e><m:sub><m:r><m:t>2</m:t></m:r></m:sub><m:sup><m:r><m:t>4</m:t></m:r></m:sup></m:sSubSup></m:sup></m:sSup></m:e></m:d><m:r><m:rPr><m:sty m:val="p" /></m:rPr><m:t>=</m:t></m:r><m:r><m:t>Θ</m:t></m:r><m:d><m:dPr><m:begChr m:val="(" /><m:endChr m:val=")" /><m:sepChr m:val="" /><m:grow /></m:dPr><m:e><m:sSup><m:e><m:r><m:t>n</m:t></m:r></m:e><m:sup><m:r><m:t>2</m:t></m:r></m:sup></m:sSup></m:e></m:d></m:oMath></a14:m></a:p></p:txBody></p:sp></mc:Choice></mc:AlternateContent></p:spTree></p:cSld></p:sld>
 </file>
 
-<file path=ppt/slides/slide42.xml><?xml version="1.0" encoding="UTF-8"?><p:sld xmlns:a="http://schemas.openxmlformats.org/drawingml/2006/main" xmlns:r="http://schemas.openxmlformats.org/officeDocument/2006/relationships" xmlns:p="http://schemas.openxmlformats.org/presentationml/2006/main"><p:cSld><p:spTree><p:nvGrpSpPr><p:cNvPr id="1" name="" /><p:cNvGrpSpPr /><p:nvPr /></p:nvGrpSpPr><p:grpSpPr><a:xfrm><a:off x="0" y="0" /><a:ext cx="0" cy="0" /><a:chOff x="0" y="0" /><a:chExt cx="0" cy="0" /></a:xfrm></p:grpSpPr><p:sp><p:nvSpPr><p:cNvPr id="2" name="Title 1" /><p:cNvSpPr><a:spLocks noGrp="1" /></p:cNvSpPr><p:nvPr><p:ph type="title" /></p:nvPr></p:nvSpPr><p:spPr /><p:txBody><a:bodyPr /><a:lstStyle /><a:p><a:pPr lvl="0" indent="0" marL="0"><a:buNone /></a:pPr><a:r><a:rPr /><a:t>Example : </a:t></a:r><a14:m><m:oMath xmlns:m="http://schemas.openxmlformats.org/officeDocument/2006/math"><m:r><m:t>T</m:t></m:r><m:d><m:dPr><m:begChr m:val="(" /><m:endChr m:val=")" /><m:sepChr m:val="" /><m:grow /></m:dPr><m:e><m:r><m:t>n</m:t></m:r></m:e></m:d><m:r><m:rPr><m:sty m:val="p" /></m:rPr><m:t>=</m:t></m:r><m:r><m:t>4</m:t></m:r><m:r><m:t>T</m:t></m:r><m:d><m:dPr><m:begChr m:val="(" /><m:endChr m:val=")" /><m:sepChr m:val="" /><m:grow /></m:dPr><m:e><m:r><m:t>n</m:t></m:r><m:r><m:rPr><m:sty m:val="p" /></m:rPr><m:t>/</m:t></m:r><m:r><m:t>2</m:t></m:r></m:e></m:d><m:r><m:rPr><m:sty m:val="p" /></m:rPr><m:t>+</m:t></m:r><m:sSup><m:e><m:r><m:t>n</m:t></m:r></m:e><m:sup><m:r><m:t>2</m:t></m:r></m:sup></m:sSup></m:oMath></a14:m></a:p></p:txBody></p:sp><mc:AlternateContent xmlns:mc="http://schemas.openxmlformats.org/markup-compatibility/2006"><mc:Choice xmlns:a14="http://schemas.microsoft.com/office/drawing/2010/main" Requires="a14"><p:sp><p:nvSpPr><p:cNvPr id="3" name="Content Placeholder 2" /><p:cNvSpPr><a:spLocks noGrp="1" /></p:cNvSpPr><p:nvPr><p:ph idx="1" /></p:nvPr></p:nvSpPr><p:spPr /><p:txBody><a:bodyPr /><a:lstStyle /><a:p><a:pPr lvl="0" /><a14:m><m:oMath xmlns:m="http://schemas.openxmlformats.org/officeDocument/2006/math"><m:r><m:t>a</m:t></m:r><m:r><m:rPr><m:sty m:val="p" /></m:rPr><m:t>=</m:t></m:r><m:r><m:t>4</m:t></m:r></m:oMath></a14:m></a:p><a:p><a:pPr lvl="0" /><a14:m><m:oMath xmlns:m="http://schemas.openxmlformats.org/officeDocument/2006/math"><m:r><m:t>b</m:t></m:r><m:r><m:rPr><m:sty m:val="p" /></m:rPr><m:t>=</m:t></m:r><m:r><m:t>2</m:t></m:r></m:oMath></a14:m></a:p><a:p><a:pPr lvl="0" /><a14:m><m:oMath xmlns:m="http://schemas.openxmlformats.org/officeDocument/2006/math"><m:r><m:t>f</m:t></m:r><m:d><m:dPr><m:begChr m:val="(" /><m:endChr m:val=")" /><m:sepChr m:val="" /><m:grow /></m:dPr><m:e><m:r><m:t>n</m:t></m:r></m:e></m:d><m:r><m:rPr><m:sty m:val="p" /></m:rPr><m:t>=</m:t></m:r><m:sSup><m:e><m:r><m:t>n</m:t></m:r></m:e><m:sup><m:r><m:t>2</m:t></m:r></m:sup></m:sSup></m:oMath></a14:m></a:p><a:p><a:pPr lvl="0" /><a14:m><m:oMath xmlns:m="http://schemas.openxmlformats.org/officeDocument/2006/math"><m:sSup><m:e><m:r><m:t>n</m:t></m:r></m:e><m:sup><m:r><m:t>l</m:t></m:r><m:r><m:t>o</m:t></m:r><m:sSubSup><m:e><m:r><m:t>g</m:t></m:r></m:e><m:sub><m:r><m:t>b</m:t></m:r></m:sub><m:sup><m:r><m:t>a</m:t></m:r></m:sup></m:sSubSup></m:sup></m:sSup><m:r><m:rPr><m:sty m:val="p" /></m:rPr><m:t>=</m:t></m:r><m:sSup><m:e><m:r><m:t>n</m:t></m:r></m:e><m:sup><m:r><m:t>l</m:t></m:r><m:r><m:t>o</m:t></m:r><m:sSubSup><m:e><m:r><m:t>g</m:t></m:r></m:e><m:sub><m:r><m:t>2</m:t></m:r></m:sub><m:sup><m:r><m:t>4</m:t></m:r></m:sup></m:sSubSup></m:sup></m:sSup><m:r><m:rPr><m:sty m:val="p" /></m:rPr><m:t>=</m:t></m:r><m:sSup><m:e><m:r><m:t>n</m:t></m:r></m:e><m:sup><m:r><m:t>l</m:t></m:r><m:r><m:t>o</m:t></m:r><m:sSubSup><m:e><m:r><m:t>g</m:t></m:r></m:e><m:sub><m:r><m:t>2</m:t></m:r></m:sub><m:sup><m:sSup><m:e><m:r><m:t>2</m:t></m:r></m:e><m:sup><m:r><m:t>2</m:t></m:r></m:sup></m:sSup></m:sup></m:sSubSup></m:sup></m:sSup><m:r><m:rPr><m:sty m:val="p" /></m:rPr><m:t>=</m:t></m:r><m:sSup><m:e><m:r><m:t>n</m:t></m:r></m:e><m:sup><m:r><m:t>2</m:t></m:r><m:r><m:t>l</m:t></m:r><m:r><m:t>o</m:t></m:r><m:sSubSup><m:e><m:r><m:t>g</m:t></m:r></m:e><m:sub><m:r><m:t>2</m:t></m:r></m:sub><m:sup><m:r><m:t>2</m:t></m:r></m:sup></m:sSubSup></m:sup></m:sSup><m:r><m:rPr><m:sty m:val="p" /></m:rPr><m:t>=</m:t></m:r><m:sSup><m:e><m:r><m:t>n</m:t></m:r></m:e><m:sup><m:r><m:t>2</m:t></m:r></m:sup></m:sSup></m:oMath></a14:m></a:p><a:p><a:pPr lvl="0" /><a14:m><m:oMath xmlns:m="http://schemas.openxmlformats.org/officeDocument/2006/math"><m:r><m:t>f</m:t></m:r><m:d><m:dPr><m:begChr m:val="(" /><m:endChr m:val=")" /><m:sepChr m:val="" /><m:grow /></m:dPr><m:e><m:r><m:t>n</m:t></m:r></m:e></m:d><m:r><m:rPr><m:sty m:val="p" /></m:rPr><m:t>=</m:t></m:r><m:sSup><m:e><m:r><m:t>n</m:t></m:r></m:e><m:sup><m:r><m:t>2</m:t></m:r></m:sup></m:sSup></m:oMath></a14:m><a:r><a:rPr /><a:t> grows at similar rate as </a:t></a:r><a14:m><m:oMath xmlns:m="http://schemas.openxmlformats.org/officeDocument/2006/math"><m:sSup><m:e><m:r><m:t>n</m:t></m:r></m:e><m:sup><m:r><m:t>l</m:t></m:r><m:r><m:t>o</m:t></m:r><m:sSubSup><m:e><m:r><m:t>g</m:t></m:r></m:e><m:sub><m:r><m:t>b</m:t></m:r></m:sub><m:sup><m:r><m:t>a</m:t></m:r></m:sup></m:sSubSup></m:sup></m:sSup><m:r><m:rPr><m:sty m:val="p" /></m:rPr><m:t>=</m:t></m:r><m:sSup><m:e><m:r><m:t>n</m:t></m:r></m:e><m:sup><m:r><m:t>2</m:t></m:r></m:sup></m:sSup></m:oMath></a14:m></a:p><a:p><a:pPr lvl="1" /><a14:m><m:oMath xmlns:m="http://schemas.openxmlformats.org/officeDocument/2006/math"><m:r><m:t>f</m:t></m:r><m:d><m:dPr><m:begChr m:val="(" /><m:endChr m:val=")" /><m:sepChr m:val="" /><m:grow /></m:dPr><m:e><m:r><m:t>n</m:t></m:r></m:e></m:d><m:r><m:rPr><m:sty m:val="p" /></m:rPr><m:t>=</m:t></m:r><m:r><m:t>Θ</m:t></m:r><m:d><m:dPr><m:begChr m:val="(" /><m:endChr m:val=")" /><m:sepChr m:val="" /><m:grow /></m:dPr><m:e><m:sSup><m:e><m:r><m:t>n</m:t></m:r></m:e><m:sup><m:r><m:t>l</m:t></m:r><m:r><m:t>o</m:t></m:r><m:sSubSup><m:e><m:r><m:t>g</m:t></m:r></m:e><m:sub><m:r><m:t>b</m:t></m:r></m:sub><m:sup><m:r><m:t>a</m:t></m:r></m:sup></m:sSubSup></m:sup></m:sSup></m:e></m:d><m:r><m:rPr><m:sty m:val="p" /></m:rPr><m:t>=</m:t></m:r><m:sSup><m:e><m:r><m:t>n</m:t></m:r></m:e><m:sup><m:r><m:t>2</m:t></m:r></m:sup></m:sSup></m:oMath></a14:m></a:p><a:p><a:pPr lvl="0" /><a:r><a:rPr /><a:t>CASE-2:</a:t></a:r></a:p><a:p><a:pPr lvl="1" /><a14:m><m:oMath xmlns:m="http://schemas.openxmlformats.org/officeDocument/2006/math"><m:r><m:t>T</m:t></m:r><m:d><m:dPr><m:begChr m:val="(" /><m:endChr m:val=")" /><m:sepChr m:val="" /><m:grow /></m:dPr><m:e><m:r><m:t>n</m:t></m:r></m:e></m:d><m:r><m:rPr><m:sty m:val="p" /></m:rPr><m:t>=</m:t></m:r><m:r><m:t>Θ</m:t></m:r><m:d><m:dPr><m:begChr m:val="(" /><m:endChr m:val=")" /><m:sepChr m:val="" /><m:grow /></m:dPr><m:e><m:sSup><m:e><m:r><m:t>n</m:t></m:r></m:e><m:sup><m:r><m:t>l</m:t></m:r><m:r><m:t>o</m:t></m:r><m:sSubSup><m:e><m:r><m:t>g</m:t></m:r></m:e><m:sub><m:r><m:t>b</m:t></m:r></m:sub><m:sup><m:r><m:t>a</m:t></m:r></m:sup></m:sSubSup></m:sup></m:sSup><m:r><m:t>l</m:t></m:r><m:r><m:t>g</m:t></m:r><m:r><m:t>n</m:t></m:r></m:e></m:d><m:r><m:rPr><m:sty m:val="p" /></m:rPr><m:t>=</m:t></m:r><m:r><m:t>Θ</m:t></m:r><m:d><m:dPr><m:begChr m:val="(" /><m:endChr m:val=")" /><m:sepChr m:val="" /><m:grow /></m:dPr><m:e><m:sSup><m:e><m:r><m:t>n</m:t></m:r></m:e><m:sup><m:r><m:t>l</m:t></m:r><m:r><m:t>o</m:t></m:r><m:sSubSup><m:e><m:r><m:t>g</m:t></m:r></m:e><m:sub><m:r><m:t>2</m:t></m:r></m:sub><m:sup><m:r><m:t>4</m:t></m:r></m:sup></m:sSubSup></m:sup></m:sSup><m:r><m:t>l</m:t></m:r><m:r><m:t>g</m:t></m:r><m:r><m:t>n</m:t></m:r></m:e></m:d><m:r><m:rPr><m:sty m:val="p" /></m:rPr><m:t>=</m:t></m:r><m:r><m:t>Θ</m:t></m:r><m:d><m:dPr><m:begChr m:val="(" /><m:endChr m:val=")" /><m:sepChr m:val="" /><m:grow /></m:dPr><m:e><m:sSup><m:e><m:r><m:t>n</m:t></m:r></m:e><m:sup><m:r><m:t>2</m:t></m:r></m:sup></m:sSup><m:r><m:t>l</m:t></m:r><m:r><m:t>g</m:t></m:r><m:r><m:t>n</m:t></m:r></m:e></m:d></m:oMath></a14:m></a:p></p:txBody></p:sp></mc:Choice></mc:AlternateContent></p:spTree></p:cSld></p:sld>
+<file path=ppt/slides/slide42.xml><?xml version="1.0" encoding="UTF-8"?><p:sld xmlns:a="http://schemas.openxmlformats.org/drawingml/2006/main" xmlns:r="http://schemas.openxmlformats.org/officeDocument/2006/relationships" xmlns:p="http://schemas.openxmlformats.org/presentationml/2006/main"><p:cSld><p:spTree><p:nvGrpSpPr><p:cNvPr id="1" name="" /><p:cNvGrpSpPr /><p:nvPr /></p:nvGrpSpPr><p:grpSpPr><a:xfrm><a:off x="0" y="0" /><a:ext cx="0" cy="0" /><a:chOff x="0" y="0" /><a:chExt cx="0" cy="0" /></a:xfrm></p:grpSpPr><p:sp><p:nvSpPr><p:cNvPr id="2" name="Title 1" /><p:cNvSpPr><a:spLocks noGrp="1" /></p:cNvSpPr><p:nvPr><p:ph type="title" /></p:nvPr></p:nvSpPr><p:spPr /><p:txBody><a:bodyPr /><a:lstStyle /><a:p><a:pPr lvl="0" indent="0" marL="0"><a:buNone /></a:pPr><a:r><a:rPr /><a:t>The Master Method Example (case-2) : </a:t></a:r><a14:m><m:oMath xmlns:m="http://schemas.openxmlformats.org/officeDocument/2006/math"><m:r><m:t>T</m:t></m:r><m:d><m:dPr><m:begChr m:val="(" /><m:endChr m:val=")" /><m:sepChr m:val="" /><m:grow /></m:dPr><m:e><m:r><m:t>n</m:t></m:r></m:e></m:d><m:r><m:rPr><m:sty m:val="p" /></m:rPr><m:t>=</m:t></m:r><m:r><m:t>4</m:t></m:r><m:r><m:t>T</m:t></m:r><m:d><m:dPr><m:begChr m:val="(" /><m:endChr m:val=")" /><m:sepChr m:val="" /><m:grow /></m:dPr><m:e><m:r><m:t>n</m:t></m:r><m:r><m:rPr><m:sty m:val="p" /></m:rPr><m:t>/</m:t></m:r><m:r><m:t>2</m:t></m:r></m:e></m:d><m:r><m:rPr><m:sty m:val="p" /></m:rPr><m:t>+</m:t></m:r><m:sSup><m:e><m:r><m:t>n</m:t></m:r></m:e><m:sup><m:r><m:t>2</m:t></m:r></m:sup></m:sSup></m:oMath></a14:m></a:p></p:txBody></p:sp><mc:AlternateContent xmlns:mc="http://schemas.openxmlformats.org/markup-compatibility/2006"><mc:Choice xmlns:a14="http://schemas.microsoft.com/office/drawing/2010/main" Requires="a14"><p:sp><p:nvSpPr><p:cNvPr id="3" name="Content Placeholder 2" /><p:cNvSpPr><a:spLocks noGrp="1" /></p:cNvSpPr><p:nvPr><p:ph idx="1" /></p:nvPr></p:nvSpPr><p:spPr /><p:txBody><a:bodyPr /><a:lstStyle /><a:p><a:pPr lvl="0" /><a14:m><m:oMath xmlns:m="http://schemas.openxmlformats.org/officeDocument/2006/math"><m:r><m:t>a</m:t></m:r><m:r><m:rPr><m:sty m:val="p" /></m:rPr><m:t>=</m:t></m:r><m:r><m:t>4</m:t></m:r></m:oMath></a14:m></a:p><a:p><a:pPr lvl="0" /><a14:m><m:oMath xmlns:m="http://schemas.openxmlformats.org/officeDocument/2006/math"><m:r><m:t>b</m:t></m:r><m:r><m:rPr><m:sty m:val="p" /></m:rPr><m:t>=</m:t></m:r><m:r><m:t>2</m:t></m:r></m:oMath></a14:m></a:p><a:p><a:pPr lvl="0" /><a14:m><m:oMath xmlns:m="http://schemas.openxmlformats.org/officeDocument/2006/math"><m:r><m:t>f</m:t></m:r><m:d><m:dPr><m:begChr m:val="(" /><m:endChr m:val=")" /><m:sepChr m:val="" /><m:grow /></m:dPr><m:e><m:r><m:t>n</m:t></m:r></m:e></m:d><m:r><m:rPr><m:sty m:val="p" /></m:rPr><m:t>=</m:t></m:r><m:sSup><m:e><m:r><m:t>n</m:t></m:r></m:e><m:sup><m:r><m:t>2</m:t></m:r></m:sup></m:sSup></m:oMath></a14:m></a:p><a:p><a:pPr lvl="0" /><a14:m><m:oMath xmlns:m="http://schemas.openxmlformats.org/officeDocument/2006/math"><m:sSup><m:e><m:r><m:t>n</m:t></m:r></m:e><m:sup><m:r><m:t>l</m:t></m:r><m:r><m:t>o</m:t></m:r><m:sSubSup><m:e><m:r><m:t>g</m:t></m:r></m:e><m:sub><m:r><m:t>b</m:t></m:r></m:sub><m:sup><m:r><m:t>a</m:t></m:r></m:sup></m:sSubSup></m:sup></m:sSup><m:r><m:rPr><m:sty m:val="p" /></m:rPr><m:t>=</m:t></m:r><m:sSup><m:e><m:r><m:t>n</m:t></m:r></m:e><m:sup><m:r><m:t>l</m:t></m:r><m:r><m:t>o</m:t></m:r><m:sSubSup><m:e><m:r><m:t>g</m:t></m:r></m:e><m:sub><m:r><m:t>2</m:t></m:r></m:sub><m:sup><m:r><m:t>4</m:t></m:r></m:sup></m:sSubSup></m:sup></m:sSup><m:r><m:rPr><m:sty m:val="p" /></m:rPr><m:t>=</m:t></m:r><m:sSup><m:e><m:r><m:t>n</m:t></m:r></m:e><m:sup><m:r><m:t>l</m:t></m:r><m:r><m:t>o</m:t></m:r><m:sSubSup><m:e><m:r><m:t>g</m:t></m:r></m:e><m:sub><m:r><m:t>2</m:t></m:r></m:sub><m:sup><m:sSup><m:e><m:r><m:t>2</m:t></m:r></m:e><m:sup><m:r><m:t>2</m:t></m:r></m:sup></m:sSup></m:sup></m:sSubSup></m:sup></m:sSup><m:r><m:rPr><m:sty m:val="p" /></m:rPr><m:t>=</m:t></m:r><m:sSup><m:e><m:r><m:t>n</m:t></m:r></m:e><m:sup><m:r><m:t>2</m:t></m:r><m:r><m:t>l</m:t></m:r><m:r><m:t>o</m:t></m:r><m:sSubSup><m:e><m:r><m:t>g</m:t></m:r></m:e><m:sub><m:r><m:t>2</m:t></m:r></m:sub><m:sup><m:r><m:t>2</m:t></m:r></m:sup></m:sSubSup></m:sup></m:sSup><m:r><m:rPr><m:sty m:val="p" /></m:rPr><m:t>=</m:t></m:r><m:sSup><m:e><m:r><m:t>n</m:t></m:r></m:e><m:sup><m:r><m:t>2</m:t></m:r></m:sup></m:sSup></m:oMath></a14:m></a:p><a:p><a:pPr lvl="0" /><a14:m><m:oMath xmlns:m="http://schemas.openxmlformats.org/officeDocument/2006/math"><m:r><m:t>f</m:t></m:r><m:d><m:dPr><m:begChr m:val="(" /><m:endChr m:val=")" /><m:sepChr m:val="" /><m:grow /></m:dPr><m:e><m:r><m:t>n</m:t></m:r></m:e></m:d><m:r><m:rPr><m:sty m:val="p" /></m:rPr><m:t>=</m:t></m:r><m:sSup><m:e><m:r><m:t>n</m:t></m:r></m:e><m:sup><m:r><m:t>2</m:t></m:r></m:sup></m:sSup></m:oMath></a14:m><a:r><a:rPr /><a:t> grows at similar rate as </a:t></a:r><a14:m><m:oMath xmlns:m="http://schemas.openxmlformats.org/officeDocument/2006/math"><m:sSup><m:e><m:r><m:t>n</m:t></m:r></m:e><m:sup><m:r><m:t>l</m:t></m:r><m:r><m:t>o</m:t></m:r><m:sSubSup><m:e><m:r><m:t>g</m:t></m:r></m:e><m:sub><m:r><m:t>b</m:t></m:r></m:sub><m:sup><m:r><m:t>a</m:t></m:r></m:sup></m:sSubSup></m:sup></m:sSup><m:r><m:rPr><m:sty m:val="p" /></m:rPr><m:t>=</m:t></m:r><m:sSup><m:e><m:r><m:t>n</m:t></m:r></m:e><m:sup><m:r><m:t>2</m:t></m:r></m:sup></m:sSup></m:oMath></a14:m></a:p><a:p><a:pPr lvl="1" /><a14:m><m:oMath xmlns:m="http://schemas.openxmlformats.org/officeDocument/2006/math"><m:r><m:t>f</m:t></m:r><m:d><m:dPr><m:begChr m:val="(" /><m:endChr m:val=")" /><m:sepChr m:val="" /><m:grow /></m:dPr><m:e><m:r><m:t>n</m:t></m:r></m:e></m:d><m:r><m:rPr><m:sty m:val="p" /></m:rPr><m:t>=</m:t></m:r><m:r><m:t>Θ</m:t></m:r><m:d><m:dPr><m:begChr m:val="(" /><m:endChr m:val=")" /><m:sepChr m:val="" /><m:grow /></m:dPr><m:e><m:sSup><m:e><m:r><m:t>n</m:t></m:r></m:e><m:sup><m:r><m:t>l</m:t></m:r><m:r><m:t>o</m:t></m:r><m:sSubSup><m:e><m:r><m:t>g</m:t></m:r></m:e><m:sub><m:r><m:t>b</m:t></m:r></m:sub><m:sup><m:r><m:t>a</m:t></m:r></m:sup></m:sSubSup></m:sup></m:sSup></m:e></m:d><m:r><m:rPr><m:sty m:val="p" /></m:rPr><m:t>=</m:t></m:r><m:sSup><m:e><m:r><m:t>n</m:t></m:r></m:e><m:sup><m:r><m:t>2</m:t></m:r></m:sup></m:sSup></m:oMath></a14:m></a:p><a:p><a:pPr lvl="0" /><a:r><a:rPr /><a:t>CASE-2:</a:t></a:r></a:p><a:p><a:pPr lvl="1" /><a14:m><m:oMath xmlns:m="http://schemas.openxmlformats.org/officeDocument/2006/math"><m:r><m:t>T</m:t></m:r><m:d><m:dPr><m:begChr m:val="(" /><m:endChr m:val=")" /><m:sepChr m:val="" /><m:grow /></m:dPr><m:e><m:r><m:t>n</m:t></m:r></m:e></m:d><m:r><m:rPr><m:sty m:val="p" /></m:rPr><m:t>=</m:t></m:r><m:r><m:t>Θ</m:t></m:r><m:d><m:dPr><m:begChr m:val="(" /><m:endChr m:val=")" /><m:sepChr m:val="" /><m:grow /></m:dPr><m:e><m:sSup><m:e><m:r><m:t>n</m:t></m:r></m:e><m:sup><m:r><m:t>l</m:t></m:r><m:r><m:t>o</m:t></m:r><m:sSubSup><m:e><m:r><m:t>g</m:t></m:r></m:e><m:sub><m:r><m:t>b</m:t></m:r></m:sub><m:sup><m:r><m:t>a</m:t></m:r></m:sup></m:sSubSup></m:sup></m:sSup><m:r><m:t>l</m:t></m:r><m:r><m:t>g</m:t></m:r><m:r><m:t>n</m:t></m:r></m:e></m:d><m:r><m:rPr><m:sty m:val="p" /></m:rPr><m:t>=</m:t></m:r><m:r><m:t>Θ</m:t></m:r><m:d><m:dPr><m:begChr m:val="(" /><m:endChr m:val=")" /><m:sepChr m:val="" /><m:grow /></m:dPr><m:e><m:sSup><m:e><m:r><m:t>n</m:t></m:r></m:e><m:sup><m:r><m:t>l</m:t></m:r><m:r><m:t>o</m:t></m:r><m:sSubSup><m:e><m:r><m:t>g</m:t></m:r></m:e><m:sub><m:r><m:t>2</m:t></m:r></m:sub><m:sup><m:r><m:t>4</m:t></m:r></m:sup></m:sSubSup></m:sup></m:sSup><m:r><m:t>l</m:t></m:r><m:r><m:t>g</m:t></m:r><m:r><m:t>n</m:t></m:r></m:e></m:d><m:r><m:rPr><m:sty m:val="p" /></m:rPr><m:t>=</m:t></m:r><m:r><m:t>Θ</m:t></m:r><m:d><m:dPr><m:begChr m:val="(" /><m:endChr m:val=")" /><m:sepChr m:val="" /><m:grow /></m:dPr><m:e><m:sSup><m:e><m:r><m:t>n</m:t></m:r></m:e><m:sup><m:r><m:t>2</m:t></m:r></m:sup></m:sSup><m:r><m:t>l</m:t></m:r><m:r><m:t>g</m:t></m:r><m:r><m:t>n</m:t></m:r></m:e></m:d></m:oMath></a14:m></a:p></p:txBody></p:sp></mc:Choice></mc:AlternateContent></p:spTree></p:cSld></p:sld>
 </file>
 
-<file path=ppt/slides/slide43.xml><?xml version="1.0" encoding="UTF-8"?><p:sld xmlns:a="http://schemas.openxmlformats.org/drawingml/2006/main" xmlns:r="http://schemas.openxmlformats.org/officeDocument/2006/relationships" xmlns:p="http://schemas.openxmlformats.org/presentationml/2006/main"><p:cSld><p:spTree><p:nvGrpSpPr><p:cNvPr id="1" name="" /><p:cNvGrpSpPr /><p:nvPr /></p:nvGrpSpPr><p:grpSpPr><a:xfrm><a:off x="0" y="0" /><a:ext cx="0" cy="0" /><a:chOff x="0" y="0" /><a:chExt cx="0" cy="0" /></a:xfrm></p:grpSpPr><p:sp><p:nvSpPr><p:cNvPr id="2" name="Title 1" /><p:cNvSpPr><a:spLocks noGrp="1" /></p:cNvSpPr><p:nvPr><p:ph type="title" /></p:nvPr></p:nvSpPr><p:spPr /><p:txBody><a:bodyPr /><a:lstStyle /><a:p><a:pPr lvl="0" indent="0" marL="0"><a:buNone /></a:pPr><a:r><a:rPr /><a:t>Example : </a:t></a:r><a14:m><m:oMath xmlns:m="http://schemas.openxmlformats.org/officeDocument/2006/math"><m:r><m:t>T</m:t></m:r><m:d><m:dPr><m:begChr m:val="(" /><m:endChr m:val=")" /><m:sepChr m:val="" /><m:grow /></m:dPr><m:e><m:r><m:t>n</m:t></m:r></m:e></m:d><m:r><m:rPr><m:sty m:val="p" /></m:rPr><m:t>=</m:t></m:r><m:r><m:t>4</m:t></m:r><m:r><m:t>T</m:t></m:r><m:d><m:dPr><m:begChr m:val="(" /><m:endChr m:val=")" /><m:sepChr m:val="" /><m:grow /></m:dPr><m:e><m:r><m:t>n</m:t></m:r><m:r><m:rPr><m:sty m:val="p" /></m:rPr><m:t>/</m:t></m:r><m:r><m:t>2</m:t></m:r></m:e></m:d><m:r><m:rPr><m:sty m:val="p" /></m:rPr><m:t>+</m:t></m:r><m:sSup><m:e><m:r><m:t>n</m:t></m:r></m:e><m:sup><m:r><m:t>3</m:t></m:r></m:sup></m:sSup></m:oMath></a14:m></a:p></p:txBody></p:sp><mc:AlternateContent xmlns:mc="http://schemas.openxmlformats.org/markup-compatibility/2006"><mc:Choice xmlns:a14="http://schemas.microsoft.com/office/drawing/2010/main" Requires="a14"><p:sp><p:nvSpPr><p:cNvPr id="3" name="Content Placeholder 2" /><p:cNvSpPr><a:spLocks noGrp="1" /></p:cNvSpPr><p:nvPr><p:ph idx="1" /></p:nvPr></p:nvSpPr><p:spPr /><p:txBody><a:bodyPr /><a:lstStyle /><a:p><a:pPr lvl="0" /><a14:m><m:oMath xmlns:m="http://schemas.openxmlformats.org/officeDocument/2006/math"><m:r><m:t>a</m:t></m:r><m:r><m:rPr><m:sty m:val="p" /></m:rPr><m:t>=</m:t></m:r><m:r><m:t>4</m:t></m:r></m:oMath></a14:m></a:p><a:p><a:pPr lvl="0" /><a14:m><m:oMath xmlns:m="http://schemas.openxmlformats.org/officeDocument/2006/math"><m:r><m:t>b</m:t></m:r><m:r><m:rPr><m:sty m:val="p" /></m:rPr><m:t>=</m:t></m:r><m:r><m:t>2</m:t></m:r></m:oMath></a14:m></a:p><a:p><a:pPr lvl="0" /><a14:m><m:oMath xmlns:m="http://schemas.openxmlformats.org/officeDocument/2006/math"><m:r><m:t>f</m:t></m:r><m:d><m:dPr><m:begChr m:val="(" /><m:endChr m:val=")" /><m:sepChr m:val="" /><m:grow /></m:dPr><m:e><m:r><m:t>n</m:t></m:r></m:e></m:d><m:r><m:rPr><m:sty m:val="p" /></m:rPr><m:t>=</m:t></m:r><m:sSup><m:e><m:r><m:t>n</m:t></m:r></m:e><m:sup><m:r><m:t>3</m:t></m:r></m:sup></m:sSup></m:oMath></a14:m></a:p><a:p><a:pPr lvl="0" /><a14:m><m:oMath xmlns:m="http://schemas.openxmlformats.org/officeDocument/2006/math"><m:sSup><m:e><m:r><m:t>n</m:t></m:r></m:e><m:sup><m:r><m:t>l</m:t></m:r><m:r><m:t>o</m:t></m:r><m:sSubSup><m:e><m:r><m:t>g</m:t></m:r></m:e><m:sub><m:r><m:t>b</m:t></m:r></m:sub><m:sup><m:r><m:t>a</m:t></m:r></m:sup></m:sSubSup></m:sup></m:sSup><m:r><m:rPr><m:sty m:val="p" /></m:rPr><m:t>=</m:t></m:r><m:sSup><m:e><m:r><m:t>n</m:t></m:r></m:e><m:sup><m:r><m:t>l</m:t></m:r><m:r><m:t>o</m:t></m:r><m:sSubSup><m:e><m:r><m:t>g</m:t></m:r></m:e><m:sub><m:r><m:t>2</m:t></m:r></m:sub><m:sup><m:r><m:t>4</m:t></m:r></m:sup></m:sSubSup></m:sup></m:sSup><m:r><m:rPr><m:sty m:val="p" /></m:rPr><m:t>=</m:t></m:r><m:sSup><m:e><m:r><m:t>n</m:t></m:r></m:e><m:sup><m:r><m:t>l</m:t></m:r><m:r><m:t>o</m:t></m:r><m:sSubSup><m:e><m:r><m:t>g</m:t></m:r></m:e><m:sub><m:r><m:t>2</m:t></m:r></m:sub><m:sup><m:sSup><m:e><m:r><m:t>2</m:t></m:r></m:e><m:sup><m:r><m:t>2</m:t></m:r></m:sup></m:sSup></m:sup></m:sSubSup></m:sup></m:sSup><m:r><m:rPr><m:sty m:val="p" /></m:rPr><m:t>=</m:t></m:r><m:sSup><m:e><m:r><m:t>n</m:t></m:r></m:e><m:sup><m:r><m:t>2</m:t></m:r><m:r><m:t>l</m:t></m:r><m:r><m:t>o</m:t></m:r><m:sSubSup><m:e><m:r><m:t>g</m:t></m:r></m:e><m:sub><m:r><m:t>2</m:t></m:r></m:sub><m:sup><m:r><m:t>2</m:t></m:r></m:sup></m:sSubSup></m:sup></m:sSup><m:r><m:rPr><m:sty m:val="p" /></m:rPr><m:t>=</m:t></m:r><m:sSup><m:e><m:r><m:t>n</m:t></m:r></m:e><m:sup><m:r><m:t>2</m:t></m:r></m:sup></m:sSup></m:oMath></a14:m></a:p><a:p><a:pPr lvl="0" /><a14:m><m:oMath xmlns:m="http://schemas.openxmlformats.org/officeDocument/2006/math"><m:r><m:t>f</m:t></m:r><m:d><m:dPr><m:begChr m:val="(" /><m:endChr m:val=")" /><m:sepChr m:val="" /><m:grow /></m:dPr><m:e><m:r><m:t>n</m:t></m:r></m:e></m:d><m:r><m:rPr><m:sty m:val="p" /></m:rPr><m:t>=</m:t></m:r><m:sSup><m:e><m:r><m:t>n</m:t></m:r></m:e><m:sup><m:r><m:t>3</m:t></m:r></m:sup></m:sSup></m:oMath></a14:m><a:r><a:rPr /><a:t> grows polynomially faster than </a:t></a:r><a14:m><m:oMath xmlns:m="http://schemas.openxmlformats.org/officeDocument/2006/math"><m:sSup><m:e><m:r><m:t>n</m:t></m:r></m:e><m:sup><m:r><m:t>l</m:t></m:r><m:r><m:t>o</m:t></m:r><m:sSubSup><m:e><m:r><m:t>g</m:t></m:r></m:e><m:sub><m:r><m:t>b</m:t></m:r></m:sub><m:sup><m:r><m:t>a</m:t></m:r></m:sup></m:sSubSup></m:sup></m:sSup><m:r><m:rPr><m:sty m:val="p" /></m:rPr><m:t>=</m:t></m:r><m:sSup><m:e><m:r><m:t>n</m:t></m:r></m:e><m:sup><m:r><m:t>2</m:t></m:r></m:sup></m:sSup></m:oMath></a14:m></a:p><a:p><a:pPr lvl="1" /><a14:m><m:oMath xmlns:m="http://schemas.openxmlformats.org/officeDocument/2006/math"><m:f><m:fPr><m:type m:val="bar" /></m:fPr><m:num><m:r><m:t>f</m:t></m:r><m:d><m:dPr><m:begChr m:val="(" /><m:endChr m:val=")" /><m:sepChr m:val="" /><m:grow /></m:dPr><m:e><m:r><m:t>n</m:t></m:r></m:e></m:d></m:num><m:den><m:sSup><m:e><m:r><m:t>n</m:t></m:r></m:e><m:sup><m:r><m:t>l</m:t></m:r><m:r><m:t>o</m:t></m:r><m:sSubSup><m:e><m:r><m:t>g</m:t></m:r></m:e><m:sub><m:r><m:t>b</m:t></m:r></m:sub><m:sup><m:r><m:t>a</m:t></m:r></m:sup></m:sSubSup></m:sup></m:sSup></m:den></m:f><m:r><m:rPr><m:sty m:val="p" /></m:rPr><m:t>=</m:t></m:r><m:f><m:fPr><m:type m:val="bar" /></m:fPr><m:num><m:sSup><m:e><m:r><m:t>n</m:t></m:r></m:e><m:sup><m:r><m:t>3</m:t></m:r></m:sup></m:sSup></m:num><m:den><m:sSup><m:e><m:r><m:t>n</m:t></m:r></m:e><m:sup><m:r><m:t>2</m:t></m:r></m:sup></m:sSup></m:den></m:f><m:r><m:rPr><m:sty m:val="p" /></m:rPr><m:t>=</m:t></m:r><m:r><m:t>n</m:t></m:r><m:r><m:rPr><m:sty m:val="p" /></m:rPr><m:t>=</m:t></m:r><m:r><m:t>Ω</m:t></m:r><m:d><m:dPr><m:begChr m:val="(" /><m:endChr m:val=")" /><m:sepChr m:val="" /><m:grow /></m:dPr><m:e><m:sSup><m:e><m:r><m:t>n</m:t></m:r></m:e><m:sup><m:r><m:t>ε</m:t></m:r></m:sup></m:sSup></m:e></m:d></m:oMath></a14:m></a:p></p:txBody></p:sp></mc:Choice></mc:AlternateContent></p:spTree></p:cSld></p:sld>
+<file path=ppt/slides/slide43.xml><?xml version="1.0" encoding="UTF-8"?><p:sld xmlns:a="http://schemas.openxmlformats.org/drawingml/2006/main" xmlns:r="http://schemas.openxmlformats.org/officeDocument/2006/relationships" xmlns:p="http://schemas.openxmlformats.org/presentationml/2006/main"><p:cSld><p:spTree><p:nvGrpSpPr><p:cNvPr id="1" name="" /><p:cNvGrpSpPr /><p:nvPr /></p:nvGrpSpPr><p:grpSpPr><a:xfrm><a:off x="0" y="0" /><a:ext cx="0" cy="0" /><a:chOff x="0" y="0" /><a:chExt cx="0" cy="0" /></a:xfrm></p:grpSpPr><p:sp><p:nvSpPr><p:cNvPr id="2" name="Title 1" /><p:cNvSpPr><a:spLocks noGrp="1" /></p:cNvSpPr><p:nvPr><p:ph type="title" /></p:nvPr></p:nvSpPr><p:spPr /><p:txBody><a:bodyPr /><a:lstStyle /><a:p><a:pPr lvl="0" indent="0" marL="0"><a:buNone /></a:pPr><a:r><a:rPr /><a:t>The Master Method Example (case-3) (1) : </a:t></a:r><a14:m><m:oMath xmlns:m="http://schemas.openxmlformats.org/officeDocument/2006/math"><m:r><m:t>T</m:t></m:r><m:d><m:dPr><m:begChr m:val="(" /><m:endChr m:val=")" /><m:sepChr m:val="" /><m:grow /></m:dPr><m:e><m:r><m:t>n</m:t></m:r></m:e></m:d><m:r><m:rPr><m:sty m:val="p" /></m:rPr><m:t>=</m:t></m:r><m:r><m:t>4</m:t></m:r><m:r><m:t>T</m:t></m:r><m:d><m:dPr><m:begChr m:val="(" /><m:endChr m:val=")" /><m:sepChr m:val="" /><m:grow /></m:dPr><m:e><m:r><m:t>n</m:t></m:r><m:r><m:rPr><m:sty m:val="p" /></m:rPr><m:t>/</m:t></m:r><m:r><m:t>2</m:t></m:r></m:e></m:d><m:r><m:rPr><m:sty m:val="p" /></m:rPr><m:t>+</m:t></m:r><m:sSup><m:e><m:r><m:t>n</m:t></m:r></m:e><m:sup><m:r><m:t>3</m:t></m:r></m:sup></m:sSup></m:oMath></a14:m></a:p></p:txBody></p:sp><mc:AlternateContent xmlns:mc="http://schemas.openxmlformats.org/markup-compatibility/2006"><mc:Choice xmlns:a14="http://schemas.microsoft.com/office/drawing/2010/main" Requires="a14"><p:sp><p:nvSpPr><p:cNvPr id="3" name="Content Placeholder 2" /><p:cNvSpPr><a:spLocks noGrp="1" /></p:cNvSpPr><p:nvPr><p:ph idx="1" /></p:nvPr></p:nvSpPr><p:spPr /><p:txBody><a:bodyPr /><a:lstStyle /><a:p><a:pPr lvl="0" /><a14:m><m:oMath xmlns:m="http://schemas.openxmlformats.org/officeDocument/2006/math"><m:r><m:t>a</m:t></m:r><m:r><m:rPr><m:sty m:val="p" /></m:rPr><m:t>=</m:t></m:r><m:r><m:t>4</m:t></m:r></m:oMath></a14:m></a:p><a:p><a:pPr lvl="0" /><a14:m><m:oMath xmlns:m="http://schemas.openxmlformats.org/officeDocument/2006/math"><m:r><m:t>b</m:t></m:r><m:r><m:rPr><m:sty m:val="p" /></m:rPr><m:t>=</m:t></m:r><m:r><m:t>2</m:t></m:r></m:oMath></a14:m></a:p><a:p><a:pPr lvl="0" /><a14:m><m:oMath xmlns:m="http://schemas.openxmlformats.org/officeDocument/2006/math"><m:r><m:t>f</m:t></m:r><m:d><m:dPr><m:begChr m:val="(" /><m:endChr m:val=")" /><m:sepChr m:val="" /><m:grow /></m:dPr><m:e><m:r><m:t>n</m:t></m:r></m:e></m:d><m:r><m:rPr><m:sty m:val="p" /></m:rPr><m:t>=</m:t></m:r><m:sSup><m:e><m:r><m:t>n</m:t></m:r></m:e><m:sup><m:r><m:t>3</m:t></m:r></m:sup></m:sSup></m:oMath></a14:m></a:p><a:p><a:pPr lvl="0" /><a14:m><m:oMath xmlns:m="http://schemas.openxmlformats.org/officeDocument/2006/math"><m:sSup><m:e><m:r><m:t>n</m:t></m:r></m:e><m:sup><m:r><m:t>l</m:t></m:r><m:r><m:t>o</m:t></m:r><m:sSubSup><m:e><m:r><m:t>g</m:t></m:r></m:e><m:sub><m:r><m:t>b</m:t></m:r></m:sub><m:sup><m:r><m:t>a</m:t></m:r></m:sup></m:sSubSup></m:sup></m:sSup><m:r><m:rPr><m:sty m:val="p" /></m:rPr><m:t>=</m:t></m:r><m:sSup><m:e><m:r><m:t>n</m:t></m:r></m:e><m:sup><m:r><m:t>l</m:t></m:r><m:r><m:t>o</m:t></m:r><m:sSubSup><m:e><m:r><m:t>g</m:t></m:r></m:e><m:sub><m:r><m:t>2</m:t></m:r></m:sub><m:sup><m:r><m:t>4</m:t></m:r></m:sup></m:sSubSup></m:sup></m:sSup><m:r><m:rPr><m:sty m:val="p" /></m:rPr><m:t>=</m:t></m:r><m:sSup><m:e><m:r><m:t>n</m:t></m:r></m:e><m:sup><m:r><m:t>l</m:t></m:r><m:r><m:t>o</m:t></m:r><m:sSubSup><m:e><m:r><m:t>g</m:t></m:r></m:e><m:sub><m:r><m:t>2</m:t></m:r></m:sub><m:sup><m:sSup><m:e><m:r><m:t>2</m:t></m:r></m:e><m:sup><m:r><m:t>2</m:t></m:r></m:sup></m:sSup></m:sup></m:sSubSup></m:sup></m:sSup><m:r><m:rPr><m:sty m:val="p" /></m:rPr><m:t>=</m:t></m:r><m:sSup><m:e><m:r><m:t>n</m:t></m:r></m:e><m:sup><m:r><m:t>2</m:t></m:r><m:r><m:t>l</m:t></m:r><m:r><m:t>o</m:t></m:r><m:sSubSup><m:e><m:r><m:t>g</m:t></m:r></m:e><m:sub><m:r><m:t>2</m:t></m:r></m:sub><m:sup><m:r><m:t>2</m:t></m:r></m:sup></m:sSubSup></m:sup></m:sSup><m:r><m:rPr><m:sty m:val="p" /></m:rPr><m:t>=</m:t></m:r><m:sSup><m:e><m:r><m:t>n</m:t></m:r></m:e><m:sup><m:r><m:t>2</m:t></m:r></m:sup></m:sSup></m:oMath></a14:m></a:p><a:p><a:pPr lvl="0" /><a14:m><m:oMath xmlns:m="http://schemas.openxmlformats.org/officeDocument/2006/math"><m:r><m:t>f</m:t></m:r><m:d><m:dPr><m:begChr m:val="(" /><m:endChr m:val=")" /><m:sepChr m:val="" /><m:grow /></m:dPr><m:e><m:r><m:t>n</m:t></m:r></m:e></m:d><m:r><m:rPr><m:sty m:val="p" /></m:rPr><m:t>=</m:t></m:r><m:sSup><m:e><m:r><m:t>n</m:t></m:r></m:e><m:sup><m:r><m:t>3</m:t></m:r></m:sup></m:sSup></m:oMath></a14:m><a:r><a:rPr /><a:t> grows polynomially faster than </a:t></a:r><a14:m><m:oMath xmlns:m="http://schemas.openxmlformats.org/officeDocument/2006/math"><m:sSup><m:e><m:r><m:t>n</m:t></m:r></m:e><m:sup><m:r><m:t>l</m:t></m:r><m:r><m:t>o</m:t></m:r><m:sSubSup><m:e><m:r><m:t>g</m:t></m:r></m:e><m:sub><m:r><m:t>b</m:t></m:r></m:sub><m:sup><m:r><m:t>a</m:t></m:r></m:sup></m:sSubSup></m:sup></m:sSup><m:r><m:rPr><m:sty m:val="p" /></m:rPr><m:t>=</m:t></m:r><m:sSup><m:e><m:r><m:t>n</m:t></m:r></m:e><m:sup><m:r><m:t>2</m:t></m:r></m:sup></m:sSup></m:oMath></a14:m></a:p><a:p><a:pPr lvl="1" /><a14:m><m:oMath xmlns:m="http://schemas.openxmlformats.org/officeDocument/2006/math"><m:f><m:fPr><m:type m:val="bar" /></m:fPr><m:num><m:r><m:t>f</m:t></m:r><m:d><m:dPr><m:begChr m:val="(" /><m:endChr m:val=")" /><m:sepChr m:val="" /><m:grow /></m:dPr><m:e><m:r><m:t>n</m:t></m:r></m:e></m:d></m:num><m:den><m:sSup><m:e><m:r><m:t>n</m:t></m:r></m:e><m:sup><m:r><m:t>l</m:t></m:r><m:r><m:t>o</m:t></m:r><m:sSubSup><m:e><m:r><m:t>g</m:t></m:r></m:e><m:sub><m:r><m:t>b</m:t></m:r></m:sub><m:sup><m:r><m:t>a</m:t></m:r></m:sup></m:sSubSup></m:sup></m:sSup></m:den></m:f><m:r><m:rPr><m:sty m:val="p" /></m:rPr><m:t>=</m:t></m:r><m:f><m:fPr><m:type m:val="bar" /></m:fPr><m:num><m:sSup><m:e><m:r><m:t>n</m:t></m:r></m:e><m:sup><m:r><m:t>3</m:t></m:r></m:sup></m:sSup></m:num><m:den><m:sSup><m:e><m:r><m:t>n</m:t></m:r></m:e><m:sup><m:r><m:t>2</m:t></m:r></m:sup></m:sSup></m:den></m:f><m:r><m:rPr><m:sty m:val="p" /></m:rPr><m:t>=</m:t></m:r><m:r><m:t>n</m:t></m:r><m:r><m:rPr><m:sty m:val="p" /></m:rPr><m:t>=</m:t></m:r><m:r><m:t>Ω</m:t></m:r><m:d><m:dPr><m:begChr m:val="(" /><m:endChr m:val=")" /><m:sepChr m:val="" /><m:grow /></m:dPr><m:e><m:sSup><m:e><m:r><m:t>n</m:t></m:r></m:e><m:sup><m:r><m:t>ε</m:t></m:r></m:sup></m:sSup></m:e></m:d></m:oMath></a14:m></a:p></p:txBody></p:sp></mc:Choice></mc:AlternateContent></p:spTree></p:cSld></p:sld>
 </file>
 
-<file path=ppt/slides/slide44.xml><?xml version="1.0" encoding="UTF-8"?><p:sld xmlns:a="http://schemas.openxmlformats.org/drawingml/2006/main" xmlns:r="http://schemas.openxmlformats.org/officeDocument/2006/relationships" xmlns:p="http://schemas.openxmlformats.org/presentationml/2006/main"><p:cSld><p:spTree><p:nvGrpSpPr><p:cNvPr id="1" name="" /><p:cNvGrpSpPr /><p:nvPr /></p:nvGrpSpPr><p:grpSpPr><a:xfrm><a:off x="0" y="0" /><a:ext cx="0" cy="0" /><a:chOff x="0" y="0" /><a:chExt cx="0" cy="0" /></a:xfrm></p:grpSpPr><p:sp><p:nvSpPr><p:cNvPr id="2" name="Title 1" /><p:cNvSpPr><a:spLocks noGrp="1" /></p:cNvSpPr><p:nvPr><p:ph type="title" /></p:nvPr></p:nvSpPr><p:spPr /><p:txBody><a:bodyPr /><a:lstStyle /><a:p><a:pPr lvl="0" indent="0" marL="0"><a:buNone /></a:pPr><a:r><a:rPr /><a:t>Example : </a:t></a:r><a14:m><m:oMath xmlns:m="http://schemas.openxmlformats.org/officeDocument/2006/math"><m:r><m:t>T</m:t></m:r><m:d><m:dPr><m:begChr m:val="(" /><m:endChr m:val=")" /><m:sepChr m:val="" /><m:grow /></m:dPr><m:e><m:r><m:t>n</m:t></m:r></m:e></m:d><m:r><m:rPr><m:sty m:val="p" /></m:rPr><m:t>=</m:t></m:r><m:r><m:t>4</m:t></m:r><m:r><m:t>T</m:t></m:r><m:d><m:dPr><m:begChr m:val="(" /><m:endChr m:val=")" /><m:sepChr m:val="" /><m:grow /></m:dPr><m:e><m:r><m:t>n</m:t></m:r><m:r><m:rPr><m:sty m:val="p" /></m:rPr><m:t>/</m:t></m:r><m:r><m:t>2</m:t></m:r></m:e></m:d><m:r><m:rPr><m:sty m:val="p" /></m:rPr><m:t>+</m:t></m:r><m:sSup><m:e><m:r><m:t>n</m:t></m:r></m:e><m:sup><m:r><m:t>3</m:t></m:r></m:sup></m:sSup></m:oMath></a14:m><a:r><a:rPr /><a:t> (con’t)</a:t></a:r></a:p></p:txBody></p:sp><mc:AlternateContent xmlns:mc="http://schemas.openxmlformats.org/markup-compatibility/2006"><mc:Choice xmlns:a14="http://schemas.microsoft.com/office/drawing/2010/main" Requires="a14"><p:sp><p:nvSpPr><p:cNvPr id="3" name="Content Placeholder 2" /><p:cNvSpPr><a:spLocks noGrp="1" /></p:cNvSpPr><p:nvPr><p:ph idx="1" /></p:nvPr></p:nvSpPr><p:spPr /><p:txBody><a:bodyPr /><a:lstStyle /><a:p><a:pPr lvl="0" /><a:r><a:rPr /><a:t>Seems like CASE 3, but need to check the regularity condition</a:t></a:r></a:p><a:p><a:pPr lvl="0" /><a:r><a:rPr /><a:t>Regularity condition </a:t></a:r><a14:m><m:oMath xmlns:m="http://schemas.openxmlformats.org/officeDocument/2006/math"><m:r><m:t>a</m:t></m:r><m:r><m:t>f</m:t></m:r><m:d><m:dPr><m:begChr m:val="(" /><m:endChr m:val=")" /><m:sepChr m:val="" /><m:grow /></m:dPr><m:e><m:r><m:t>n</m:t></m:r><m:r><m:rPr><m:sty m:val="p" /></m:rPr><m:t>/</m:t></m:r><m:r><m:t>b</m:t></m:r></m:e></m:d><m:r><m:rPr><m:sty m:val="p" /></m:rPr><m:t>≤</m:t></m:r><m:r><m:t>c</m:t></m:r><m:r><m:t>f</m:t></m:r><m:d><m:dPr><m:begChr m:val="(" /><m:endChr m:val=")" /><m:sepChr m:val="" /><m:grow /></m:dPr><m:e><m:r><m:t>n</m:t></m:r></m:e></m:d></m:oMath></a14:m><a:r><a:rPr /><a:t> for some constant </a:t></a:r><a14:m><m:oMath xmlns:m="http://schemas.openxmlformats.org/officeDocument/2006/math"><m:r><m:t>c</m:t></m:r><m:r><m:rPr><m:sty m:val="p" /></m:rPr><m:t>&lt;</m:t></m:r><m:r><m:t>1</m:t></m:r></m:oMath></a14:m></a:p><a:p><a:pPr lvl="0" /><a14:m><m:oMath xmlns:m="http://schemas.openxmlformats.org/officeDocument/2006/math"><m:r><m:t>4</m:t></m:r><m:sSup><m:e><m:d><m:dPr><m:begChr m:val="(" /><m:endChr m:val=")" /><m:sepChr m:val="" /><m:grow /></m:dPr><m:e><m:r><m:t>n</m:t></m:r><m:r><m:rPr><m:sty m:val="p" /></m:rPr><m:t>/</m:t></m:r><m:r><m:t>2</m:t></m:r></m:e></m:d></m:e><m:sup><m:r><m:t>3</m:t></m:r></m:sup></m:sSup><m:r><m:rPr><m:sty m:val="p" /></m:rPr><m:t>≤</m:t></m:r><m:r><m:t>c</m:t></m:r><m:sSup><m:e><m:r><m:t>n</m:t></m:r></m:e><m:sup><m:r><m:t>3</m:t></m:r></m:sup></m:sSup></m:oMath></a14:m><a:r><a:rPr /><a:t> for </a:t></a:r><a14:m><m:oMath xmlns:m="http://schemas.openxmlformats.org/officeDocument/2006/math"><m:r><m:t>c</m:t></m:r><m:r><m:rPr><m:sty m:val="p" /></m:rPr><m:t>=</m:t></m:r><m:r><m:t>1</m:t></m:r><m:r><m:rPr><m:sty m:val="p" /></m:rPr><m:t>/</m:t></m:r><m:r><m:t>2</m:t></m:r></m:oMath></a14:m></a:p><a:p><a:pPr lvl="0" /><a:r><a:rPr /><a:t>CASE-3:</a:t></a:r></a:p><a:p><a:pPr lvl="1" /><a14:m><m:oMath xmlns:m="http://schemas.openxmlformats.org/officeDocument/2006/math"><m:r><m:t>T</m:t></m:r><m:d><m:dPr><m:begChr m:val="(" /><m:endChr m:val=")" /><m:sepChr m:val="" /><m:grow /></m:dPr><m:e><m:r><m:t>n</m:t></m:r></m:e></m:d><m:r><m:rPr><m:sty m:val="p" /></m:rPr><m:t>=</m:t></m:r><m:r><m:t>Θ</m:t></m:r><m:d><m:dPr><m:begChr m:val="(" /><m:endChr m:val=")" /><m:sepChr m:val="" /><m:grow /></m:dPr><m:e><m:r><m:t>f</m:t></m:r><m:d><m:dPr><m:begChr m:val="(" /><m:endChr m:val=")" /><m:sepChr m:val="" /><m:grow /></m:dPr><m:e><m:r><m:t>n</m:t></m:r></m:e></m:d></m:e></m:d></m:oMath></a14:m><a:r><a:rPr /><a:t> </a:t></a:r><a14:m><m:oMath xmlns:m="http://schemas.openxmlformats.org/officeDocument/2006/math"><m:r><m:rPr><m:sty m:val="p" /></m:rPr><m:t>⇒</m:t></m:r></m:oMath></a14:m><a:r><a:rPr /><a:t> </a:t></a:r><a14:m><m:oMath xmlns:m="http://schemas.openxmlformats.org/officeDocument/2006/math"><m:r><m:t>T</m:t></m:r><m:d><m:dPr><m:begChr m:val="(" /><m:endChr m:val=")" /><m:sepChr m:val="" /><m:grow /></m:dPr><m:e><m:r><m:t>n</m:t></m:r></m:e></m:d><m:r><m:rPr><m:sty m:val="p" /></m:rPr><m:t>=</m:t></m:r><m:r><m:t>Θ</m:t></m:r><m:d><m:dPr><m:begChr m:val="(" /><m:endChr m:val=")" /><m:sepChr m:val="" /><m:grow /></m:dPr><m:e><m:sSup><m:e><m:r><m:t>n</m:t></m:r></m:e><m:sup><m:r><m:t>3</m:t></m:r></m:sup></m:sSup></m:e></m:d></m:oMath></a14:m></a:p></p:txBody></p:sp></mc:Choice></mc:AlternateContent></p:spTree></p:cSld></p:sld>
+<file path=ppt/slides/slide44.xml><?xml version="1.0" encoding="UTF-8"?><p:sld xmlns:a="http://schemas.openxmlformats.org/drawingml/2006/main" xmlns:r="http://schemas.openxmlformats.org/officeDocument/2006/relationships" xmlns:p="http://schemas.openxmlformats.org/presentationml/2006/main"><p:cSld><p:spTree><p:nvGrpSpPr><p:cNvPr id="1" name="" /><p:cNvGrpSpPr /><p:nvPr /></p:nvGrpSpPr><p:grpSpPr><a:xfrm><a:off x="0" y="0" /><a:ext cx="0" cy="0" /><a:chOff x="0" y="0" /><a:chExt cx="0" cy="0" /></a:xfrm></p:grpSpPr><p:sp><p:nvSpPr><p:cNvPr id="2" name="Title 1" /><p:cNvSpPr><a:spLocks noGrp="1" /></p:cNvSpPr><p:nvPr><p:ph type="title" /></p:nvPr></p:nvSpPr><p:spPr /><p:txBody><a:bodyPr /><a:lstStyle /><a:p><a:pPr lvl="0" indent="0" marL="0"><a:buNone /></a:pPr><a:r><a:rPr /><a:t>The Master Method Example (case-3) (2) : </a:t></a:r><a14:m><m:oMath xmlns:m="http://schemas.openxmlformats.org/officeDocument/2006/math"><m:r><m:t>T</m:t></m:r><m:d><m:dPr><m:begChr m:val="(" /><m:endChr m:val=")" /><m:sepChr m:val="" /><m:grow /></m:dPr><m:e><m:r><m:t>n</m:t></m:r></m:e></m:d><m:r><m:rPr><m:sty m:val="p" /></m:rPr><m:t>=</m:t></m:r><m:r><m:t>4</m:t></m:r><m:r><m:t>T</m:t></m:r><m:d><m:dPr><m:begChr m:val="(" /><m:endChr m:val=")" /><m:sepChr m:val="" /><m:grow /></m:dPr><m:e><m:r><m:t>n</m:t></m:r><m:r><m:rPr><m:sty m:val="p" /></m:rPr><m:t>/</m:t></m:r><m:r><m:t>2</m:t></m:r></m:e></m:d><m:r><m:rPr><m:sty m:val="p" /></m:rPr><m:t>+</m:t></m:r><m:sSup><m:e><m:r><m:t>n</m:t></m:r></m:e><m:sup><m:r><m:t>3</m:t></m:r></m:sup></m:sSup></m:oMath></a14:m><a:r><a:rPr /><a:t> (con’t)</a:t></a:r></a:p></p:txBody></p:sp><mc:AlternateContent xmlns:mc="http://schemas.openxmlformats.org/markup-compatibility/2006"><mc:Choice xmlns:a14="http://schemas.microsoft.com/office/drawing/2010/main" Requires="a14"><p:sp><p:nvSpPr><p:cNvPr id="3" name="Content Placeholder 2" /><p:cNvSpPr><a:spLocks noGrp="1" /></p:cNvSpPr><p:nvPr><p:ph idx="1" /></p:nvPr></p:nvSpPr><p:spPr /><p:txBody><a:bodyPr /><a:lstStyle /><a:p><a:pPr lvl="0" /><a:r><a:rPr /><a:t>Seems like CASE 3, but need to check the regularity condition</a:t></a:r></a:p><a:p><a:pPr lvl="0" /><a:r><a:rPr /><a:t>Regularity condition </a:t></a:r><a14:m><m:oMath xmlns:m="http://schemas.openxmlformats.org/officeDocument/2006/math"><m:r><m:t>a</m:t></m:r><m:r><m:t>f</m:t></m:r><m:d><m:dPr><m:begChr m:val="(" /><m:endChr m:val=")" /><m:sepChr m:val="" /><m:grow /></m:dPr><m:e><m:r><m:t>n</m:t></m:r><m:r><m:rPr><m:sty m:val="p" /></m:rPr><m:t>/</m:t></m:r><m:r><m:t>b</m:t></m:r></m:e></m:d><m:r><m:rPr><m:sty m:val="p" /></m:rPr><m:t>≤</m:t></m:r><m:r><m:t>c</m:t></m:r><m:r><m:t>f</m:t></m:r><m:d><m:dPr><m:begChr m:val="(" /><m:endChr m:val=")" /><m:sepChr m:val="" /><m:grow /></m:dPr><m:e><m:r><m:t>n</m:t></m:r></m:e></m:d></m:oMath></a14:m><a:r><a:rPr /><a:t> for some constant </a:t></a:r><a14:m><m:oMath xmlns:m="http://schemas.openxmlformats.org/officeDocument/2006/math"><m:r><m:t>c</m:t></m:r><m:r><m:rPr><m:sty m:val="p" /></m:rPr><m:t>&lt;</m:t></m:r><m:r><m:t>1</m:t></m:r></m:oMath></a14:m></a:p><a:p><a:pPr lvl="0" /><a14:m><m:oMath xmlns:m="http://schemas.openxmlformats.org/officeDocument/2006/math"><m:r><m:t>4</m:t></m:r><m:sSup><m:e><m:d><m:dPr><m:begChr m:val="(" /><m:endChr m:val=")" /><m:sepChr m:val="" /><m:grow /></m:dPr><m:e><m:r><m:t>n</m:t></m:r><m:r><m:rPr><m:sty m:val="p" /></m:rPr><m:t>/</m:t></m:r><m:r><m:t>2</m:t></m:r></m:e></m:d></m:e><m:sup><m:r><m:t>3</m:t></m:r></m:sup></m:sSup><m:r><m:rPr><m:sty m:val="p" /></m:rPr><m:t>≤</m:t></m:r><m:r><m:t>c</m:t></m:r><m:sSup><m:e><m:r><m:t>n</m:t></m:r></m:e><m:sup><m:r><m:t>3</m:t></m:r></m:sup></m:sSup></m:oMath></a14:m><a:r><a:rPr /><a:t> for </a:t></a:r><a14:m><m:oMath xmlns:m="http://schemas.openxmlformats.org/officeDocument/2006/math"><m:r><m:t>c</m:t></m:r><m:r><m:rPr><m:sty m:val="p" /></m:rPr><m:t>=</m:t></m:r><m:r><m:t>1</m:t></m:r><m:r><m:rPr><m:sty m:val="p" /></m:rPr><m:t>/</m:t></m:r><m:r><m:t>2</m:t></m:r></m:oMath></a14:m></a:p><a:p><a:pPr lvl="0" /><a:r><a:rPr /><a:t>CASE-3:</a:t></a:r></a:p><a:p><a:pPr lvl="1" /><a14:m><m:oMath xmlns:m="http://schemas.openxmlformats.org/officeDocument/2006/math"><m:r><m:t>T</m:t></m:r><m:d><m:dPr><m:begChr m:val="(" /><m:endChr m:val=")" /><m:sepChr m:val="" /><m:grow /></m:dPr><m:e><m:r><m:t>n</m:t></m:r></m:e></m:d><m:r><m:rPr><m:sty m:val="p" /></m:rPr><m:t>=</m:t></m:r><m:r><m:t>Θ</m:t></m:r><m:d><m:dPr><m:begChr m:val="(" /><m:endChr m:val=")" /><m:sepChr m:val="" /><m:grow /></m:dPr><m:e><m:r><m:t>f</m:t></m:r><m:d><m:dPr><m:begChr m:val="(" /><m:endChr m:val=")" /><m:sepChr m:val="" /><m:grow /></m:dPr><m:e><m:r><m:t>n</m:t></m:r></m:e></m:d></m:e></m:d></m:oMath></a14:m><a:r><a:rPr /><a:t> </a:t></a:r><a14:m><m:oMath xmlns:m="http://schemas.openxmlformats.org/officeDocument/2006/math"><m:r><m:rPr><m:sty m:val="p" /></m:rPr><m:t>⇒</m:t></m:r></m:oMath></a14:m><a:r><a:rPr /><a:t> </a:t></a:r><a14:m><m:oMath xmlns:m="http://schemas.openxmlformats.org/officeDocument/2006/math"><m:r><m:t>T</m:t></m:r><m:d><m:dPr><m:begChr m:val="(" /><m:endChr m:val=")" /><m:sepChr m:val="" /><m:grow /></m:dPr><m:e><m:r><m:t>n</m:t></m:r></m:e></m:d><m:r><m:rPr><m:sty m:val="p" /></m:rPr><m:t>=</m:t></m:r><m:r><m:t>Θ</m:t></m:r><m:d><m:dPr><m:begChr m:val="(" /><m:endChr m:val=")" /><m:sepChr m:val="" /><m:grow /></m:dPr><m:e><m:sSup><m:e><m:r><m:t>n</m:t></m:r></m:e><m:sup><m:r><m:t>3</m:t></m:r></m:sup></m:sSup></m:e></m:d></m:oMath></a14:m></a:p></p:txBody></p:sp></mc:Choice></mc:AlternateContent></p:spTree></p:cSld></p:sld>
 </file>
 
-<file path=ppt/slides/slide45.xml><?xml version="1.0" encoding="UTF-8"?><p:sld xmlns:a="http://schemas.openxmlformats.org/drawingml/2006/main" xmlns:r="http://schemas.openxmlformats.org/officeDocument/2006/relationships" xmlns:p="http://schemas.openxmlformats.org/presentationml/2006/main"><p:cSld><p:spTree><p:nvGrpSpPr><p:cNvPr id="1" name="" /><p:cNvGrpSpPr /><p:nvPr /></p:nvGrpSpPr><p:grpSpPr><a:xfrm><a:off x="0" y="0" /><a:ext cx="0" cy="0" /><a:chOff x="0" y="0" /><a:chExt cx="0" cy="0" /></a:xfrm></p:grpSpPr><p:sp><p:nvSpPr><p:cNvPr id="2" name="Title 1" /><p:cNvSpPr><a:spLocks noGrp="1" /></p:cNvSpPr><p:nvPr><p:ph type="title" /></p:nvPr></p:nvSpPr><p:spPr /><p:txBody><a:bodyPr /><a:lstStyle /><a:p><a:pPr lvl="0" indent="0" marL="0"><a:buNone /></a:pPr><a:r><a:rPr /><a:t>Example : </a:t></a:r><a14:m><m:oMath xmlns:m="http://schemas.openxmlformats.org/officeDocument/2006/math"><m:r><m:t>T</m:t></m:r><m:d><m:dPr><m:begChr m:val="(" /><m:endChr m:val=")" /><m:sepChr m:val="" /><m:grow /></m:dPr><m:e><m:r><m:t>n</m:t></m:r></m:e></m:d><m:r><m:rPr><m:sty m:val="p" /></m:rPr><m:t>=</m:t></m:r><m:r><m:t>4</m:t></m:r><m:r><m:t>T</m:t></m:r><m:d><m:dPr><m:begChr m:val="(" /><m:endChr m:val=")" /><m:sepChr m:val="" /><m:grow /></m:dPr><m:e><m:r><m:t>n</m:t></m:r><m:r><m:rPr><m:sty m:val="p" /></m:rPr><m:t>/</m:t></m:r><m:r><m:t>2</m:t></m:r></m:e></m:d><m:r><m:rPr><m:sty m:val="p" /></m:rPr><m:t>+</m:t></m:r><m:sSup><m:e><m:r><m:t>n</m:t></m:r></m:e><m:sup><m:r><m:t>2</m:t></m:r></m:sup></m:sSup><m:r><m:t>l</m:t></m:r><m:r><m:t>g</m:t></m:r><m:r><m:t>n</m:t></m:r></m:oMath></a14:m></a:p></p:txBody></p:sp><mc:AlternateContent xmlns:mc="http://schemas.openxmlformats.org/markup-compatibility/2006"><mc:Choice xmlns:a14="http://schemas.microsoft.com/office/drawing/2010/main" Requires="a14"><p:sp><p:nvSpPr><p:cNvPr id="3" name="Content Placeholder 2" /><p:cNvSpPr><a:spLocks noGrp="1" /></p:cNvSpPr><p:nvPr><p:ph idx="1" /></p:nvPr></p:nvSpPr><p:spPr /><p:txBody><a:bodyPr /><a:lstStyle /><a:p><a:pPr lvl="0" /><a14:m><m:oMath xmlns:m="http://schemas.openxmlformats.org/officeDocument/2006/math"><m:r><m:t>a</m:t></m:r><m:r><m:rPr><m:sty m:val="p" /></m:rPr><m:t>=</m:t></m:r><m:r><m:t>4</m:t></m:r></m:oMath></a14:m></a:p><a:p><a:pPr lvl="0" /><a14:m><m:oMath xmlns:m="http://schemas.openxmlformats.org/officeDocument/2006/math"><m:r><m:t>b</m:t></m:r><m:r><m:rPr><m:sty m:val="p" /></m:rPr><m:t>=</m:t></m:r><m:r><m:t>2</m:t></m:r></m:oMath></a14:m></a:p><a:p><a:pPr lvl="0" /><a14:m><m:oMath xmlns:m="http://schemas.openxmlformats.org/officeDocument/2006/math"><m:r><m:t>f</m:t></m:r><m:d><m:dPr><m:begChr m:val="(" /><m:endChr m:val=")" /><m:sepChr m:val="" /><m:grow /></m:dPr><m:e><m:r><m:t>n</m:t></m:r></m:e></m:d><m:r><m:rPr><m:sty m:val="p" /></m:rPr><m:t>=</m:t></m:r><m:sSup><m:e><m:r><m:t>n</m:t></m:r></m:e><m:sup><m:r><m:t>2</m:t></m:r></m:sup></m:sSup><m:r><m:t>l</m:t></m:r><m:r><m:t>g</m:t></m:r><m:r><m:t>n</m:t></m:r></m:oMath></a14:m></a:p><a:p><a:pPr lvl="0" /><a14:m><m:oMath xmlns:m="http://schemas.openxmlformats.org/officeDocument/2006/math"><m:sSup><m:e><m:r><m:t>n</m:t></m:r></m:e><m:sup><m:r><m:t>l</m:t></m:r><m:r><m:t>o</m:t></m:r><m:sSubSup><m:e><m:r><m:t>g</m:t></m:r></m:e><m:sub><m:r><m:t>b</m:t></m:r></m:sub><m:sup><m:r><m:t>a</m:t></m:r></m:sup></m:sSubSup></m:sup></m:sSup><m:r><m:rPr><m:sty m:val="p" /></m:rPr><m:t>=</m:t></m:r><m:sSup><m:e><m:r><m:t>n</m:t></m:r></m:e><m:sup><m:r><m:t>l</m:t></m:r><m:r><m:t>o</m:t></m:r><m:sSubSup><m:e><m:r><m:t>g</m:t></m:r></m:e><m:sub><m:r><m:t>2</m:t></m:r></m:sub><m:sup><m:r><m:t>4</m:t></m:r></m:sup></m:sSubSup></m:sup></m:sSup><m:r><m:rPr><m:sty m:val="p" /></m:rPr><m:t>=</m:t></m:r><m:sSup><m:e><m:r><m:t>n</m:t></m:r></m:e><m:sup><m:r><m:t>l</m:t></m:r><m:r><m:t>o</m:t></m:r><m:sSubSup><m:e><m:r><m:t>g</m:t></m:r></m:e><m:sub><m:r><m:t>2</m:t></m:r></m:sub><m:sup><m:sSup><m:e><m:r><m:t>2</m:t></m:r></m:e><m:sup><m:r><m:t>2</m:t></m:r></m:sup></m:sSup></m:sup></m:sSubSup></m:sup></m:sSup><m:r><m:rPr><m:sty m:val="p" /></m:rPr><m:t>=</m:t></m:r><m:sSup><m:e><m:r><m:t>n</m:t></m:r></m:e><m:sup><m:r><m:t>2</m:t></m:r><m:r><m:t>l</m:t></m:r><m:r><m:t>o</m:t></m:r><m:sSubSup><m:e><m:r><m:t>g</m:t></m:r></m:e><m:sub><m:r><m:t>2</m:t></m:r></m:sub><m:sup><m:r><m:t>2</m:t></m:r></m:sup></m:sSubSup></m:sup></m:sSup><m:r><m:rPr><m:sty m:val="p" /></m:rPr><m:t>=</m:t></m:r><m:sSup><m:e><m:r><m:t>n</m:t></m:r></m:e><m:sup><m:r><m:t>2</m:t></m:r></m:sup></m:sSup></m:oMath></a14:m></a:p><a:p><a:pPr lvl="0" /><a14:m><m:oMath xmlns:m="http://schemas.openxmlformats.org/officeDocument/2006/math"><m:r><m:t>f</m:t></m:r><m:d><m:dPr><m:begChr m:val="(" /><m:endChr m:val=")" /><m:sepChr m:val="" /><m:grow /></m:dPr><m:e><m:r><m:t>n</m:t></m:r></m:e></m:d><m:r><m:rPr><m:sty m:val="p" /></m:rPr><m:t>=</m:t></m:r><m:sSup><m:e><m:r><m:t>n</m:t></m:r></m:e><m:sup><m:r><m:t>2</m:t></m:r></m:sup></m:sSup><m:r><m:t>l</m:t></m:r><m:r><m:t>g</m:t></m:r><m:r><m:t>n</m:t></m:r></m:oMath></a14:m><a:r><a:rPr /><a:t> grows slower than </a:t></a:r><a14:m><m:oMath xmlns:m="http://schemas.openxmlformats.org/officeDocument/2006/math"><m:sSup><m:e><m:r><m:t>n</m:t></m:r></m:e><m:sup><m:r><m:t>l</m:t></m:r><m:r><m:t>o</m:t></m:r><m:sSubSup><m:e><m:r><m:t>g</m:t></m:r></m:e><m:sub><m:r><m:t>b</m:t></m:r></m:sub><m:sup><m:r><m:t>a</m:t></m:r></m:sup></m:sSubSup></m:sup></m:sSup><m:r><m:rPr><m:sty m:val="p" /></m:rPr><m:t>=</m:t></m:r><m:sSup><m:e><m:r><m:t>n</m:t></m:r></m:e><m:sup><m:r><m:t>2</m:t></m:r></m:sup></m:sSup></m:oMath></a14:m></a:p><a:p><a:pPr lvl="1" /><a:r><a:rPr /><a:t>but is it polynomially slower?</a:t></a:r></a:p><a:p><a:pPr lvl="1" /><a14:m><m:oMath xmlns:m="http://schemas.openxmlformats.org/officeDocument/2006/math"><m:f><m:fPr><m:type m:val="bar" /></m:fPr><m:num><m:sSup><m:e><m:r><m:t>n</m:t></m:r></m:e><m:sup><m:r><m:t>l</m:t></m:r><m:r><m:t>o</m:t></m:r><m:sSubSup><m:e><m:r><m:t>g</m:t></m:r></m:e><m:sub><m:r><m:t>b</m:t></m:r></m:sub><m:sup><m:r><m:t>a</m:t></m:r></m:sup></m:sSubSup></m:sup></m:sSup><m:r><m:t>f</m:t></m:r><m:d><m:dPr><m:begChr m:val="(" /><m:endChr m:val=")" /><m:sepChr m:val="" /><m:grow /></m:dPr><m:e><m:r><m:t>n</m:t></m:r></m:e></m:d></m:num><m:den><m:r><m:rPr><m:sty m:val="p" /></m:rPr><m:t>=</m:t></m:r></m:den></m:f><m:f><m:fPr><m:type m:val="bar" /></m:fPr><m:num><m:sSup><m:e><m:r><m:t>n</m:t></m:r></m:e><m:sup><m:r><m:t>2</m:t></m:r></m:sup></m:sSup></m:num><m:den><m:f><m:fPr><m:type m:val="bar" /></m:fPr><m:num><m:sSup><m:e><m:r><m:t>n</m:t></m:r></m:e><m:sup><m:r><m:t>2</m:t></m:r></m:sup></m:sSup></m:num><m:den><m:r><m:t>l</m:t></m:r><m:r><m:t>g</m:t></m:r><m:r><m:t>n</m:t></m:r></m:den></m:f></m:den></m:f><m:r><m:rPr><m:sty m:val="p" /></m:rPr><m:t>=</m:t></m:r><m:r><m:t>l</m:t></m:r><m:r><m:t>g</m:t></m:r><m:r><m:t>n</m:t></m:r><m:r><m:rPr><m:sty m:val="p" /></m:rPr><m:t>≠</m:t></m:r><m:r><m:t>Ω</m:t></m:r><m:d><m:dPr><m:begChr m:val="(" /><m:endChr m:val=")" /><m:sepChr m:val="" /><m:grow /></m:dPr><m:e><m:sSup><m:e><m:r><m:t>n</m:t></m:r></m:e><m:sup><m:r><m:t>ε</m:t></m:r></m:sup></m:sSup></m:e></m:d></m:oMath></a14:m><a:r><a:rPr /><a:t> for any </a:t></a:r><a14:m><m:oMath xmlns:m="http://schemas.openxmlformats.org/officeDocument/2006/math"><m:r><m:t>ε</m:t></m:r><m:r><m:rPr><m:sty m:val="p" /></m:rPr><m:t>&gt;</m:t></m:r><m:r><m:t>0</m:t></m:r></m:oMath></a14:m></a:p><a:p><a:pPr lvl="2" /><a:r><a:rPr /><a:t>is not CASE-1</a:t></a:r></a:p><a:p><a:pPr lvl="2" /><a:r><a:rPr /><a:t>Master Method does not apply!</a:t></a:r></a:p></p:txBody></p:sp></mc:Choice></mc:AlternateContent></p:spTree></p:cSld></p:sld>
+<file path=ppt/slides/slide45.xml><?xml version="1.0" encoding="UTF-8"?><p:sld xmlns:a="http://schemas.openxmlformats.org/drawingml/2006/main" xmlns:r="http://schemas.openxmlformats.org/officeDocument/2006/relationships" xmlns:p="http://schemas.openxmlformats.org/presentationml/2006/main"><p:cSld><p:spTree><p:nvGrpSpPr><p:cNvPr id="1" name="" /><p:cNvGrpSpPr /><p:nvPr /></p:nvGrpSpPr><p:grpSpPr><a:xfrm><a:off x="0" y="0" /><a:ext cx="0" cy="0" /><a:chOff x="0" y="0" /><a:chExt cx="0" cy="0" /></a:xfrm></p:grpSpPr><p:sp><p:nvSpPr><p:cNvPr id="2" name="Title 1" /><p:cNvSpPr><a:spLocks noGrp="1" /></p:cNvSpPr><p:nvPr><p:ph type="title" /></p:nvPr></p:nvSpPr><p:spPr /><p:txBody><a:bodyPr /><a:lstStyle /><a:p><a:pPr lvl="0" indent="0" marL="0"><a:buNone /></a:pPr><a:r><a:rPr /><a:t>The Master Method Example (N/A case) : </a:t></a:r><a14:m><m:oMath xmlns:m="http://schemas.openxmlformats.org/officeDocument/2006/math"><m:r><m:t>T</m:t></m:r><m:d><m:dPr><m:begChr m:val="(" /><m:endChr m:val=")" /><m:sepChr m:val="" /><m:grow /></m:dPr><m:e><m:r><m:t>n</m:t></m:r></m:e></m:d><m:r><m:rPr><m:sty m:val="p" /></m:rPr><m:t>=</m:t></m:r><m:r><m:t>4</m:t></m:r><m:r><m:t>T</m:t></m:r><m:d><m:dPr><m:begChr m:val="(" /><m:endChr m:val=")" /><m:sepChr m:val="" /><m:grow /></m:dPr><m:e><m:r><m:t>n</m:t></m:r><m:r><m:rPr><m:sty m:val="p" /></m:rPr><m:t>/</m:t></m:r><m:r><m:t>2</m:t></m:r></m:e></m:d><m:r><m:rPr><m:sty m:val="p" /></m:rPr><m:t>+</m:t></m:r><m:sSup><m:e><m:r><m:t>n</m:t></m:r></m:e><m:sup><m:r><m:t>2</m:t></m:r></m:sup></m:sSup><m:r><m:t>l</m:t></m:r><m:r><m:t>g</m:t></m:r><m:r><m:t>n</m:t></m:r></m:oMath></a14:m></a:p></p:txBody></p:sp><mc:AlternateContent xmlns:mc="http://schemas.openxmlformats.org/markup-compatibility/2006"><mc:Choice xmlns:a14="http://schemas.microsoft.com/office/drawing/2010/main" Requires="a14"><p:sp><p:nvSpPr><p:cNvPr id="3" name="Content Placeholder 2" /><p:cNvSpPr><a:spLocks noGrp="1" /></p:cNvSpPr><p:nvPr><p:ph idx="1" /></p:nvPr></p:nvSpPr><p:spPr /><p:txBody><a:bodyPr /><a:lstStyle /><a:p><a:pPr lvl="0" /><a14:m><m:oMath xmlns:m="http://schemas.openxmlformats.org/officeDocument/2006/math"><m:r><m:t>a</m:t></m:r><m:r><m:rPr><m:sty m:val="p" /></m:rPr><m:t>=</m:t></m:r><m:r><m:t>4</m:t></m:r></m:oMath></a14:m></a:p><a:p><a:pPr lvl="0" /><a14:m><m:oMath xmlns:m="http://schemas.openxmlformats.org/officeDocument/2006/math"><m:r><m:t>b</m:t></m:r><m:r><m:rPr><m:sty m:val="p" /></m:rPr><m:t>=</m:t></m:r><m:r><m:t>2</m:t></m:r></m:oMath></a14:m></a:p><a:p><a:pPr lvl="0" /><a14:m><m:oMath xmlns:m="http://schemas.openxmlformats.org/officeDocument/2006/math"><m:r><m:t>f</m:t></m:r><m:d><m:dPr><m:begChr m:val="(" /><m:endChr m:val=")" /><m:sepChr m:val="" /><m:grow /></m:dPr><m:e><m:r><m:t>n</m:t></m:r></m:e></m:d><m:r><m:rPr><m:sty m:val="p" /></m:rPr><m:t>=</m:t></m:r><m:sSup><m:e><m:r><m:t>n</m:t></m:r></m:e><m:sup><m:r><m:t>2</m:t></m:r></m:sup></m:sSup><m:r><m:t>l</m:t></m:r><m:r><m:t>g</m:t></m:r><m:r><m:t>n</m:t></m:r></m:oMath></a14:m></a:p><a:p><a:pPr lvl="0" /><a14:m><m:oMath xmlns:m="http://schemas.openxmlformats.org/officeDocument/2006/math"><m:sSup><m:e><m:r><m:t>n</m:t></m:r></m:e><m:sup><m:r><m:t>l</m:t></m:r><m:r><m:t>o</m:t></m:r><m:sSubSup><m:e><m:r><m:t>g</m:t></m:r></m:e><m:sub><m:r><m:t>b</m:t></m:r></m:sub><m:sup><m:r><m:t>a</m:t></m:r></m:sup></m:sSubSup></m:sup></m:sSup><m:r><m:rPr><m:sty m:val="p" /></m:rPr><m:t>=</m:t></m:r><m:sSup><m:e><m:r><m:t>n</m:t></m:r></m:e><m:sup><m:r><m:t>l</m:t></m:r><m:r><m:t>o</m:t></m:r><m:sSubSup><m:e><m:r><m:t>g</m:t></m:r></m:e><m:sub><m:r><m:t>2</m:t></m:r></m:sub><m:sup><m:r><m:t>4</m:t></m:r></m:sup></m:sSubSup></m:sup></m:sSup><m:r><m:rPr><m:sty m:val="p" /></m:rPr><m:t>=</m:t></m:r><m:sSup><m:e><m:r><m:t>n</m:t></m:r></m:e><m:sup><m:r><m:t>l</m:t></m:r><m:r><m:t>o</m:t></m:r><m:sSubSup><m:e><m:r><m:t>g</m:t></m:r></m:e><m:sub><m:r><m:t>2</m:t></m:r></m:sub><m:sup><m:sSup><m:e><m:r><m:t>2</m:t></m:r></m:e><m:sup><m:r><m:t>2</m:t></m:r></m:sup></m:sSup></m:sup></m:sSubSup></m:sup></m:sSup><m:r><m:rPr><m:sty m:val="p" /></m:rPr><m:t>=</m:t></m:r><m:sSup><m:e><m:r><m:t>n</m:t></m:r></m:e><m:sup><m:r><m:t>2</m:t></m:r><m:r><m:t>l</m:t></m:r><m:r><m:t>o</m:t></m:r><m:sSubSup><m:e><m:r><m:t>g</m:t></m:r></m:e><m:sub><m:r><m:t>2</m:t></m:r></m:sub><m:sup><m:r><m:t>2</m:t></m:r></m:sup></m:sSubSup></m:sup></m:sSup><m:r><m:rPr><m:sty m:val="p" /></m:rPr><m:t>=</m:t></m:r><m:sSup><m:e><m:r><m:t>n</m:t></m:r></m:e><m:sup><m:r><m:t>2</m:t></m:r></m:sup></m:sSup></m:oMath></a14:m></a:p><a:p><a:pPr lvl="0" /><a14:m><m:oMath xmlns:m="http://schemas.openxmlformats.org/officeDocument/2006/math"><m:r><m:t>f</m:t></m:r><m:d><m:dPr><m:begChr m:val="(" /><m:endChr m:val=")" /><m:sepChr m:val="" /><m:grow /></m:dPr><m:e><m:r><m:t>n</m:t></m:r></m:e></m:d><m:r><m:rPr><m:sty m:val="p" /></m:rPr><m:t>=</m:t></m:r><m:sSup><m:e><m:r><m:t>n</m:t></m:r></m:e><m:sup><m:r><m:t>2</m:t></m:r></m:sup></m:sSup><m:r><m:t>l</m:t></m:r><m:r><m:t>g</m:t></m:r><m:r><m:t>n</m:t></m:r></m:oMath></a14:m><a:r><a:rPr /><a:t> grows slower than </a:t></a:r><a14:m><m:oMath xmlns:m="http://schemas.openxmlformats.org/officeDocument/2006/math"><m:sSup><m:e><m:r><m:t>n</m:t></m:r></m:e><m:sup><m:r><m:t>l</m:t></m:r><m:r><m:t>o</m:t></m:r><m:sSubSup><m:e><m:r><m:t>g</m:t></m:r></m:e><m:sub><m:r><m:t>b</m:t></m:r></m:sub><m:sup><m:r><m:t>a</m:t></m:r></m:sup></m:sSubSup></m:sup></m:sSup><m:r><m:rPr><m:sty m:val="p" /></m:rPr><m:t>=</m:t></m:r><m:sSup><m:e><m:r><m:t>n</m:t></m:r></m:e><m:sup><m:r><m:t>2</m:t></m:r></m:sup></m:sSup></m:oMath></a14:m></a:p><a:p><a:pPr lvl="1" /><a:r><a:rPr /><a:t>but is it polynomially slower?</a:t></a:r></a:p><a:p><a:pPr lvl="1" /><a14:m><m:oMath xmlns:m="http://schemas.openxmlformats.org/officeDocument/2006/math"><m:f><m:fPr><m:type m:val="bar" /></m:fPr><m:num><m:sSup><m:e><m:r><m:t>n</m:t></m:r></m:e><m:sup><m:r><m:t>l</m:t></m:r><m:r><m:t>o</m:t></m:r><m:sSubSup><m:e><m:r><m:t>g</m:t></m:r></m:e><m:sub><m:r><m:t>b</m:t></m:r></m:sub><m:sup><m:r><m:t>a</m:t></m:r></m:sup></m:sSubSup></m:sup></m:sSup><m:r><m:t>f</m:t></m:r><m:d><m:dPr><m:begChr m:val="(" /><m:endChr m:val=")" /><m:sepChr m:val="" /><m:grow /></m:dPr><m:e><m:r><m:t>n</m:t></m:r></m:e></m:d></m:num><m:den><m:r><m:rPr><m:sty m:val="p" /></m:rPr><m:t>=</m:t></m:r></m:den></m:f><m:f><m:fPr><m:type m:val="bar" /></m:fPr><m:num><m:sSup><m:e><m:r><m:t>n</m:t></m:r></m:e><m:sup><m:r><m:t>2</m:t></m:r></m:sup></m:sSup></m:num><m:den><m:f><m:fPr><m:type m:val="bar" /></m:fPr><m:num><m:sSup><m:e><m:r><m:t>n</m:t></m:r></m:e><m:sup><m:r><m:t>2</m:t></m:r></m:sup></m:sSup></m:num><m:den><m:r><m:t>l</m:t></m:r><m:r><m:t>g</m:t></m:r><m:r><m:t>n</m:t></m:r></m:den></m:f></m:den></m:f><m:r><m:rPr><m:sty m:val="p" /></m:rPr><m:t>=</m:t></m:r><m:r><m:t>l</m:t></m:r><m:r><m:t>g</m:t></m:r><m:r><m:t>n</m:t></m:r><m:r><m:rPr><m:sty m:val="p" /></m:rPr><m:t>≠</m:t></m:r><m:r><m:t>Ω</m:t></m:r><m:d><m:dPr><m:begChr m:val="(" /><m:endChr m:val=")" /><m:sepChr m:val="" /><m:grow /></m:dPr><m:e><m:sSup><m:e><m:r><m:t>n</m:t></m:r></m:e><m:sup><m:r><m:t>ε</m:t></m:r></m:sup></m:sSup></m:e></m:d></m:oMath></a14:m><a:r><a:rPr /><a:t> for any </a:t></a:r><a14:m><m:oMath xmlns:m="http://schemas.openxmlformats.org/officeDocument/2006/math"><m:r><m:t>ε</m:t></m:r><m:r><m:rPr><m:sty m:val="p" /></m:rPr><m:t>&gt;</m:t></m:r><m:r><m:t>0</m:t></m:r></m:oMath></a14:m></a:p><a:p><a:pPr lvl="2" /><a:r><a:rPr /><a:t>is not CASE-1</a:t></a:r></a:p><a:p><a:pPr lvl="2" /><a:r><a:rPr /><a:t>Master Method does not apply!</a:t></a:r></a:p></p:txBody></p:sp></mc:Choice></mc:AlternateContent></p:spTree></p:cSld></p:sld>
 </file>
 
 <file path=ppt/slides/slide46.xml><?xml version="1.0" encoding="utf-8"?>
@@ -14264,7 +14768,7 @@
             </a:pPr>
             <a:r>
               <a:rPr/>
-              <a:t>Idea of Master Theorem</a:t>
+              <a:t>Idea of Master Theorem (1)</a:t>
             </a:r>
           </a:p>
         </p:txBody>
@@ -14336,7 +14840,7 @@
             </a:pPr>
             <a:r>
               <a:rPr/>
-              <a:t>Idea of Master Theorem</a:t>
+              <a:t>Idea of Master Theorem (2)</a:t>
             </a:r>
           </a:p>
         </p:txBody>
@@ -14520,7 +15024,7 @@
             </a:pPr>
             <a:r>
               <a:rPr/>
-              <a:t>Outline</a:t>
+              <a:t>Outline (1)</a:t>
             </a:r>
           </a:p>
         </p:txBody>
@@ -14611,7 +15115,7 @@
             </a:pPr>
             <a:r>
               <a:rPr/>
-              <a:t>Idea of Master Theorem</a:t>
+              <a:t>Idea of Master Theorem (3)</a:t>
             </a:r>
           </a:p>
         </p:txBody>
@@ -14863,7 +15367,7 @@
             </a:pPr>
             <a:r>
               <a:rPr/>
-              <a:t>Idea of Master Theorem</a:t>
+              <a:t>Idea of Master Theorem (4)</a:t>
             </a:r>
           </a:p>
         </p:txBody>
@@ -15564,7 +16068,7 @@
             </a:pPr>
             <a:r>
               <a:rPr/>
-              <a:t>Proof Case 1</a:t>
+              <a:t>Proof of Master Theorem Case 1 (1)</a:t>
             </a:r>
           </a:p>
         </p:txBody>
@@ -16435,7 +16939,7 @@
             </a:pPr>
             <a:r>
               <a:rPr/>
-              <a:t>Proof Case 1 (con’t)</a:t>
+              <a:t>Proof of Master Theorem Case 1 (2)</a:t>
             </a:r>
           </a:p>
         </p:txBody>
@@ -17248,7 +17752,7 @@
             </a:pPr>
             <a:r>
               <a:rPr/>
-              <a:t>Proof Case 1 (con’t)</a:t>
+              <a:t>Proof of Master Theorem Case 1 (3)</a:t>
             </a:r>
           </a:p>
         </p:txBody>
@@ -17831,7 +18335,7 @@
             </a:pPr>
             <a:r>
               <a:rPr/>
-              <a:t>Proof of Case 2 (limited to k=0)</a:t>
+              <a:t>Proof of Master Theorem Case 2 (limited to k=0)</a:t>
             </a:r>
           </a:p>
         </p:txBody>
@@ -19268,7 +19772,7 @@
             </a:pPr>
             <a:r>
               <a:rPr/>
-              <a:t>The Divide-and-Conquer Design Paradigm</a:t>
+              <a:t>The Divide-and-Conquer Design Paradigm (1)</a:t>
             </a:r>
           </a:p>
         </p:txBody>
@@ -19375,7 +19879,7 @@
             </a:pPr>
             <a:r>
               <a:rPr/>
-              <a:t>The Divide-and-Conquer Design Paradigm</a:t>
+              <a:t>The Divide-and-Conquer Design Paradigm (2)</a:t>
             </a:r>
           </a:p>
         </p:txBody>
@@ -19490,7 +19994,7 @@
             </a:pPr>
             <a:r>
               <a:rPr/>
-              <a:t>The Divide-and-Conquer Design Paradigm</a:t>
+              <a:t>The Divide-and-Conquer Design Paradigm (3)</a:t>
             </a:r>
           </a:p>
         </p:txBody>
@@ -20103,7 +20607,7 @@
             </a:pPr>
             <a:r>
               <a:rPr/>
-              <a:t>Outline</a:t>
+              <a:t>Outline (2)</a:t>
             </a:r>
           </a:p>
         </p:txBody>
@@ -20201,7 +20705,7 @@
             </a:pPr>
             <a:r>
               <a:rPr/>
-              <a:t>Selection Sort</a:t>
+              <a:t>Selection Sort Algorithm</a:t>
             </a:r>
           </a:p>
         </p:txBody>
@@ -20539,7 +21043,7 @@
             </a:pPr>
             <a:r>
               <a:rPr/>
-              <a:t>Selection Sort</a:t>
+              <a:t>Selection Sort Algorithm</a:t>
             </a:r>
           </a:p>
         </p:txBody>
@@ -24513,7 +25017,7 @@
             </a:pPr>
             <a:r>
               <a:rPr/>
-              <a:t>Binary Search</a:t>
+              <a:t>Binary Search (1)</a:t>
             </a:r>
           </a:p>
         </p:txBody>
@@ -24614,7 +25118,7 @@
             </a:pPr>
             <a:r>
               <a:rPr/>
-              <a:t>Binary Search :</a:t>
+              <a:t>Binary Search (2)</a:t>
             </a:r>
           </a:p>
         </p:txBody>
@@ -24833,7 +25337,7 @@
             </a:pPr>
             <a:r>
               <a:rPr/>
-              <a:t>Outline</a:t>
+              <a:t>Outline (3)</a:t>
             </a:r>
           </a:p>
         </p:txBody>
@@ -24903,7 +25407,7 @@
             </a:pPr>
             <a:r>
               <a:rPr/>
-              <a:t>Binary Search : Iterative</a:t>
+              <a:t>Binary Search (3) : Iterative</a:t>
             </a:r>
           </a:p>
         </p:txBody>
@@ -25323,7 +25827,7 @@
             </a:pPr>
             <a:r>
               <a:rPr/>
-              <a:t>Binary Search : Recursive</a:t>
+              <a:t>Binary Search (4): Recursive</a:t>
             </a:r>
           </a:p>
         </p:txBody>
@@ -25785,7 +26289,7 @@
             </a:pPr>
             <a:r>
               <a:rPr/>
-              <a:t>Binary Search : Recursive</a:t>
+              <a:t>Binary Search (5): Recursive</a:t>
             </a:r>
           </a:p>
         </p:txBody>
@@ -25985,7 +26489,7 @@
             </a:pPr>
             <a:r>
               <a:rPr/>
-              <a:t>Example: Find 9</a:t>
+              <a:t>Binary Search (6): Example (Find 9)</a:t>
             </a:r>
           </a:p>
         </p:txBody>
@@ -26092,7 +26596,7 @@
             </a:pPr>
             <a:r>
               <a:rPr/>
-              <a:t>Recurrence for Binary Search</a:t>
+              <a:t>Recurrence for Binary Search (7)</a:t>
             </a:r>
           </a:p>
         </p:txBody>
@@ -26322,7 +26826,7 @@
             </a:pPr>
             <a:r>
               <a:rPr/>
-              <a:t>Binary Search: Solving the Recurrence</a:t>
+              <a:t>Binary Search: Solving the Recurrence (8)</a:t>
             </a:r>
           </a:p>
         </p:txBody>
@@ -26891,7 +27395,7 @@
             </a:pPr>
             <a:r>
               <a:rPr/>
-              <a:t>Powering a Number</a:t>
+              <a:t>Powering a Number: Divide &amp; Conquer (1)</a:t>
             </a:r>
           </a:p>
         </p:txBody>
@@ -27201,7 +27705,7 @@
             </a:pPr>
             <a:r>
               <a:rPr/>
-              <a:t>Powering a Number: Divide &amp; Conquer</a:t>
+              <a:t>Powering a Number: Divide &amp; Conquer (2)</a:t>
             </a:r>
           </a:p>
         </p:txBody>
@@ -27506,7 +28010,7 @@
             </a:pPr>
             <a:r>
               <a:rPr/>
-              <a:t>Powering a Number: Divide &amp; Conquer</a:t>
+              <a:t>Powering a Number: Divide &amp; Conquer (3)</a:t>
             </a:r>
           </a:p>
         </p:txBody>
@@ -27940,7 +28444,7 @@
             </a:pPr>
             <a:r>
               <a:rPr/>
-              <a:t>Powering a Number: Solving the Recurrence</a:t>
+              <a:t>Powering a Number: Solving the Recurrence (4)</a:t>
             </a:r>
           </a:p>
         </p:txBody>
@@ -28509,7 +29013,7 @@
             </a:pPr>
             <a:r>
               <a:rPr/>
-              <a:t>Solving Recurrences</a:t>
+              <a:t>Solving Recurrences (1)</a:t>
             </a:r>
           </a:p>
         </p:txBody>
@@ -29669,7 +30173,7 @@
             </a:pPr>
             <a:r>
               <a:rPr/>
-              <a:t>Recurrences</a:t>
+              <a:t>Solving Recurrences (2)</a:t>
             </a:r>
           </a:p>
         </p:txBody>
@@ -29695,8 +30199,12 @@
                   <a:buNone/>
                 </a:pPr>
                 <a:r>
+                  <a:rPr b="1"/>
+                  <a:t>Recurrence:</a:t>
+                </a:r>
+                <a:r>
                   <a:rPr/>
-                  <a:t>Recurrence: An equation or inequality that describes a function in terms of its value on smaller inputs.</a:t>
+                  <a:t> An equation or inequality that describes a function in terms of its value on smaller inputs.</a:t>
                 </a:r>
               </a:p>
               <a:p>
@@ -29769,9 +30277,6 @@
                             </m:mPr>
                             <m:mr>
                               <m:e>
-                                <m:r>
-                                  <m:t> </m:t>
-                                </m:r>
                                 <m:r>
                                   <m:t>1</m:t>
                                 </m:r>

</xml_diff>

<commit_message>
Deployed 8de4809 with MkDocs version: 1.2.3
</commit_message>
<xml_diff>
--- a/week-2/ce100-week-2-recurrence.md_word.pptx
+++ b/week-2/ce100-week-2-recurrence.md_word.pptx
@@ -87,6 +87,7 @@
     <p:sldId id="335" r:id="rId81"/>
     <p:sldId id="336" r:id="rId82"/>
     <p:sldId id="337" r:id="rId83"/>
+    <p:sldId id="338" r:id="rId84"/>
   </p:sldIdLst>
   <p:sldSz cx="9144000" cy="6858000" type="screen4x3"/>
   <p:notesSz cx="6858000" cy="9144000"/>
@@ -30131,6 +30132,165 @@
           </a:p>
         </p:txBody>
       </p:sp>
+    </p:spTree>
+  </p:cSld>
+</p:sld>
+</file>
+
+<file path=ppt/slides/slide83.xml><?xml version="1.0" encoding="utf-8"?>
+<p:sld xmlns:a="http://schemas.openxmlformats.org/drawingml/2006/main" xmlns:r="http://schemas.openxmlformats.org/officeDocument/2006/relationships" xmlns:p="http://schemas.openxmlformats.org/presentationml/2006/main">
+  <p:cSld>
+    <p:spTree>
+      <p:nvGrpSpPr>
+        <p:cNvPr id="1" name=""/>
+        <p:cNvGrpSpPr/>
+        <p:nvPr/>
+      </p:nvGrpSpPr>
+      <p:grpSpPr>
+        <a:xfrm>
+          <a:off x="0" y="0"/>
+          <a:ext cx="0" cy="0"/>
+          <a:chOff x="0" y="0"/>
+          <a:chExt cx="0" cy="0"/>
+        </a:xfrm>
+      </p:grpSpPr>
+      <mc:AlternateContent xmlns:mc="http://schemas.openxmlformats.org/markup-compatibility/2006">
+        <mc:Choice xmlns:a14="http://schemas.microsoft.com/office/drawing/2010/main" Requires="a14">
+          <p:sp>
+            <p:nvSpPr>
+              <p:cNvPr id="3" name="Content Placeholder 2"/>
+              <p:cNvSpPr>
+                <a:spLocks noGrp="1"/>
+              </p:cNvSpPr>
+              <p:nvPr>
+                <p:ph idx="1"/>
+              </p:nvPr>
+            </p:nvSpPr>
+            <p:spPr/>
+            <p:txBody>
+              <a:bodyPr/>
+              <a:lstStyle/>
+              <a:p>
+                <a:pPr lvl="0" indent="0" marL="0">
+                  <a:buNone/>
+                </a:pPr>
+                <a14:m>
+                  <m:oMath xmlns:m="http://schemas.openxmlformats.org/officeDocument/2006/math">
+                    <m:r>
+                      <m:rPr>
+                        <m:sty m:val="p"/>
+                      </m:rPr>
+                      <m:t>−</m:t>
+                    </m:r>
+                    <m:r>
+                      <m:t>E</m:t>
+                    </m:r>
+                    <m:r>
+                      <m:t>n</m:t>
+                    </m:r>
+                    <m:r>
+                      <m:t>d</m:t>
+                    </m:r>
+                    <m:r>
+                      <m:rPr>
+                        <m:sty m:val="p"/>
+                      </m:rPr>
+                      <m:t>−</m:t>
+                    </m:r>
+                    <m:r>
+                      <m:t>O</m:t>
+                    </m:r>
+                    <m:r>
+                      <m:t>f</m:t>
+                    </m:r>
+                    <m:r>
+                      <m:rPr>
+                        <m:sty m:val="p"/>
+                      </m:rPr>
+                      <m:t>−</m:t>
+                    </m:r>
+                    <m:r>
+                      <m:t>W</m:t>
+                    </m:r>
+                    <m:r>
+                      <m:t>e</m:t>
+                    </m:r>
+                    <m:r>
+                      <m:t>e</m:t>
+                    </m:r>
+                    <m:r>
+                      <m:t>k</m:t>
+                    </m:r>
+                    <m:r>
+                      <m:rPr>
+                        <m:sty m:val="p"/>
+                      </m:rPr>
+                      <m:t>−</m:t>
+                    </m:r>
+                    <m:r>
+                      <m:t>2</m:t>
+                    </m:r>
+                    <m:r>
+                      <m:rPr>
+                        <m:sty m:val="p"/>
+                      </m:rPr>
+                      <m:t>−</m:t>
+                    </m:r>
+                    <m:r>
+                      <m:t>C</m:t>
+                    </m:r>
+                    <m:r>
+                      <m:t>o</m:t>
+                    </m:r>
+                    <m:r>
+                      <m:t>u</m:t>
+                    </m:r>
+                    <m:r>
+                      <m:t>r</m:t>
+                    </m:r>
+                    <m:r>
+                      <m:t>s</m:t>
+                    </m:r>
+                    <m:r>
+                      <m:t>e</m:t>
+                    </m:r>
+                    <m:r>
+                      <m:rPr>
+                        <m:sty m:val="p"/>
+                      </m:rPr>
+                      <m:t>−</m:t>
+                    </m:r>
+                    <m:r>
+                      <m:t>M</m:t>
+                    </m:r>
+                    <m:r>
+                      <m:t>o</m:t>
+                    </m:r>
+                    <m:r>
+                      <m:t>d</m:t>
+                    </m:r>
+                    <m:r>
+                      <m:t>u</m:t>
+                    </m:r>
+                    <m:r>
+                      <m:t>l</m:t>
+                    </m:r>
+                    <m:r>
+                      <m:t>e</m:t>
+                    </m:r>
+                    <m:r>
+                      <m:rPr>
+                        <m:sty m:val="p"/>
+                      </m:rPr>
+                      <m:t>−</m:t>
+                    </m:r>
+                  </m:oMath>
+                </a14:m>
+              </a:p>
+            </p:txBody>
+          </p:sp>
+        </mc:Choice>
+      </mc:AlternateContent>
     </p:spTree>
   </p:cSld>
 </p:sld>

</xml_diff>